<commit_message>
add GPU graphs to powerpoint
</commit_message>
<xml_diff>
--- a/documentazione/presentazione.pptx
+++ b/documentazione/presentazione.pptx
@@ -5,10 +5,10 @@
     <p:sldMasterId id="2147483660" r:id="rId4"/>
   </p:sldMasterIdLst>
   <p:notesMasterIdLst>
-    <p:notesMasterId r:id="rId23"/>
+    <p:notesMasterId r:id="rId25"/>
   </p:notesMasterIdLst>
   <p:handoutMasterIdLst>
-    <p:handoutMasterId r:id="rId24"/>
+    <p:handoutMasterId r:id="rId26"/>
   </p:handoutMasterIdLst>
   <p:sldIdLst>
     <p:sldId id="257" r:id="rId5"/>
@@ -29,6 +29,8 @@
     <p:sldId id="284" r:id="rId20"/>
     <p:sldId id="285" r:id="rId21"/>
     <p:sldId id="287" r:id="rId22"/>
+    <p:sldId id="293" r:id="rId23"/>
+    <p:sldId id="294" r:id="rId24"/>
   </p:sldIdLst>
   <p:sldSz cx="12188825" cy="6858000"/>
   <p:notesSz cx="6858000" cy="9144000"/>
@@ -881,6 +883,898 @@
           </a:p>
         </c:txPr>
         <c:crossAx val="1936459583"/>
+        <c:crosses val="autoZero"/>
+        <c:crossBetween val="between"/>
+      </c:valAx>
+      <c:spPr>
+        <a:noFill/>
+        <a:ln>
+          <a:noFill/>
+        </a:ln>
+        <a:effectLst/>
+      </c:spPr>
+    </c:plotArea>
+    <c:legend>
+      <c:legendPos val="r"/>
+      <c:overlay val="0"/>
+      <c:spPr>
+        <a:noFill/>
+        <a:ln>
+          <a:noFill/>
+        </a:ln>
+        <a:effectLst/>
+      </c:spPr>
+      <c:txPr>
+        <a:bodyPr rot="0" spcFirstLastPara="1" vertOverflow="ellipsis" vert="horz" wrap="square" anchor="ctr" anchorCtr="1"/>
+        <a:lstStyle/>
+        <a:p>
+          <a:pPr>
+            <a:defRPr sz="1600" b="0" i="0" u="none" strike="noStrike" kern="1200" baseline="0">
+              <a:solidFill>
+                <a:schemeClr val="tx1">
+                  <a:lumMod val="65000"/>
+                  <a:lumOff val="35000"/>
+                </a:schemeClr>
+              </a:solidFill>
+              <a:latin typeface="+mn-lt"/>
+              <a:ea typeface="+mn-ea"/>
+              <a:cs typeface="+mn-cs"/>
+            </a:defRPr>
+          </a:pPr>
+          <a:endParaRPr lang="it-IT"/>
+        </a:p>
+      </c:txPr>
+    </c:legend>
+    <c:plotVisOnly val="1"/>
+    <c:dispBlanksAs val="gap"/>
+    <c:extLst>
+      <c:ext xmlns:c16r3="http://schemas.microsoft.com/office/drawing/2017/03/chart" uri="{56B9EC1D-385E-4148-901F-78D8002777C0}">
+        <c16r3:dataDisplayOptions16>
+          <c16r3:dispNaAsBlank val="1"/>
+        </c16r3:dataDisplayOptions16>
+      </c:ext>
+    </c:extLst>
+    <c:showDLblsOverMax val="0"/>
+  </c:chart>
+  <c:spPr>
+    <a:noFill/>
+    <a:ln>
+      <a:noFill/>
+    </a:ln>
+    <a:effectLst/>
+  </c:spPr>
+  <c:txPr>
+    <a:bodyPr/>
+    <a:lstStyle/>
+    <a:p>
+      <a:pPr>
+        <a:defRPr sz="1600"/>
+      </a:pPr>
+      <a:endParaRPr lang="it-IT"/>
+    </a:p>
+  </c:txPr>
+  <c:externalData r:id="rId3">
+    <c:autoUpdate val="0"/>
+  </c:externalData>
+</c:chartSpace>
+</file>
+
+<file path=ppt/charts/chart10.xml><?xml version="1.0" encoding="utf-8"?>
+<c:chartSpace xmlns:c="http://schemas.openxmlformats.org/drawingml/2006/chart" xmlns:a="http://schemas.openxmlformats.org/drawingml/2006/main" xmlns:r="http://schemas.openxmlformats.org/officeDocument/2006/relationships" xmlns:c16r2="http://schemas.microsoft.com/office/drawing/2015/06/chart">
+  <c:date1904 val="0"/>
+  <c:lang val="en-US"/>
+  <c:roundedCorners val="0"/>
+  <mc:AlternateContent xmlns:mc="http://schemas.openxmlformats.org/markup-compatibility/2006">
+    <mc:Choice xmlns:c14="http://schemas.microsoft.com/office/drawing/2007/8/2/chart" Requires="c14">
+      <c14:style val="102"/>
+    </mc:Choice>
+    <mc:Fallback>
+      <c:style val="2"/>
+    </mc:Fallback>
+  </mc:AlternateContent>
+  <c:chart>
+    <c:title>
+      <c:tx>
+        <c:rich>
+          <a:bodyPr rot="0" spcFirstLastPara="1" vertOverflow="ellipsis" vert="horz" wrap="square" anchor="ctr" anchorCtr="1"/>
+          <a:lstStyle/>
+          <a:p>
+            <a:pPr>
+              <a:defRPr sz="1920" b="0" i="0" u="none" strike="noStrike" kern="1200" spc="0" baseline="0">
+                <a:solidFill>
+                  <a:schemeClr val="tx1">
+                    <a:lumMod val="65000"/>
+                    <a:lumOff val="35000"/>
+                  </a:schemeClr>
+                </a:solidFill>
+                <a:latin typeface="+mn-lt"/>
+                <a:ea typeface="+mn-ea"/>
+                <a:cs typeface="+mn-cs"/>
+              </a:defRPr>
+            </a:pPr>
+            <a:r>
+              <a:rPr lang="it-IT"/>
+              <a:t>speedup (128 th/block)</a:t>
+            </a:r>
+          </a:p>
+        </c:rich>
+      </c:tx>
+      <c:overlay val="0"/>
+      <c:spPr>
+        <a:noFill/>
+        <a:ln>
+          <a:noFill/>
+        </a:ln>
+        <a:effectLst/>
+      </c:spPr>
+      <c:txPr>
+        <a:bodyPr rot="0" spcFirstLastPara="1" vertOverflow="ellipsis" vert="horz" wrap="square" anchor="ctr" anchorCtr="1"/>
+        <a:lstStyle/>
+        <a:p>
+          <a:pPr>
+            <a:defRPr sz="1920" b="0" i="0" u="none" strike="noStrike" kern="1200" spc="0" baseline="0">
+              <a:solidFill>
+                <a:schemeClr val="tx1">
+                  <a:lumMod val="65000"/>
+                  <a:lumOff val="35000"/>
+                </a:schemeClr>
+              </a:solidFill>
+              <a:latin typeface="+mn-lt"/>
+              <a:ea typeface="+mn-ea"/>
+              <a:cs typeface="+mn-cs"/>
+            </a:defRPr>
+          </a:pPr>
+          <a:endParaRPr lang="it-IT"/>
+        </a:p>
+      </c:txPr>
+    </c:title>
+    <c:autoTitleDeleted val="0"/>
+    <c:plotArea>
+      <c:layout/>
+      <c:lineChart>
+        <c:grouping val="standard"/>
+        <c:varyColors val="0"/>
+        <c:ser>
+          <c:idx val="4"/>
+          <c:order val="0"/>
+          <c:tx>
+            <c:v>100M</c:v>
+          </c:tx>
+          <c:spPr>
+            <a:ln w="28575" cap="rnd">
+              <a:solidFill>
+                <a:schemeClr val="accent5"/>
+              </a:solidFill>
+              <a:round/>
+            </a:ln>
+            <a:effectLst/>
+          </c:spPr>
+          <c:marker>
+            <c:symbol val="none"/>
+          </c:marker>
+          <c:cat>
+            <c:numRef>
+              <c:f>'results (12)'!$D$57:$D$66</c:f>
+              <c:numCache>
+                <c:formatCode>General</c:formatCode>
+                <c:ptCount val="10"/>
+                <c:pt idx="0">
+                  <c:v>32</c:v>
+                </c:pt>
+                <c:pt idx="1">
+                  <c:v>64</c:v>
+                </c:pt>
+                <c:pt idx="2">
+                  <c:v>128</c:v>
+                </c:pt>
+                <c:pt idx="3">
+                  <c:v>256</c:v>
+                </c:pt>
+                <c:pt idx="4">
+                  <c:v>512</c:v>
+                </c:pt>
+                <c:pt idx="5">
+                  <c:v>1024</c:v>
+                </c:pt>
+                <c:pt idx="6">
+                  <c:v>2048</c:v>
+                </c:pt>
+                <c:pt idx="7">
+                  <c:v>4096</c:v>
+                </c:pt>
+                <c:pt idx="8">
+                  <c:v>8192</c:v>
+                </c:pt>
+                <c:pt idx="9">
+                  <c:v>10240</c:v>
+                </c:pt>
+              </c:numCache>
+            </c:numRef>
+          </c:cat>
+          <c:val>
+            <c:numRef>
+              <c:f>'results (12)'!$G$43:$G$52</c:f>
+              <c:numCache>
+                <c:formatCode>General</c:formatCode>
+                <c:ptCount val="10"/>
+                <c:pt idx="0">
+                  <c:v>1</c:v>
+                </c:pt>
+                <c:pt idx="1">
+                  <c:v>1.9173019267566442</c:v>
+                </c:pt>
+                <c:pt idx="2">
+                  <c:v>3.6021377215579236</c:v>
+                </c:pt>
+                <c:pt idx="3">
+                  <c:v>7.1101441942828245</c:v>
+                </c:pt>
+                <c:pt idx="4">
+                  <c:v>3.1119205921267521</c:v>
+                </c:pt>
+                <c:pt idx="5">
+                  <c:v>1.7343206219918552</c:v>
+                </c:pt>
+                <c:pt idx="6">
+                  <c:v>1.5276753369224627</c:v>
+                </c:pt>
+                <c:pt idx="7">
+                  <c:v>1.786847726579188</c:v>
+                </c:pt>
+                <c:pt idx="8">
+                  <c:v>1.9088899378223922</c:v>
+                </c:pt>
+                <c:pt idx="9">
+                  <c:v>1.9670644224376248</c:v>
+                </c:pt>
+              </c:numCache>
+            </c:numRef>
+          </c:val>
+          <c:smooth val="0"/>
+          <c:extLst>
+            <c:ext xmlns:c16="http://schemas.microsoft.com/office/drawing/2014/chart" uri="{C3380CC4-5D6E-409C-BE32-E72D297353CC}">
+              <c16:uniqueId val="{00000000-ACC3-4780-AEF2-656969601FBB}"/>
+            </c:ext>
+          </c:extLst>
+        </c:ser>
+        <c:ser>
+          <c:idx val="3"/>
+          <c:order val="1"/>
+          <c:tx>
+            <c:v>10M</c:v>
+          </c:tx>
+          <c:spPr>
+            <a:ln w="28575" cap="rnd">
+              <a:solidFill>
+                <a:schemeClr val="accent4"/>
+              </a:solidFill>
+              <a:round/>
+            </a:ln>
+            <a:effectLst/>
+          </c:spPr>
+          <c:marker>
+            <c:symbol val="none"/>
+          </c:marker>
+          <c:cat>
+            <c:numRef>
+              <c:f>'results (12)'!$D$57:$D$66</c:f>
+              <c:numCache>
+                <c:formatCode>General</c:formatCode>
+                <c:ptCount val="10"/>
+                <c:pt idx="0">
+                  <c:v>32</c:v>
+                </c:pt>
+                <c:pt idx="1">
+                  <c:v>64</c:v>
+                </c:pt>
+                <c:pt idx="2">
+                  <c:v>128</c:v>
+                </c:pt>
+                <c:pt idx="3">
+                  <c:v>256</c:v>
+                </c:pt>
+                <c:pt idx="4">
+                  <c:v>512</c:v>
+                </c:pt>
+                <c:pt idx="5">
+                  <c:v>1024</c:v>
+                </c:pt>
+                <c:pt idx="6">
+                  <c:v>2048</c:v>
+                </c:pt>
+                <c:pt idx="7">
+                  <c:v>4096</c:v>
+                </c:pt>
+                <c:pt idx="8">
+                  <c:v>8192</c:v>
+                </c:pt>
+                <c:pt idx="9">
+                  <c:v>10240</c:v>
+                </c:pt>
+              </c:numCache>
+            </c:numRef>
+          </c:cat>
+          <c:val>
+            <c:numRef>
+              <c:f>'results (12)'!$G$33:$G$42</c:f>
+              <c:numCache>
+                <c:formatCode>General</c:formatCode>
+                <c:ptCount val="10"/>
+                <c:pt idx="0">
+                  <c:v>1</c:v>
+                </c:pt>
+                <c:pt idx="1">
+                  <c:v>1.9010533638831544</c:v>
+                </c:pt>
+                <c:pt idx="2">
+                  <c:v>3.5688570901296091</c:v>
+                </c:pt>
+                <c:pt idx="3">
+                  <c:v>6.9804525891989444</c:v>
+                </c:pt>
+                <c:pt idx="4">
+                  <c:v>12.640203127356825</c:v>
+                </c:pt>
+                <c:pt idx="5">
+                  <c:v>15.110049284769802</c:v>
+                </c:pt>
+                <c:pt idx="6">
+                  <c:v>14.3649505742529</c:v>
+                </c:pt>
+                <c:pt idx="7">
+                  <c:v>15.212453104199435</c:v>
+                </c:pt>
+                <c:pt idx="8">
+                  <c:v>10.221214831679948</c:v>
+                </c:pt>
+                <c:pt idx="9">
+                  <c:v>9.9132886435331251</c:v>
+                </c:pt>
+              </c:numCache>
+            </c:numRef>
+          </c:val>
+          <c:smooth val="0"/>
+          <c:extLst>
+            <c:ext xmlns:c16="http://schemas.microsoft.com/office/drawing/2014/chart" uri="{C3380CC4-5D6E-409C-BE32-E72D297353CC}">
+              <c16:uniqueId val="{00000001-ACC3-4780-AEF2-656969601FBB}"/>
+            </c:ext>
+          </c:extLst>
+        </c:ser>
+        <c:ser>
+          <c:idx val="2"/>
+          <c:order val="2"/>
+          <c:tx>
+            <c:v>1M</c:v>
+          </c:tx>
+          <c:spPr>
+            <a:ln w="28575" cap="rnd">
+              <a:solidFill>
+                <a:schemeClr val="accent3"/>
+              </a:solidFill>
+              <a:round/>
+            </a:ln>
+            <a:effectLst/>
+          </c:spPr>
+          <c:marker>
+            <c:symbol val="none"/>
+          </c:marker>
+          <c:cat>
+            <c:numRef>
+              <c:f>'results (12)'!$D$57:$D$66</c:f>
+              <c:numCache>
+                <c:formatCode>General</c:formatCode>
+                <c:ptCount val="10"/>
+                <c:pt idx="0">
+                  <c:v>32</c:v>
+                </c:pt>
+                <c:pt idx="1">
+                  <c:v>64</c:v>
+                </c:pt>
+                <c:pt idx="2">
+                  <c:v>128</c:v>
+                </c:pt>
+                <c:pt idx="3">
+                  <c:v>256</c:v>
+                </c:pt>
+                <c:pt idx="4">
+                  <c:v>512</c:v>
+                </c:pt>
+                <c:pt idx="5">
+                  <c:v>1024</c:v>
+                </c:pt>
+                <c:pt idx="6">
+                  <c:v>2048</c:v>
+                </c:pt>
+                <c:pt idx="7">
+                  <c:v>4096</c:v>
+                </c:pt>
+                <c:pt idx="8">
+                  <c:v>8192</c:v>
+                </c:pt>
+                <c:pt idx="9">
+                  <c:v>10240</c:v>
+                </c:pt>
+              </c:numCache>
+            </c:numRef>
+          </c:cat>
+          <c:val>
+            <c:numRef>
+              <c:f>'results (12)'!$G$23:$G$32</c:f>
+              <c:numCache>
+                <c:formatCode>General</c:formatCode>
+                <c:ptCount val="10"/>
+                <c:pt idx="0">
+                  <c:v>1</c:v>
+                </c:pt>
+                <c:pt idx="1">
+                  <c:v>1.9045877659574468</c:v>
+                </c:pt>
+                <c:pt idx="2">
+                  <c:v>3.4080904223676383</c:v>
+                </c:pt>
+                <c:pt idx="3">
+                  <c:v>6.3233995584988936</c:v>
+                </c:pt>
+                <c:pt idx="4">
+                  <c:v>10.511926605504586</c:v>
+                </c:pt>
+                <c:pt idx="5">
+                  <c:v>13.261574074074069</c:v>
+                </c:pt>
+                <c:pt idx="6">
+                  <c:v>14.919270833333327</c:v>
+                </c:pt>
+                <c:pt idx="7">
+                  <c:v>12.400432900432895</c:v>
+                </c:pt>
+                <c:pt idx="8">
+                  <c:v>9.5324459234608963</c:v>
+                </c:pt>
+                <c:pt idx="9">
+                  <c:v>8.6671709531013601</c:v>
+                </c:pt>
+              </c:numCache>
+            </c:numRef>
+          </c:val>
+          <c:smooth val="0"/>
+          <c:extLst>
+            <c:ext xmlns:c16="http://schemas.microsoft.com/office/drawing/2014/chart" uri="{C3380CC4-5D6E-409C-BE32-E72D297353CC}">
+              <c16:uniqueId val="{00000002-ACC3-4780-AEF2-656969601FBB}"/>
+            </c:ext>
+          </c:extLst>
+        </c:ser>
+        <c:ser>
+          <c:idx val="1"/>
+          <c:order val="3"/>
+          <c:tx>
+            <c:v>100k</c:v>
+          </c:tx>
+          <c:spPr>
+            <a:ln w="28575" cap="rnd">
+              <a:solidFill>
+                <a:schemeClr val="accent2"/>
+              </a:solidFill>
+              <a:round/>
+            </a:ln>
+            <a:effectLst/>
+          </c:spPr>
+          <c:marker>
+            <c:symbol val="none"/>
+          </c:marker>
+          <c:cat>
+            <c:numRef>
+              <c:f>'results (12)'!$D$57:$D$66</c:f>
+              <c:numCache>
+                <c:formatCode>General</c:formatCode>
+                <c:ptCount val="10"/>
+                <c:pt idx="0">
+                  <c:v>32</c:v>
+                </c:pt>
+                <c:pt idx="1">
+                  <c:v>64</c:v>
+                </c:pt>
+                <c:pt idx="2">
+                  <c:v>128</c:v>
+                </c:pt>
+                <c:pt idx="3">
+                  <c:v>256</c:v>
+                </c:pt>
+                <c:pt idx="4">
+                  <c:v>512</c:v>
+                </c:pt>
+                <c:pt idx="5">
+                  <c:v>1024</c:v>
+                </c:pt>
+                <c:pt idx="6">
+                  <c:v>2048</c:v>
+                </c:pt>
+                <c:pt idx="7">
+                  <c:v>4096</c:v>
+                </c:pt>
+                <c:pt idx="8">
+                  <c:v>8192</c:v>
+                </c:pt>
+                <c:pt idx="9">
+                  <c:v>10240</c:v>
+                </c:pt>
+              </c:numCache>
+            </c:numRef>
+          </c:cat>
+          <c:val>
+            <c:numRef>
+              <c:f>'results (12)'!$G$13:$G$22</c:f>
+              <c:numCache>
+                <c:formatCode>General</c:formatCode>
+                <c:ptCount val="10"/>
+                <c:pt idx="0">
+                  <c:v>1</c:v>
+                </c:pt>
+                <c:pt idx="1">
+                  <c:v>1.7010489510489517</c:v>
+                </c:pt>
+                <c:pt idx="2">
+                  <c:v>2.6016042780748667</c:v>
+                </c:pt>
+                <c:pt idx="3">
+                  <c:v>4.0041152263374489</c:v>
+                </c:pt>
+                <c:pt idx="4">
+                  <c:v>4.4838709677419359</c:v>
+                </c:pt>
+                <c:pt idx="5">
+                  <c:v>4.6555023923444985</c:v>
+                </c:pt>
+                <c:pt idx="6">
+                  <c:v>3.7423076923076928</c:v>
+                </c:pt>
+                <c:pt idx="7">
+                  <c:v>2.3389423076923084</c:v>
+                </c:pt>
+                <c:pt idx="8">
+                  <c:v>1.2785808147174771</c:v>
+                </c:pt>
+                <c:pt idx="9">
+                  <c:v>1.0135416666666668</c:v>
+                </c:pt>
+              </c:numCache>
+            </c:numRef>
+          </c:val>
+          <c:smooth val="0"/>
+          <c:extLst>
+            <c:ext xmlns:c16="http://schemas.microsoft.com/office/drawing/2014/chart" uri="{C3380CC4-5D6E-409C-BE32-E72D297353CC}">
+              <c16:uniqueId val="{00000003-ACC3-4780-AEF2-656969601FBB}"/>
+            </c:ext>
+          </c:extLst>
+        </c:ser>
+        <c:ser>
+          <c:idx val="0"/>
+          <c:order val="4"/>
+          <c:tx>
+            <c:v>10k</c:v>
+          </c:tx>
+          <c:spPr>
+            <a:ln w="28575" cap="rnd">
+              <a:solidFill>
+                <a:schemeClr val="accent1"/>
+              </a:solidFill>
+              <a:round/>
+            </a:ln>
+            <a:effectLst/>
+          </c:spPr>
+          <c:marker>
+            <c:symbol val="none"/>
+          </c:marker>
+          <c:cat>
+            <c:numRef>
+              <c:f>'results (12)'!$D$57:$D$66</c:f>
+              <c:numCache>
+                <c:formatCode>General</c:formatCode>
+                <c:ptCount val="10"/>
+                <c:pt idx="0">
+                  <c:v>32</c:v>
+                </c:pt>
+                <c:pt idx="1">
+                  <c:v>64</c:v>
+                </c:pt>
+                <c:pt idx="2">
+                  <c:v>128</c:v>
+                </c:pt>
+                <c:pt idx="3">
+                  <c:v>256</c:v>
+                </c:pt>
+                <c:pt idx="4">
+                  <c:v>512</c:v>
+                </c:pt>
+                <c:pt idx="5">
+                  <c:v>1024</c:v>
+                </c:pt>
+                <c:pt idx="6">
+                  <c:v>2048</c:v>
+                </c:pt>
+                <c:pt idx="7">
+                  <c:v>4096</c:v>
+                </c:pt>
+                <c:pt idx="8">
+                  <c:v>8192</c:v>
+                </c:pt>
+                <c:pt idx="9">
+                  <c:v>10240</c:v>
+                </c:pt>
+              </c:numCache>
+            </c:numRef>
+          </c:cat>
+          <c:val>
+            <c:numRef>
+              <c:f>'results (12)'!$G$3:$G$12</c:f>
+              <c:numCache>
+                <c:formatCode>General</c:formatCode>
+                <c:ptCount val="10"/>
+                <c:pt idx="0">
+                  <c:v>1</c:v>
+                </c:pt>
+                <c:pt idx="1">
+                  <c:v>1.3643410852713178</c:v>
+                </c:pt>
+                <c:pt idx="2">
+                  <c:v>1.504273504273504</c:v>
+                </c:pt>
+                <c:pt idx="3">
+                  <c:v>1.3333333333333333</c:v>
+                </c:pt>
+                <c:pt idx="4">
+                  <c:v>1.3134328358208953</c:v>
+                </c:pt>
+                <c:pt idx="5">
+                  <c:v>1.0666666666666664</c:v>
+                </c:pt>
+                <c:pt idx="6">
+                  <c:v>0.6875</c:v>
+                </c:pt>
+                <c:pt idx="7">
+                  <c:v>0.43456790123456784</c:v>
+                </c:pt>
+                <c:pt idx="8">
+                  <c:v>0.22797927461139894</c:v>
+                </c:pt>
+                <c:pt idx="9">
+                  <c:v>0.5116279069767441</c:v>
+                </c:pt>
+              </c:numCache>
+            </c:numRef>
+          </c:val>
+          <c:smooth val="0"/>
+          <c:extLst>
+            <c:ext xmlns:c16="http://schemas.microsoft.com/office/drawing/2014/chart" uri="{C3380CC4-5D6E-409C-BE32-E72D297353CC}">
+              <c16:uniqueId val="{00000004-ACC3-4780-AEF2-656969601FBB}"/>
+            </c:ext>
+          </c:extLst>
+        </c:ser>
+        <c:dLbls>
+          <c:showLegendKey val="0"/>
+          <c:showVal val="0"/>
+          <c:showCatName val="0"/>
+          <c:showSerName val="0"/>
+          <c:showPercent val="0"/>
+          <c:showBubbleSize val="0"/>
+        </c:dLbls>
+        <c:smooth val="0"/>
+        <c:axId val="1108871408"/>
+        <c:axId val="1347960512"/>
+      </c:lineChart>
+      <c:catAx>
+        <c:axId val="1108871408"/>
+        <c:scaling>
+          <c:orientation val="minMax"/>
+        </c:scaling>
+        <c:delete val="0"/>
+        <c:axPos val="b"/>
+        <c:title>
+          <c:tx>
+            <c:rich>
+              <a:bodyPr rot="0" spcFirstLastPara="1" vertOverflow="ellipsis" vert="horz" wrap="square" anchor="ctr" anchorCtr="1"/>
+              <a:lstStyle/>
+              <a:p>
+                <a:pPr>
+                  <a:defRPr sz="1600" b="0" i="0" u="none" strike="noStrike" kern="1200" baseline="0">
+                    <a:solidFill>
+                      <a:schemeClr val="tx1">
+                        <a:lumMod val="65000"/>
+                        <a:lumOff val="35000"/>
+                      </a:schemeClr>
+                    </a:solidFill>
+                    <a:latin typeface="+mn-lt"/>
+                    <a:ea typeface="+mn-ea"/>
+                    <a:cs typeface="+mn-cs"/>
+                  </a:defRPr>
+                </a:pPr>
+                <a:r>
+                  <a:rPr lang="it-IT"/>
+                  <a:t>threads</a:t>
+                </a:r>
+              </a:p>
+            </c:rich>
+          </c:tx>
+          <c:overlay val="0"/>
+          <c:spPr>
+            <a:noFill/>
+            <a:ln>
+              <a:noFill/>
+            </a:ln>
+            <a:effectLst/>
+          </c:spPr>
+          <c:txPr>
+            <a:bodyPr rot="0" spcFirstLastPara="1" vertOverflow="ellipsis" vert="horz" wrap="square" anchor="ctr" anchorCtr="1"/>
+            <a:lstStyle/>
+            <a:p>
+              <a:pPr>
+                <a:defRPr sz="1600" b="0" i="0" u="none" strike="noStrike" kern="1200" baseline="0">
+                  <a:solidFill>
+                    <a:schemeClr val="tx1">
+                      <a:lumMod val="65000"/>
+                      <a:lumOff val="35000"/>
+                    </a:schemeClr>
+                  </a:solidFill>
+                  <a:latin typeface="+mn-lt"/>
+                  <a:ea typeface="+mn-ea"/>
+                  <a:cs typeface="+mn-cs"/>
+                </a:defRPr>
+              </a:pPr>
+              <a:endParaRPr lang="it-IT"/>
+            </a:p>
+          </c:txPr>
+        </c:title>
+        <c:numFmt formatCode="General" sourceLinked="1"/>
+        <c:majorTickMark val="none"/>
+        <c:minorTickMark val="none"/>
+        <c:tickLblPos val="nextTo"/>
+        <c:spPr>
+          <a:noFill/>
+          <a:ln w="9525" cap="flat" cmpd="sng" algn="ctr">
+            <a:solidFill>
+              <a:schemeClr val="tx1">
+                <a:lumMod val="15000"/>
+                <a:lumOff val="85000"/>
+              </a:schemeClr>
+            </a:solidFill>
+            <a:round/>
+          </a:ln>
+          <a:effectLst/>
+        </c:spPr>
+        <c:txPr>
+          <a:bodyPr rot="-60000000" spcFirstLastPara="1" vertOverflow="ellipsis" vert="horz" wrap="square" anchor="ctr" anchorCtr="1"/>
+          <a:lstStyle/>
+          <a:p>
+            <a:pPr>
+              <a:defRPr sz="1600" b="0" i="0" u="none" strike="noStrike" kern="1200" baseline="0">
+                <a:solidFill>
+                  <a:schemeClr val="tx1">
+                    <a:lumMod val="65000"/>
+                    <a:lumOff val="35000"/>
+                  </a:schemeClr>
+                </a:solidFill>
+                <a:latin typeface="+mn-lt"/>
+                <a:ea typeface="+mn-ea"/>
+                <a:cs typeface="+mn-cs"/>
+              </a:defRPr>
+            </a:pPr>
+            <a:endParaRPr lang="it-IT"/>
+          </a:p>
+        </c:txPr>
+        <c:crossAx val="1347960512"/>
+        <c:crosses val="autoZero"/>
+        <c:auto val="1"/>
+        <c:lblAlgn val="ctr"/>
+        <c:lblOffset val="100"/>
+        <c:noMultiLvlLbl val="0"/>
+      </c:catAx>
+      <c:valAx>
+        <c:axId val="1347960512"/>
+        <c:scaling>
+          <c:orientation val="minMax"/>
+        </c:scaling>
+        <c:delete val="0"/>
+        <c:axPos val="l"/>
+        <c:majorGridlines>
+          <c:spPr>
+            <a:ln w="9525" cap="flat" cmpd="sng" algn="ctr">
+              <a:solidFill>
+                <a:schemeClr val="tx1">
+                  <a:lumMod val="15000"/>
+                  <a:lumOff val="85000"/>
+                </a:schemeClr>
+              </a:solidFill>
+              <a:round/>
+            </a:ln>
+            <a:effectLst/>
+          </c:spPr>
+        </c:majorGridlines>
+        <c:title>
+          <c:tx>
+            <c:rich>
+              <a:bodyPr rot="-5400000" spcFirstLastPara="1" vertOverflow="ellipsis" vert="horz" wrap="square" anchor="ctr" anchorCtr="1"/>
+              <a:lstStyle/>
+              <a:p>
+                <a:pPr>
+                  <a:defRPr sz="1600" b="0" i="0" u="none" strike="noStrike" kern="1200" baseline="0">
+                    <a:solidFill>
+                      <a:schemeClr val="tx1">
+                        <a:lumMod val="65000"/>
+                        <a:lumOff val="35000"/>
+                      </a:schemeClr>
+                    </a:solidFill>
+                    <a:latin typeface="+mn-lt"/>
+                    <a:ea typeface="+mn-ea"/>
+                    <a:cs typeface="+mn-cs"/>
+                  </a:defRPr>
+                </a:pPr>
+                <a:r>
+                  <a:rPr lang="it-IT"/>
+                  <a:t>speedup</a:t>
+                </a:r>
+              </a:p>
+            </c:rich>
+          </c:tx>
+          <c:overlay val="0"/>
+          <c:spPr>
+            <a:noFill/>
+            <a:ln>
+              <a:noFill/>
+            </a:ln>
+            <a:effectLst/>
+          </c:spPr>
+          <c:txPr>
+            <a:bodyPr rot="-5400000" spcFirstLastPara="1" vertOverflow="ellipsis" vert="horz" wrap="square" anchor="ctr" anchorCtr="1"/>
+            <a:lstStyle/>
+            <a:p>
+              <a:pPr>
+                <a:defRPr sz="1600" b="0" i="0" u="none" strike="noStrike" kern="1200" baseline="0">
+                  <a:solidFill>
+                    <a:schemeClr val="tx1">
+                      <a:lumMod val="65000"/>
+                      <a:lumOff val="35000"/>
+                    </a:schemeClr>
+                  </a:solidFill>
+                  <a:latin typeface="+mn-lt"/>
+                  <a:ea typeface="+mn-ea"/>
+                  <a:cs typeface="+mn-cs"/>
+                </a:defRPr>
+              </a:pPr>
+              <a:endParaRPr lang="it-IT"/>
+            </a:p>
+          </c:txPr>
+        </c:title>
+        <c:numFmt formatCode="General" sourceLinked="1"/>
+        <c:majorTickMark val="none"/>
+        <c:minorTickMark val="none"/>
+        <c:tickLblPos val="nextTo"/>
+        <c:spPr>
+          <a:noFill/>
+          <a:ln>
+            <a:noFill/>
+          </a:ln>
+          <a:effectLst/>
+        </c:spPr>
+        <c:txPr>
+          <a:bodyPr rot="-60000000" spcFirstLastPara="1" vertOverflow="ellipsis" vert="horz" wrap="square" anchor="ctr" anchorCtr="1"/>
+          <a:lstStyle/>
+          <a:p>
+            <a:pPr>
+              <a:defRPr sz="1600" b="0" i="0" u="none" strike="noStrike" kern="1200" baseline="0">
+                <a:solidFill>
+                  <a:schemeClr val="tx1">
+                    <a:lumMod val="65000"/>
+                    <a:lumOff val="35000"/>
+                  </a:schemeClr>
+                </a:solidFill>
+                <a:latin typeface="+mn-lt"/>
+                <a:ea typeface="+mn-ea"/>
+                <a:cs typeface="+mn-cs"/>
+              </a:defRPr>
+            </a:pPr>
+            <a:endParaRPr lang="it-IT"/>
+          </a:p>
+        </c:txPr>
+        <c:crossAx val="1108871408"/>
         <c:crosses val="autoZero"/>
         <c:crossBetween val="between"/>
       </c:valAx>
@@ -6413,7 +7307,1425 @@
 </c:chartSpace>
 </file>
 
+<file path=ppt/charts/chart9.xml><?xml version="1.0" encoding="utf-8"?>
+<c:chartSpace xmlns:c="http://schemas.openxmlformats.org/drawingml/2006/chart" xmlns:a="http://schemas.openxmlformats.org/drawingml/2006/main" xmlns:r="http://schemas.openxmlformats.org/officeDocument/2006/relationships" xmlns:c16r2="http://schemas.microsoft.com/office/drawing/2015/06/chart">
+  <c:date1904 val="0"/>
+  <c:lang val="en-US"/>
+  <c:roundedCorners val="0"/>
+  <mc:AlternateContent xmlns:mc="http://schemas.openxmlformats.org/markup-compatibility/2006">
+    <mc:Choice xmlns:c14="http://schemas.microsoft.com/office/drawing/2007/8/2/chart" Requires="c14">
+      <c14:style val="102"/>
+    </mc:Choice>
+    <mc:Fallback>
+      <c:style val="2"/>
+    </mc:Fallback>
+  </mc:AlternateContent>
+  <c:chart>
+    <c:title>
+      <c:tx>
+        <c:rich>
+          <a:bodyPr rot="0" spcFirstLastPara="1" vertOverflow="ellipsis" vert="horz" wrap="square" anchor="ctr" anchorCtr="1"/>
+          <a:lstStyle/>
+          <a:p>
+            <a:pPr>
+              <a:defRPr sz="1920" b="0" i="0" u="none" strike="noStrike" kern="1200" spc="0" baseline="0">
+                <a:solidFill>
+                  <a:schemeClr val="tx1">
+                    <a:lumMod val="65000"/>
+                    <a:lumOff val="35000"/>
+                  </a:schemeClr>
+                </a:solidFill>
+                <a:latin typeface="+mn-lt"/>
+                <a:ea typeface="+mn-ea"/>
+                <a:cs typeface="+mn-cs"/>
+              </a:defRPr>
+            </a:pPr>
+            <a:r>
+              <a:rPr lang="it-IT"/>
+              <a:t>execution time (128 th/block)</a:t>
+            </a:r>
+          </a:p>
+        </c:rich>
+      </c:tx>
+      <c:overlay val="0"/>
+      <c:spPr>
+        <a:noFill/>
+        <a:ln>
+          <a:noFill/>
+        </a:ln>
+        <a:effectLst/>
+      </c:spPr>
+      <c:txPr>
+        <a:bodyPr rot="0" spcFirstLastPara="1" vertOverflow="ellipsis" vert="horz" wrap="square" anchor="ctr" anchorCtr="1"/>
+        <a:lstStyle/>
+        <a:p>
+          <a:pPr>
+            <a:defRPr sz="1920" b="0" i="0" u="none" strike="noStrike" kern="1200" spc="0" baseline="0">
+              <a:solidFill>
+                <a:schemeClr val="tx1">
+                  <a:lumMod val="65000"/>
+                  <a:lumOff val="35000"/>
+                </a:schemeClr>
+              </a:solidFill>
+              <a:latin typeface="+mn-lt"/>
+              <a:ea typeface="+mn-ea"/>
+              <a:cs typeface="+mn-cs"/>
+            </a:defRPr>
+          </a:pPr>
+          <a:endParaRPr lang="it-IT"/>
+        </a:p>
+      </c:txPr>
+    </c:title>
+    <c:autoTitleDeleted val="0"/>
+    <c:plotArea>
+      <c:layout/>
+      <c:lineChart>
+        <c:grouping val="standard"/>
+        <c:varyColors val="0"/>
+        <c:ser>
+          <c:idx val="4"/>
+          <c:order val="0"/>
+          <c:tx>
+            <c:v>100M</c:v>
+          </c:tx>
+          <c:spPr>
+            <a:ln w="28575" cap="rnd">
+              <a:solidFill>
+                <a:schemeClr val="accent5"/>
+              </a:solidFill>
+              <a:round/>
+            </a:ln>
+            <a:effectLst/>
+          </c:spPr>
+          <c:marker>
+            <c:symbol val="none"/>
+          </c:marker>
+          <c:errBars>
+            <c:errDir val="y"/>
+            <c:errBarType val="both"/>
+            <c:errValType val="cust"/>
+            <c:noEndCap val="0"/>
+            <c:plus>
+              <c:numRef>
+                <c:f>'results (12)'!$L$43:$L$52</c:f>
+                <c:numCache>
+                  <c:formatCode>General</c:formatCode>
+                  <c:ptCount val="10"/>
+                  <c:pt idx="0">
+                    <c:v>8.8900538768252896E-3</c:v>
+                  </c:pt>
+                  <c:pt idx="1">
+                    <c:v>1.1445969940046081E-2</c:v>
+                  </c:pt>
+                  <c:pt idx="2">
+                    <c:v>3.2754700531488377E-3</c:v>
+                  </c:pt>
+                  <c:pt idx="3">
+                    <c:v>1.360387133164245E-3</c:v>
+                  </c:pt>
+                  <c:pt idx="4">
+                    <c:v>1.2187097195258213E-2</c:v>
+                  </c:pt>
+                  <c:pt idx="5">
+                    <c:v>9.4379761306005693E-3</c:v>
+                  </c:pt>
+                  <c:pt idx="6">
+                    <c:v>6.2189914417673797E-3</c:v>
+                  </c:pt>
+                  <c:pt idx="7">
+                    <c:v>9.7146331962034607E-2</c:v>
+                  </c:pt>
+                  <c:pt idx="8">
+                    <c:v>1.0308854746476113E-2</c:v>
+                  </c:pt>
+                  <c:pt idx="9">
+                    <c:v>1.0918078287076171E-2</c:v>
+                  </c:pt>
+                </c:numCache>
+              </c:numRef>
+            </c:plus>
+            <c:minus>
+              <c:numRef>
+                <c:f>'results (12)'!$L$43:$L$52</c:f>
+                <c:numCache>
+                  <c:formatCode>General</c:formatCode>
+                  <c:ptCount val="10"/>
+                  <c:pt idx="0">
+                    <c:v>8.8900538768252896E-3</c:v>
+                  </c:pt>
+                  <c:pt idx="1">
+                    <c:v>1.1445969940046081E-2</c:v>
+                  </c:pt>
+                  <c:pt idx="2">
+                    <c:v>3.2754700531488377E-3</c:v>
+                  </c:pt>
+                  <c:pt idx="3">
+                    <c:v>1.360387133164245E-3</c:v>
+                  </c:pt>
+                  <c:pt idx="4">
+                    <c:v>1.2187097195258213E-2</c:v>
+                  </c:pt>
+                  <c:pt idx="5">
+                    <c:v>9.4379761306005693E-3</c:v>
+                  </c:pt>
+                  <c:pt idx="6">
+                    <c:v>6.2189914417673797E-3</c:v>
+                  </c:pt>
+                  <c:pt idx="7">
+                    <c:v>9.7146331962034607E-2</c:v>
+                  </c:pt>
+                  <c:pt idx="8">
+                    <c:v>1.0308854746476113E-2</c:v>
+                  </c:pt>
+                  <c:pt idx="9">
+                    <c:v>1.0918078287076171E-2</c:v>
+                  </c:pt>
+                </c:numCache>
+              </c:numRef>
+            </c:minus>
+            <c:spPr>
+              <a:noFill/>
+              <a:ln w="9525" cap="flat" cmpd="sng" algn="ctr">
+                <a:solidFill>
+                  <a:schemeClr val="tx1">
+                    <a:lumMod val="65000"/>
+                    <a:lumOff val="35000"/>
+                  </a:schemeClr>
+                </a:solidFill>
+                <a:round/>
+              </a:ln>
+              <a:effectLst/>
+            </c:spPr>
+          </c:errBars>
+          <c:cat>
+            <c:numRef>
+              <c:f>'results (12)'!$D$57:$D$66</c:f>
+              <c:numCache>
+                <c:formatCode>General</c:formatCode>
+                <c:ptCount val="10"/>
+                <c:pt idx="0">
+                  <c:v>32</c:v>
+                </c:pt>
+                <c:pt idx="1">
+                  <c:v>64</c:v>
+                </c:pt>
+                <c:pt idx="2">
+                  <c:v>128</c:v>
+                </c:pt>
+                <c:pt idx="3">
+                  <c:v>256</c:v>
+                </c:pt>
+                <c:pt idx="4">
+                  <c:v>512</c:v>
+                </c:pt>
+                <c:pt idx="5">
+                  <c:v>1024</c:v>
+                </c:pt>
+                <c:pt idx="6">
+                  <c:v>2048</c:v>
+                </c:pt>
+                <c:pt idx="7">
+                  <c:v>4096</c:v>
+                </c:pt>
+                <c:pt idx="8">
+                  <c:v>8192</c:v>
+                </c:pt>
+                <c:pt idx="9">
+                  <c:v>10240</c:v>
+                </c:pt>
+              </c:numCache>
+            </c:numRef>
+          </c:cat>
+          <c:val>
+            <c:numRef>
+              <c:f>'results (12)'!$E$43:$E$52</c:f>
+              <c:numCache>
+                <c:formatCode>General</c:formatCode>
+                <c:ptCount val="10"/>
+                <c:pt idx="0">
+                  <c:v>18.737600000000004</c:v>
+                </c:pt>
+                <c:pt idx="1">
+                  <c:v>9.7728999999999981</c:v>
+                </c:pt>
+                <c:pt idx="2">
+                  <c:v>5.2017999999999995</c:v>
+                </c:pt>
+                <c:pt idx="3">
+                  <c:v>2.6353333333333335</c:v>
+                </c:pt>
+                <c:pt idx="4">
+                  <c:v>6.021233333333333</c:v>
+                </c:pt>
+                <c:pt idx="5">
+                  <c:v>10.804</c:v>
+                </c:pt>
+                <c:pt idx="6">
+                  <c:v>12.265433333333332</c:v>
+                </c:pt>
+                <c:pt idx="7">
+                  <c:v>10.486400000000003</c:v>
+                </c:pt>
+                <c:pt idx="8">
+                  <c:v>9.8159666666666645</c:v>
+                </c:pt>
+                <c:pt idx="9">
+                  <c:v>9.5256666666666678</c:v>
+                </c:pt>
+              </c:numCache>
+            </c:numRef>
+          </c:val>
+          <c:smooth val="0"/>
+          <c:extLst>
+            <c:ext xmlns:c16="http://schemas.microsoft.com/office/drawing/2014/chart" uri="{C3380CC4-5D6E-409C-BE32-E72D297353CC}">
+              <c16:uniqueId val="{00000000-6587-458D-B805-59C934F0AC73}"/>
+            </c:ext>
+          </c:extLst>
+        </c:ser>
+        <c:ser>
+          <c:idx val="3"/>
+          <c:order val="1"/>
+          <c:tx>
+            <c:v>10M</c:v>
+          </c:tx>
+          <c:spPr>
+            <a:ln w="28575" cap="rnd">
+              <a:solidFill>
+                <a:schemeClr val="accent4"/>
+              </a:solidFill>
+              <a:round/>
+            </a:ln>
+            <a:effectLst/>
+          </c:spPr>
+          <c:marker>
+            <c:symbol val="none"/>
+          </c:marker>
+          <c:errBars>
+            <c:errDir val="y"/>
+            <c:errBarType val="both"/>
+            <c:errValType val="cust"/>
+            <c:noEndCap val="0"/>
+            <c:plus>
+              <c:numRef>
+                <c:f>'results (12)'!$L$33:$L$42</c:f>
+                <c:numCache>
+                  <c:formatCode>General</c:formatCode>
+                  <c:ptCount val="10"/>
+                  <c:pt idx="0">
+                    <c:v>2.3481000087217881E-3</c:v>
+                  </c:pt>
+                  <c:pt idx="1">
+                    <c:v>1.2083824789908645E-2</c:v>
+                  </c:pt>
+                  <c:pt idx="2">
+                    <c:v>1.9265847861224526E-3</c:v>
+                  </c:pt>
+                  <c:pt idx="3">
+                    <c:v>8.6230273011013068E-4</c:v>
+                  </c:pt>
+                  <c:pt idx="4">
+                    <c:v>1.1148253729985728E-3</c:v>
+                  </c:pt>
+                  <c:pt idx="5">
+                    <c:v>1.7535482286705208E-3</c:v>
+                  </c:pt>
+                  <c:pt idx="6">
+                    <c:v>1.2256143039416111E-3</c:v>
+                  </c:pt>
+                  <c:pt idx="7">
+                    <c:v>5.8884909381575086E-4</c:v>
+                  </c:pt>
+                  <c:pt idx="8">
+                    <c:v>1.5112339362706531E-3</c:v>
+                  </c:pt>
+                  <c:pt idx="9">
+                    <c:v>2.9468345760974932E-3</c:v>
+                  </c:pt>
+                </c:numCache>
+              </c:numRef>
+            </c:plus>
+            <c:minus>
+              <c:numRef>
+                <c:f>'results (12)'!$L$33:$L$42</c:f>
+                <c:numCache>
+                  <c:formatCode>General</c:formatCode>
+                  <c:ptCount val="10"/>
+                  <c:pt idx="0">
+                    <c:v>2.3481000087217881E-3</c:v>
+                  </c:pt>
+                  <c:pt idx="1">
+                    <c:v>1.2083824789908645E-2</c:v>
+                  </c:pt>
+                  <c:pt idx="2">
+                    <c:v>1.9265847861224526E-3</c:v>
+                  </c:pt>
+                  <c:pt idx="3">
+                    <c:v>8.6230273011013068E-4</c:v>
+                  </c:pt>
+                  <c:pt idx="4">
+                    <c:v>1.1148253729985728E-3</c:v>
+                  </c:pt>
+                  <c:pt idx="5">
+                    <c:v>1.7535482286705208E-3</c:v>
+                  </c:pt>
+                  <c:pt idx="6">
+                    <c:v>1.2256143039416111E-3</c:v>
+                  </c:pt>
+                  <c:pt idx="7">
+                    <c:v>5.8884909381575086E-4</c:v>
+                  </c:pt>
+                  <c:pt idx="8">
+                    <c:v>1.5112339362706531E-3</c:v>
+                  </c:pt>
+                  <c:pt idx="9">
+                    <c:v>2.9468345760974932E-3</c:v>
+                  </c:pt>
+                </c:numCache>
+              </c:numRef>
+            </c:minus>
+            <c:spPr>
+              <a:noFill/>
+              <a:ln w="9525" cap="flat" cmpd="sng" algn="ctr">
+                <a:solidFill>
+                  <a:schemeClr val="tx1">
+                    <a:lumMod val="65000"/>
+                    <a:lumOff val="35000"/>
+                  </a:schemeClr>
+                </a:solidFill>
+                <a:round/>
+              </a:ln>
+              <a:effectLst/>
+            </c:spPr>
+          </c:errBars>
+          <c:cat>
+            <c:numRef>
+              <c:f>'results (12)'!$D$57:$D$66</c:f>
+              <c:numCache>
+                <c:formatCode>General</c:formatCode>
+                <c:ptCount val="10"/>
+                <c:pt idx="0">
+                  <c:v>32</c:v>
+                </c:pt>
+                <c:pt idx="1">
+                  <c:v>64</c:v>
+                </c:pt>
+                <c:pt idx="2">
+                  <c:v>128</c:v>
+                </c:pt>
+                <c:pt idx="3">
+                  <c:v>256</c:v>
+                </c:pt>
+                <c:pt idx="4">
+                  <c:v>512</c:v>
+                </c:pt>
+                <c:pt idx="5">
+                  <c:v>1024</c:v>
+                </c:pt>
+                <c:pt idx="6">
+                  <c:v>2048</c:v>
+                </c:pt>
+                <c:pt idx="7">
+                  <c:v>4096</c:v>
+                </c:pt>
+                <c:pt idx="8">
+                  <c:v>8192</c:v>
+                </c:pt>
+                <c:pt idx="9">
+                  <c:v>10240</c:v>
+                </c:pt>
+              </c:numCache>
+            </c:numRef>
+          </c:cat>
+          <c:val>
+            <c:numRef>
+              <c:f>'results (12)'!$E$33:$E$42</c:f>
+              <c:numCache>
+                <c:formatCode>General</c:formatCode>
+                <c:ptCount val="10"/>
+                <c:pt idx="0">
+                  <c:v>8.3800333333333334</c:v>
+                </c:pt>
+                <c:pt idx="1">
+                  <c:v>4.4081000000000001</c:v>
+                </c:pt>
+                <c:pt idx="2">
+                  <c:v>2.3480999999999996</c:v>
+                </c:pt>
+                <c:pt idx="3">
+                  <c:v>1.2005000000000001</c:v>
+                </c:pt>
+                <c:pt idx="4">
+                  <c:v>0.66296666666666693</c:v>
+                </c:pt>
+                <c:pt idx="5">
+                  <c:v>0.55460000000000009</c:v>
+                </c:pt>
+                <c:pt idx="6">
+                  <c:v>0.5833666666666667</c:v>
+                </c:pt>
+                <c:pt idx="7">
+                  <c:v>0.55086666666666695</c:v>
+                </c:pt>
+                <c:pt idx="8">
+                  <c:v>0.81986666666666663</c:v>
+                </c:pt>
+                <c:pt idx="9">
+                  <c:v>0.84533333333333316</c:v>
+                </c:pt>
+              </c:numCache>
+            </c:numRef>
+          </c:val>
+          <c:smooth val="0"/>
+          <c:extLst>
+            <c:ext xmlns:c16="http://schemas.microsoft.com/office/drawing/2014/chart" uri="{C3380CC4-5D6E-409C-BE32-E72D297353CC}">
+              <c16:uniqueId val="{00000001-6587-458D-B805-59C934F0AC73}"/>
+            </c:ext>
+          </c:extLst>
+        </c:ser>
+        <c:ser>
+          <c:idx val="2"/>
+          <c:order val="2"/>
+          <c:tx>
+            <c:v>1M</c:v>
+          </c:tx>
+          <c:spPr>
+            <a:ln w="28575" cap="rnd">
+              <a:solidFill>
+                <a:schemeClr val="accent3"/>
+              </a:solidFill>
+              <a:round/>
+            </a:ln>
+            <a:effectLst/>
+          </c:spPr>
+          <c:marker>
+            <c:symbol val="none"/>
+          </c:marker>
+          <c:errBars>
+            <c:errDir val="y"/>
+            <c:errBarType val="both"/>
+            <c:errValType val="cust"/>
+            <c:noEndCap val="0"/>
+            <c:plus>
+              <c:numRef>
+                <c:f>'results (12)'!$L$23:$L$32</c:f>
+                <c:numCache>
+                  <c:formatCode>General</c:formatCode>
+                  <c:ptCount val="10"/>
+                  <c:pt idx="0">
+                    <c:v>8.5994106125022443E-4</c:v>
+                  </c:pt>
+                  <c:pt idx="1">
+                    <c:v>5.7839532037100229E-4</c:v>
+                  </c:pt>
+                  <c:pt idx="2">
+                    <c:v>7.1463913331143501E-4</c:v>
+                  </c:pt>
+                  <c:pt idx="3">
+                    <c:v>5.2976268262792242E-4</c:v>
+                  </c:pt>
+                  <c:pt idx="4">
+                    <c:v>4.9529105263400308E-4</c:v>
+                  </c:pt>
+                  <c:pt idx="5">
+                    <c:v>3.6217767522849604E-4</c:v>
+                  </c:pt>
+                  <c:pt idx="6">
+                    <c:v>3.3596057119345739E-4</c:v>
+                  </c:pt>
+                  <c:pt idx="7">
+                    <c:v>2.3432773867356087E-4</c:v>
+                  </c:pt>
+                  <c:pt idx="8">
+                    <c:v>3.1446450120943087E-4</c:v>
+                  </c:pt>
+                  <c:pt idx="9">
+                    <c:v>3.5971265511479205E-4</c:v>
+                  </c:pt>
+                </c:numCache>
+              </c:numRef>
+            </c:plus>
+            <c:minus>
+              <c:numRef>
+                <c:f>'results (12)'!$L$23:$L$32</c:f>
+                <c:numCache>
+                  <c:formatCode>General</c:formatCode>
+                  <c:ptCount val="10"/>
+                  <c:pt idx="0">
+                    <c:v>8.5994106125022443E-4</c:v>
+                  </c:pt>
+                  <c:pt idx="1">
+                    <c:v>5.7839532037100229E-4</c:v>
+                  </c:pt>
+                  <c:pt idx="2">
+                    <c:v>7.1463913331143501E-4</c:v>
+                  </c:pt>
+                  <c:pt idx="3">
+                    <c:v>5.2976268262792242E-4</c:v>
+                  </c:pt>
+                  <c:pt idx="4">
+                    <c:v>4.9529105263400308E-4</c:v>
+                  </c:pt>
+                  <c:pt idx="5">
+                    <c:v>3.6217767522849604E-4</c:v>
+                  </c:pt>
+                  <c:pt idx="6">
+                    <c:v>3.3596057119345739E-4</c:v>
+                  </c:pt>
+                  <c:pt idx="7">
+                    <c:v>2.3432773867356087E-4</c:v>
+                  </c:pt>
+                  <c:pt idx="8">
+                    <c:v>3.1446450120943087E-4</c:v>
+                  </c:pt>
+                  <c:pt idx="9">
+                    <c:v>3.5971265511479205E-4</c:v>
+                  </c:pt>
+                </c:numCache>
+              </c:numRef>
+            </c:minus>
+            <c:spPr>
+              <a:noFill/>
+              <a:ln w="9525" cap="flat" cmpd="sng" algn="ctr">
+                <a:solidFill>
+                  <a:schemeClr val="tx1">
+                    <a:lumMod val="65000"/>
+                    <a:lumOff val="35000"/>
+                  </a:schemeClr>
+                </a:solidFill>
+                <a:round/>
+              </a:ln>
+              <a:effectLst/>
+            </c:spPr>
+          </c:errBars>
+          <c:cat>
+            <c:numRef>
+              <c:f>'results (12)'!$D$57:$D$66</c:f>
+              <c:numCache>
+                <c:formatCode>General</c:formatCode>
+                <c:ptCount val="10"/>
+                <c:pt idx="0">
+                  <c:v>32</c:v>
+                </c:pt>
+                <c:pt idx="1">
+                  <c:v>64</c:v>
+                </c:pt>
+                <c:pt idx="2">
+                  <c:v>128</c:v>
+                </c:pt>
+                <c:pt idx="3">
+                  <c:v>256</c:v>
+                </c:pt>
+                <c:pt idx="4">
+                  <c:v>512</c:v>
+                </c:pt>
+                <c:pt idx="5">
+                  <c:v>1024</c:v>
+                </c:pt>
+                <c:pt idx="6">
+                  <c:v>2048</c:v>
+                </c:pt>
+                <c:pt idx="7">
+                  <c:v>4096</c:v>
+                </c:pt>
+                <c:pt idx="8">
+                  <c:v>8192</c:v>
+                </c:pt>
+                <c:pt idx="9">
+                  <c:v>10240</c:v>
+                </c:pt>
+              </c:numCache>
+            </c:numRef>
+          </c:cat>
+          <c:val>
+            <c:numRef>
+              <c:f>'results (12)'!$E$23:$E$32</c:f>
+              <c:numCache>
+                <c:formatCode>General</c:formatCode>
+                <c:ptCount val="10"/>
+                <c:pt idx="0">
+                  <c:v>0.1909666666666667</c:v>
+                </c:pt>
+                <c:pt idx="1">
+                  <c:v>0.10026666666666668</c:v>
+                </c:pt>
+                <c:pt idx="2">
+                  <c:v>5.6033333333333345E-2</c:v>
+                </c:pt>
+                <c:pt idx="3">
+                  <c:v>3.0200000000000018E-2</c:v>
+                </c:pt>
+                <c:pt idx="4">
+                  <c:v>1.8166666666666671E-2</c:v>
+                </c:pt>
+                <c:pt idx="5">
+                  <c:v>1.4400000000000008E-2</c:v>
+                </c:pt>
+                <c:pt idx="6">
+                  <c:v>1.2800000000000008E-2</c:v>
+                </c:pt>
+                <c:pt idx="7">
+                  <c:v>1.5400000000000009E-2</c:v>
+                </c:pt>
+                <c:pt idx="8">
+                  <c:v>2.003333333333334E-2</c:v>
+                </c:pt>
+                <c:pt idx="9">
+                  <c:v>2.2033333333333342E-2</c:v>
+                </c:pt>
+              </c:numCache>
+            </c:numRef>
+          </c:val>
+          <c:smooth val="0"/>
+          <c:extLst>
+            <c:ext xmlns:c16="http://schemas.microsoft.com/office/drawing/2014/chart" uri="{C3380CC4-5D6E-409C-BE32-E72D297353CC}">
+              <c16:uniqueId val="{00000002-6587-458D-B805-59C934F0AC73}"/>
+            </c:ext>
+          </c:extLst>
+        </c:ser>
+        <c:ser>
+          <c:idx val="1"/>
+          <c:order val="3"/>
+          <c:tx>
+            <c:v>100k</c:v>
+          </c:tx>
+          <c:spPr>
+            <a:ln w="28575" cap="rnd">
+              <a:solidFill>
+                <a:schemeClr val="accent2"/>
+              </a:solidFill>
+              <a:round/>
+            </a:ln>
+            <a:effectLst/>
+          </c:spPr>
+          <c:marker>
+            <c:symbol val="none"/>
+          </c:marker>
+          <c:errBars>
+            <c:errDir val="y"/>
+            <c:errBarType val="both"/>
+            <c:errValType val="cust"/>
+            <c:noEndCap val="0"/>
+            <c:plus>
+              <c:numRef>
+                <c:f>'results (12)'!$L$13:$L$22</c:f>
+                <c:numCache>
+                  <c:formatCode>General</c:formatCode>
+                  <c:ptCount val="10"/>
+                  <c:pt idx="0">
+                    <c:v>2.6726985981349578E-4</c:v>
+                  </c:pt>
+                  <c:pt idx="1">
+                    <c:v>4.6099898016244319E-4</c:v>
+                  </c:pt>
+                  <c:pt idx="2">
+                    <c:v>3.2047009452838273E-4</c:v>
+                  </c:pt>
+                  <c:pt idx="3">
+                    <c:v>3.9732201197101264E-4</c:v>
+                  </c:pt>
+                  <c:pt idx="4">
+                    <c:v>5.4792583068445752E-4</c:v>
+                  </c:pt>
+                  <c:pt idx="5">
+                    <c:v>3.8032332312679237E-4</c:v>
+                  </c:pt>
+                  <c:pt idx="6">
+                    <c:v>3.970019780793937E-4</c:v>
+                  </c:pt>
+                  <c:pt idx="7">
+                    <c:v>4.5767841607174454E-4</c:v>
+                  </c:pt>
+                  <c:pt idx="8">
+                    <c:v>6.2344847737783732E-4</c:v>
+                  </c:pt>
+                  <c:pt idx="9">
+                    <c:v>1.2952953119213947E-3</c:v>
+                  </c:pt>
+                </c:numCache>
+              </c:numRef>
+            </c:plus>
+            <c:minus>
+              <c:numRef>
+                <c:f>'results (12)'!$L$13:$L$22</c:f>
+                <c:numCache>
+                  <c:formatCode>General</c:formatCode>
+                  <c:ptCount val="10"/>
+                  <c:pt idx="0">
+                    <c:v>2.6726985981349578E-4</c:v>
+                  </c:pt>
+                  <c:pt idx="1">
+                    <c:v>4.6099898016244319E-4</c:v>
+                  </c:pt>
+                  <c:pt idx="2">
+                    <c:v>3.2047009452838273E-4</c:v>
+                  </c:pt>
+                  <c:pt idx="3">
+                    <c:v>3.9732201197101264E-4</c:v>
+                  </c:pt>
+                  <c:pt idx="4">
+                    <c:v>5.4792583068445752E-4</c:v>
+                  </c:pt>
+                  <c:pt idx="5">
+                    <c:v>3.8032332312679237E-4</c:v>
+                  </c:pt>
+                  <c:pt idx="6">
+                    <c:v>3.970019780793937E-4</c:v>
+                  </c:pt>
+                  <c:pt idx="7">
+                    <c:v>4.5767841607174454E-4</c:v>
+                  </c:pt>
+                  <c:pt idx="8">
+                    <c:v>6.2344847737783732E-4</c:v>
+                  </c:pt>
+                  <c:pt idx="9">
+                    <c:v>1.2952953119213947E-3</c:v>
+                  </c:pt>
+                </c:numCache>
+              </c:numRef>
+            </c:minus>
+            <c:spPr>
+              <a:noFill/>
+              <a:ln w="9525" cap="flat" cmpd="sng" algn="ctr">
+                <a:solidFill>
+                  <a:schemeClr val="tx1">
+                    <a:lumMod val="65000"/>
+                    <a:lumOff val="35000"/>
+                  </a:schemeClr>
+                </a:solidFill>
+                <a:round/>
+              </a:ln>
+              <a:effectLst/>
+            </c:spPr>
+          </c:errBars>
+          <c:cat>
+            <c:numRef>
+              <c:f>'results (12)'!$D$57:$D$66</c:f>
+              <c:numCache>
+                <c:formatCode>General</c:formatCode>
+                <c:ptCount val="10"/>
+                <c:pt idx="0">
+                  <c:v>32</c:v>
+                </c:pt>
+                <c:pt idx="1">
+                  <c:v>64</c:v>
+                </c:pt>
+                <c:pt idx="2">
+                  <c:v>128</c:v>
+                </c:pt>
+                <c:pt idx="3">
+                  <c:v>256</c:v>
+                </c:pt>
+                <c:pt idx="4">
+                  <c:v>512</c:v>
+                </c:pt>
+                <c:pt idx="5">
+                  <c:v>1024</c:v>
+                </c:pt>
+                <c:pt idx="6">
+                  <c:v>2048</c:v>
+                </c:pt>
+                <c:pt idx="7">
+                  <c:v>4096</c:v>
+                </c:pt>
+                <c:pt idx="8">
+                  <c:v>8192</c:v>
+                </c:pt>
+                <c:pt idx="9">
+                  <c:v>10240</c:v>
+                </c:pt>
+              </c:numCache>
+            </c:numRef>
+          </c:cat>
+          <c:val>
+            <c:numRef>
+              <c:f>'results (12)'!$E$13:$E$22</c:f>
+              <c:numCache>
+                <c:formatCode>General</c:formatCode>
+                <c:ptCount val="10"/>
+                <c:pt idx="0">
+                  <c:v>3.2433333333333356E-2</c:v>
+                </c:pt>
+                <c:pt idx="1">
+                  <c:v>1.9066666666666673E-2</c:v>
+                </c:pt>
+                <c:pt idx="2">
+                  <c:v>1.2466666666666673E-2</c:v>
+                </c:pt>
+                <c:pt idx="3">
+                  <c:v>8.1000000000000048E-3</c:v>
+                </c:pt>
+                <c:pt idx="4">
+                  <c:v>7.2333333333333381E-3</c:v>
+                </c:pt>
+                <c:pt idx="5">
+                  <c:v>6.9666666666666705E-3</c:v>
+                </c:pt>
+                <c:pt idx="6">
+                  <c:v>8.6666666666666715E-3</c:v>
+                </c:pt>
+                <c:pt idx="7">
+                  <c:v>1.3866666666666673E-2</c:v>
+                </c:pt>
+                <c:pt idx="8">
+                  <c:v>2.5366666666666683E-2</c:v>
+                </c:pt>
+                <c:pt idx="9">
+                  <c:v>3.2000000000000021E-2</c:v>
+                </c:pt>
+              </c:numCache>
+            </c:numRef>
+          </c:val>
+          <c:smooth val="0"/>
+          <c:extLst>
+            <c:ext xmlns:c16="http://schemas.microsoft.com/office/drawing/2014/chart" uri="{C3380CC4-5D6E-409C-BE32-E72D297353CC}">
+              <c16:uniqueId val="{00000003-6587-458D-B805-59C934F0AC73}"/>
+            </c:ext>
+          </c:extLst>
+        </c:ser>
+        <c:ser>
+          <c:idx val="0"/>
+          <c:order val="4"/>
+          <c:tx>
+            <c:v>10k</c:v>
+          </c:tx>
+          <c:spPr>
+            <a:ln w="28575" cap="rnd">
+              <a:solidFill>
+                <a:schemeClr val="accent1"/>
+              </a:solidFill>
+              <a:round/>
+            </a:ln>
+            <a:effectLst/>
+          </c:spPr>
+          <c:marker>
+            <c:symbol val="none"/>
+          </c:marker>
+          <c:errBars>
+            <c:errDir val="y"/>
+            <c:errBarType val="both"/>
+            <c:errValType val="cust"/>
+            <c:noEndCap val="0"/>
+            <c:plus>
+              <c:numRef>
+                <c:f>'results (12)'!$L$3:$L$12</c:f>
+                <c:numCache>
+                  <c:formatCode>General</c:formatCode>
+                  <c:ptCount val="10"/>
+                  <c:pt idx="0">
+                    <c:v>3.2047009452843689E-4</c:v>
+                  </c:pt>
+                  <c:pt idx="1">
+                    <c:v>2.5159180995677294E-4</c:v>
+                  </c:pt>
+                  <c:pt idx="2">
+                    <c:v>3.7764023267164193E-4</c:v>
+                  </c:pt>
+                  <c:pt idx="3">
+                    <c:v>4.7189880654699434E-4</c:v>
+                  </c:pt>
+                  <c:pt idx="4">
+                    <c:v>3.4344390713984824E-4</c:v>
+                  </c:pt>
+                  <c:pt idx="5">
+                    <c:v>2.9614634257472207E-4</c:v>
+                  </c:pt>
+                  <c:pt idx="6">
+                    <c:v>4.8987223259417474E-4</c:v>
+                  </c:pt>
+                  <c:pt idx="7">
+                    <c:v>4.2334202650675073E-4</c:v>
+                  </c:pt>
+                  <c:pt idx="8">
+                    <c:v>8.2785975352568273E-4</c:v>
+                  </c:pt>
+                  <c:pt idx="9">
+                    <c:v>9.4648726691735885E-4</c:v>
+                  </c:pt>
+                </c:numCache>
+              </c:numRef>
+            </c:plus>
+            <c:minus>
+              <c:numRef>
+                <c:f>'results (12)'!$L$3:$L$12</c:f>
+                <c:numCache>
+                  <c:formatCode>General</c:formatCode>
+                  <c:ptCount val="10"/>
+                  <c:pt idx="0">
+                    <c:v>3.2047009452843689E-4</c:v>
+                  </c:pt>
+                  <c:pt idx="1">
+                    <c:v>2.5159180995677294E-4</c:v>
+                  </c:pt>
+                  <c:pt idx="2">
+                    <c:v>3.7764023267164193E-4</c:v>
+                  </c:pt>
+                  <c:pt idx="3">
+                    <c:v>4.7189880654699434E-4</c:v>
+                  </c:pt>
+                  <c:pt idx="4">
+                    <c:v>3.4344390713984824E-4</c:v>
+                  </c:pt>
+                  <c:pt idx="5">
+                    <c:v>2.9614634257472207E-4</c:v>
+                  </c:pt>
+                  <c:pt idx="6">
+                    <c:v>4.8987223259417474E-4</c:v>
+                  </c:pt>
+                  <c:pt idx="7">
+                    <c:v>4.2334202650675073E-4</c:v>
+                  </c:pt>
+                  <c:pt idx="8">
+                    <c:v>8.2785975352568273E-4</c:v>
+                  </c:pt>
+                  <c:pt idx="9">
+                    <c:v>9.4648726691735885E-4</c:v>
+                  </c:pt>
+                </c:numCache>
+              </c:numRef>
+            </c:minus>
+            <c:spPr>
+              <a:noFill/>
+              <a:ln w="9525" cap="flat" cmpd="sng" algn="ctr">
+                <a:solidFill>
+                  <a:schemeClr val="tx1">
+                    <a:lumMod val="65000"/>
+                    <a:lumOff val="35000"/>
+                  </a:schemeClr>
+                </a:solidFill>
+                <a:round/>
+              </a:ln>
+              <a:effectLst/>
+            </c:spPr>
+          </c:errBars>
+          <c:cat>
+            <c:numRef>
+              <c:f>'results (12)'!$D$57:$D$66</c:f>
+              <c:numCache>
+                <c:formatCode>General</c:formatCode>
+                <c:ptCount val="10"/>
+                <c:pt idx="0">
+                  <c:v>32</c:v>
+                </c:pt>
+                <c:pt idx="1">
+                  <c:v>64</c:v>
+                </c:pt>
+                <c:pt idx="2">
+                  <c:v>128</c:v>
+                </c:pt>
+                <c:pt idx="3">
+                  <c:v>256</c:v>
+                </c:pt>
+                <c:pt idx="4">
+                  <c:v>512</c:v>
+                </c:pt>
+                <c:pt idx="5">
+                  <c:v>1024</c:v>
+                </c:pt>
+                <c:pt idx="6">
+                  <c:v>2048</c:v>
+                </c:pt>
+                <c:pt idx="7">
+                  <c:v>4096</c:v>
+                </c:pt>
+                <c:pt idx="8">
+                  <c:v>8192</c:v>
+                </c:pt>
+                <c:pt idx="9">
+                  <c:v>10240</c:v>
+                </c:pt>
+              </c:numCache>
+            </c:numRef>
+          </c:cat>
+          <c:val>
+            <c:numRef>
+              <c:f>'results (12)'!$E$3:$E$12</c:f>
+              <c:numCache>
+                <c:formatCode>General</c:formatCode>
+                <c:ptCount val="10"/>
+                <c:pt idx="0">
+                  <c:v>5.8666666666666693E-3</c:v>
+                </c:pt>
+                <c:pt idx="1">
+                  <c:v>4.3000000000000017E-3</c:v>
+                </c:pt>
+                <c:pt idx="2">
+                  <c:v>3.9000000000000024E-3</c:v>
+                </c:pt>
+                <c:pt idx="3">
+                  <c:v>4.400000000000002E-3</c:v>
+                </c:pt>
+                <c:pt idx="4">
+                  <c:v>4.4666666666666691E-3</c:v>
+                </c:pt>
+                <c:pt idx="5">
+                  <c:v>5.5000000000000032E-3</c:v>
+                </c:pt>
+                <c:pt idx="6">
+                  <c:v>8.5333333333333372E-3</c:v>
+                </c:pt>
+                <c:pt idx="7">
+                  <c:v>1.3500000000000009E-2</c:v>
+                </c:pt>
+                <c:pt idx="8">
+                  <c:v>2.5733333333333348E-2</c:v>
+                </c:pt>
+                <c:pt idx="9">
+                  <c:v>1.1466666666666674E-2</c:v>
+                </c:pt>
+              </c:numCache>
+            </c:numRef>
+          </c:val>
+          <c:smooth val="0"/>
+          <c:extLst>
+            <c:ext xmlns:c16="http://schemas.microsoft.com/office/drawing/2014/chart" uri="{C3380CC4-5D6E-409C-BE32-E72D297353CC}">
+              <c16:uniqueId val="{00000004-6587-458D-B805-59C934F0AC73}"/>
+            </c:ext>
+          </c:extLst>
+        </c:ser>
+        <c:dLbls>
+          <c:showLegendKey val="0"/>
+          <c:showVal val="0"/>
+          <c:showCatName val="0"/>
+          <c:showSerName val="0"/>
+          <c:showPercent val="0"/>
+          <c:showBubbleSize val="0"/>
+        </c:dLbls>
+        <c:smooth val="0"/>
+        <c:axId val="1108871408"/>
+        <c:axId val="1347960512"/>
+      </c:lineChart>
+      <c:catAx>
+        <c:axId val="1108871408"/>
+        <c:scaling>
+          <c:orientation val="minMax"/>
+        </c:scaling>
+        <c:delete val="0"/>
+        <c:axPos val="b"/>
+        <c:title>
+          <c:tx>
+            <c:rich>
+              <a:bodyPr rot="0" spcFirstLastPara="1" vertOverflow="ellipsis" vert="horz" wrap="square" anchor="ctr" anchorCtr="1"/>
+              <a:lstStyle/>
+              <a:p>
+                <a:pPr>
+                  <a:defRPr sz="1600" b="0" i="0" u="none" strike="noStrike" kern="1200" baseline="0">
+                    <a:solidFill>
+                      <a:schemeClr val="tx1">
+                        <a:lumMod val="65000"/>
+                        <a:lumOff val="35000"/>
+                      </a:schemeClr>
+                    </a:solidFill>
+                    <a:latin typeface="+mn-lt"/>
+                    <a:ea typeface="+mn-ea"/>
+                    <a:cs typeface="+mn-cs"/>
+                  </a:defRPr>
+                </a:pPr>
+                <a:r>
+                  <a:rPr lang="it-IT"/>
+                  <a:t>threads</a:t>
+                </a:r>
+              </a:p>
+            </c:rich>
+          </c:tx>
+          <c:overlay val="0"/>
+          <c:spPr>
+            <a:noFill/>
+            <a:ln>
+              <a:noFill/>
+            </a:ln>
+            <a:effectLst/>
+          </c:spPr>
+          <c:txPr>
+            <a:bodyPr rot="0" spcFirstLastPara="1" vertOverflow="ellipsis" vert="horz" wrap="square" anchor="ctr" anchorCtr="1"/>
+            <a:lstStyle/>
+            <a:p>
+              <a:pPr>
+                <a:defRPr sz="1600" b="0" i="0" u="none" strike="noStrike" kern="1200" baseline="0">
+                  <a:solidFill>
+                    <a:schemeClr val="tx1">
+                      <a:lumMod val="65000"/>
+                      <a:lumOff val="35000"/>
+                    </a:schemeClr>
+                  </a:solidFill>
+                  <a:latin typeface="+mn-lt"/>
+                  <a:ea typeface="+mn-ea"/>
+                  <a:cs typeface="+mn-cs"/>
+                </a:defRPr>
+              </a:pPr>
+              <a:endParaRPr lang="it-IT"/>
+            </a:p>
+          </c:txPr>
+        </c:title>
+        <c:numFmt formatCode="General" sourceLinked="1"/>
+        <c:majorTickMark val="none"/>
+        <c:minorTickMark val="none"/>
+        <c:tickLblPos val="nextTo"/>
+        <c:spPr>
+          <a:noFill/>
+          <a:ln w="9525" cap="flat" cmpd="sng" algn="ctr">
+            <a:solidFill>
+              <a:schemeClr val="tx1">
+                <a:lumMod val="15000"/>
+                <a:lumOff val="85000"/>
+              </a:schemeClr>
+            </a:solidFill>
+            <a:round/>
+          </a:ln>
+          <a:effectLst/>
+        </c:spPr>
+        <c:txPr>
+          <a:bodyPr rot="-60000000" spcFirstLastPara="1" vertOverflow="ellipsis" vert="horz" wrap="square" anchor="ctr" anchorCtr="1"/>
+          <a:lstStyle/>
+          <a:p>
+            <a:pPr>
+              <a:defRPr sz="1600" b="0" i="0" u="none" strike="noStrike" kern="1200" baseline="0">
+                <a:solidFill>
+                  <a:schemeClr val="tx1">
+                    <a:lumMod val="65000"/>
+                    <a:lumOff val="35000"/>
+                  </a:schemeClr>
+                </a:solidFill>
+                <a:latin typeface="+mn-lt"/>
+                <a:ea typeface="+mn-ea"/>
+                <a:cs typeface="+mn-cs"/>
+              </a:defRPr>
+            </a:pPr>
+            <a:endParaRPr lang="it-IT"/>
+          </a:p>
+        </c:txPr>
+        <c:crossAx val="1347960512"/>
+        <c:crosses val="autoZero"/>
+        <c:auto val="1"/>
+        <c:lblAlgn val="ctr"/>
+        <c:lblOffset val="100"/>
+        <c:noMultiLvlLbl val="0"/>
+      </c:catAx>
+      <c:valAx>
+        <c:axId val="1347960512"/>
+        <c:scaling>
+          <c:logBase val="10"/>
+          <c:orientation val="minMax"/>
+        </c:scaling>
+        <c:delete val="0"/>
+        <c:axPos val="l"/>
+        <c:majorGridlines>
+          <c:spPr>
+            <a:ln w="9525" cap="flat" cmpd="sng" algn="ctr">
+              <a:solidFill>
+                <a:schemeClr val="tx1">
+                  <a:lumMod val="15000"/>
+                  <a:lumOff val="85000"/>
+                </a:schemeClr>
+              </a:solidFill>
+              <a:round/>
+            </a:ln>
+            <a:effectLst/>
+          </c:spPr>
+        </c:majorGridlines>
+        <c:title>
+          <c:tx>
+            <c:rich>
+              <a:bodyPr rot="-5400000" spcFirstLastPara="1" vertOverflow="ellipsis" vert="horz" wrap="square" anchor="ctr" anchorCtr="1"/>
+              <a:lstStyle/>
+              <a:p>
+                <a:pPr>
+                  <a:defRPr sz="1600" b="0" i="0" u="none" strike="noStrike" kern="1200" baseline="0">
+                    <a:solidFill>
+                      <a:schemeClr val="tx1">
+                        <a:lumMod val="65000"/>
+                        <a:lumOff val="35000"/>
+                      </a:schemeClr>
+                    </a:solidFill>
+                    <a:latin typeface="+mn-lt"/>
+                    <a:ea typeface="+mn-ea"/>
+                    <a:cs typeface="+mn-cs"/>
+                  </a:defRPr>
+                </a:pPr>
+                <a:r>
+                  <a:rPr lang="it-IT"/>
+                  <a:t>seconds</a:t>
+                </a:r>
+              </a:p>
+            </c:rich>
+          </c:tx>
+          <c:overlay val="0"/>
+          <c:spPr>
+            <a:noFill/>
+            <a:ln>
+              <a:noFill/>
+            </a:ln>
+            <a:effectLst/>
+          </c:spPr>
+          <c:txPr>
+            <a:bodyPr rot="-5400000" spcFirstLastPara="1" vertOverflow="ellipsis" vert="horz" wrap="square" anchor="ctr" anchorCtr="1"/>
+            <a:lstStyle/>
+            <a:p>
+              <a:pPr>
+                <a:defRPr sz="1600" b="0" i="0" u="none" strike="noStrike" kern="1200" baseline="0">
+                  <a:solidFill>
+                    <a:schemeClr val="tx1">
+                      <a:lumMod val="65000"/>
+                      <a:lumOff val="35000"/>
+                    </a:schemeClr>
+                  </a:solidFill>
+                  <a:latin typeface="+mn-lt"/>
+                  <a:ea typeface="+mn-ea"/>
+                  <a:cs typeface="+mn-cs"/>
+                </a:defRPr>
+              </a:pPr>
+              <a:endParaRPr lang="it-IT"/>
+            </a:p>
+          </c:txPr>
+        </c:title>
+        <c:numFmt formatCode="General" sourceLinked="1"/>
+        <c:majorTickMark val="none"/>
+        <c:minorTickMark val="none"/>
+        <c:tickLblPos val="nextTo"/>
+        <c:spPr>
+          <a:noFill/>
+          <a:ln>
+            <a:noFill/>
+          </a:ln>
+          <a:effectLst/>
+        </c:spPr>
+        <c:txPr>
+          <a:bodyPr rot="-60000000" spcFirstLastPara="1" vertOverflow="ellipsis" vert="horz" wrap="square" anchor="ctr" anchorCtr="1"/>
+          <a:lstStyle/>
+          <a:p>
+            <a:pPr>
+              <a:defRPr sz="1600" b="0" i="0" u="none" strike="noStrike" kern="1200" baseline="0">
+                <a:solidFill>
+                  <a:schemeClr val="tx1">
+                    <a:lumMod val="65000"/>
+                    <a:lumOff val="35000"/>
+                  </a:schemeClr>
+                </a:solidFill>
+                <a:latin typeface="+mn-lt"/>
+                <a:ea typeface="+mn-ea"/>
+                <a:cs typeface="+mn-cs"/>
+              </a:defRPr>
+            </a:pPr>
+            <a:endParaRPr lang="it-IT"/>
+          </a:p>
+        </c:txPr>
+        <c:crossAx val="1108871408"/>
+        <c:crosses val="autoZero"/>
+        <c:crossBetween val="between"/>
+      </c:valAx>
+      <c:spPr>
+        <a:noFill/>
+        <a:ln>
+          <a:noFill/>
+        </a:ln>
+        <a:effectLst/>
+      </c:spPr>
+    </c:plotArea>
+    <c:legend>
+      <c:legendPos val="r"/>
+      <c:overlay val="0"/>
+      <c:spPr>
+        <a:noFill/>
+        <a:ln>
+          <a:noFill/>
+        </a:ln>
+        <a:effectLst/>
+      </c:spPr>
+      <c:txPr>
+        <a:bodyPr rot="0" spcFirstLastPara="1" vertOverflow="ellipsis" vert="horz" wrap="square" anchor="ctr" anchorCtr="1"/>
+        <a:lstStyle/>
+        <a:p>
+          <a:pPr>
+            <a:defRPr sz="1600" b="0" i="0" u="none" strike="noStrike" kern="1200" baseline="0">
+              <a:solidFill>
+                <a:schemeClr val="tx1">
+                  <a:lumMod val="65000"/>
+                  <a:lumOff val="35000"/>
+                </a:schemeClr>
+              </a:solidFill>
+              <a:latin typeface="+mn-lt"/>
+              <a:ea typeface="+mn-ea"/>
+              <a:cs typeface="+mn-cs"/>
+            </a:defRPr>
+          </a:pPr>
+          <a:endParaRPr lang="it-IT"/>
+        </a:p>
+      </c:txPr>
+    </c:legend>
+    <c:plotVisOnly val="1"/>
+    <c:dispBlanksAs val="gap"/>
+    <c:extLst>
+      <c:ext xmlns:c16r3="http://schemas.microsoft.com/office/drawing/2017/03/chart" uri="{56B9EC1D-385E-4148-901F-78D8002777C0}">
+        <c16r3:dataDisplayOptions16>
+          <c16r3:dispNaAsBlank val="1"/>
+        </c16r3:dataDisplayOptions16>
+      </c:ext>
+    </c:extLst>
+    <c:showDLblsOverMax val="0"/>
+  </c:chart>
+  <c:spPr>
+    <a:noFill/>
+    <a:ln>
+      <a:noFill/>
+    </a:ln>
+    <a:effectLst/>
+  </c:spPr>
+  <c:txPr>
+    <a:bodyPr/>
+    <a:lstStyle/>
+    <a:p>
+      <a:pPr>
+        <a:defRPr sz="1600"/>
+      </a:pPr>
+      <a:endParaRPr lang="it-IT"/>
+    </a:p>
+  </c:txPr>
+  <c:externalData r:id="rId3">
+    <c:autoUpdate val="0"/>
+  </c:externalData>
+</c:chartSpace>
+</file>
+
 <file path=ppt/charts/colors1.xml><?xml version="1.0" encoding="utf-8"?>
+<cs:colorStyle xmlns:cs="http://schemas.microsoft.com/office/drawing/2012/chartStyle" xmlns:a="http://schemas.openxmlformats.org/drawingml/2006/main" meth="cycle" id="10">
+  <a:schemeClr val="accent1"/>
+  <a:schemeClr val="accent2"/>
+  <a:schemeClr val="accent3"/>
+  <a:schemeClr val="accent4"/>
+  <a:schemeClr val="accent5"/>
+  <a:schemeClr val="accent6"/>
+  <cs:variation/>
+  <cs:variation>
+    <a:lumMod val="60000"/>
+  </cs:variation>
+  <cs:variation>
+    <a:lumMod val="80000"/>
+    <a:lumOff val="20000"/>
+  </cs:variation>
+  <cs:variation>
+    <a:lumMod val="80000"/>
+  </cs:variation>
+  <cs:variation>
+    <a:lumMod val="60000"/>
+    <a:lumOff val="40000"/>
+  </cs:variation>
+  <cs:variation>
+    <a:lumMod val="50000"/>
+  </cs:variation>
+  <cs:variation>
+    <a:lumMod val="70000"/>
+    <a:lumOff val="30000"/>
+  </cs:variation>
+  <cs:variation>
+    <a:lumMod val="70000"/>
+  </cs:variation>
+  <cs:variation>
+    <a:lumMod val="50000"/>
+    <a:lumOff val="50000"/>
+  </cs:variation>
+</cs:colorStyle>
+</file>
+
+<file path=ppt/charts/colors10.xml><?xml version="1.0" encoding="utf-8"?>
 <cs:colorStyle xmlns:cs="http://schemas.microsoft.com/office/drawing/2012/chartStyle" xmlns:a="http://schemas.openxmlformats.org/drawingml/2006/main" meth="cycle" id="10">
   <a:schemeClr val="accent1"/>
   <a:schemeClr val="accent2"/>
@@ -6733,6 +9045,46 @@
 </cs:colorStyle>
 </file>
 
+<file path=ppt/charts/colors9.xml><?xml version="1.0" encoding="utf-8"?>
+<cs:colorStyle xmlns:cs="http://schemas.microsoft.com/office/drawing/2012/chartStyle" xmlns:a="http://schemas.openxmlformats.org/drawingml/2006/main" meth="cycle" id="10">
+  <a:schemeClr val="accent1"/>
+  <a:schemeClr val="accent2"/>
+  <a:schemeClr val="accent3"/>
+  <a:schemeClr val="accent4"/>
+  <a:schemeClr val="accent5"/>
+  <a:schemeClr val="accent6"/>
+  <cs:variation/>
+  <cs:variation>
+    <a:lumMod val="60000"/>
+  </cs:variation>
+  <cs:variation>
+    <a:lumMod val="80000"/>
+    <a:lumOff val="20000"/>
+  </cs:variation>
+  <cs:variation>
+    <a:lumMod val="80000"/>
+  </cs:variation>
+  <cs:variation>
+    <a:lumMod val="60000"/>
+    <a:lumOff val="40000"/>
+  </cs:variation>
+  <cs:variation>
+    <a:lumMod val="50000"/>
+  </cs:variation>
+  <cs:variation>
+    <a:lumMod val="70000"/>
+    <a:lumOff val="30000"/>
+  </cs:variation>
+  <cs:variation>
+    <a:lumMod val="70000"/>
+  </cs:variation>
+  <cs:variation>
+    <a:lumMod val="50000"/>
+    <a:lumOff val="50000"/>
+  </cs:variation>
+</cs:colorStyle>
+</file>
+
 <file path=ppt/charts/style1.xml><?xml version="1.0" encoding="utf-8"?>
 <cs:chartStyle xmlns:cs="http://schemas.microsoft.com/office/drawing/2012/chartStyle" xmlns:a="http://schemas.openxmlformats.org/drawingml/2006/main" id="227">
   <cs:axisTitle>
@@ -7249,7 +9601,7 @@
 </cs:chartStyle>
 </file>
 
-<file path=ppt/charts/style2.xml><?xml version="1.0" encoding="utf-8"?>
+<file path=ppt/charts/style10.xml><?xml version="1.0" encoding="utf-8"?>
 <cs:chartStyle xmlns:cs="http://schemas.microsoft.com/office/drawing/2012/chartStyle" xmlns:a="http://schemas.openxmlformats.org/drawingml/2006/main" id="227">
   <cs:axisTitle>
     <cs:lnRef idx="0"/>
@@ -7765,7 +10117,7 @@
 </cs:chartStyle>
 </file>
 
-<file path=ppt/charts/style3.xml><?xml version="1.0" encoding="utf-8"?>
+<file path=ppt/charts/style2.xml><?xml version="1.0" encoding="utf-8"?>
 <cs:chartStyle xmlns:cs="http://schemas.microsoft.com/office/drawing/2012/chartStyle" xmlns:a="http://schemas.openxmlformats.org/drawingml/2006/main" id="227">
   <cs:axisTitle>
     <cs:lnRef idx="0"/>
@@ -8281,7 +10633,7 @@
 </cs:chartStyle>
 </file>
 
-<file path=ppt/charts/style4.xml><?xml version="1.0" encoding="utf-8"?>
+<file path=ppt/charts/style3.xml><?xml version="1.0" encoding="utf-8"?>
 <cs:chartStyle xmlns:cs="http://schemas.microsoft.com/office/drawing/2012/chartStyle" xmlns:a="http://schemas.openxmlformats.org/drawingml/2006/main" id="227">
   <cs:axisTitle>
     <cs:lnRef idx="0"/>
@@ -8797,7 +11149,7 @@
 </cs:chartStyle>
 </file>
 
-<file path=ppt/charts/style5.xml><?xml version="1.0" encoding="utf-8"?>
+<file path=ppt/charts/style4.xml><?xml version="1.0" encoding="utf-8"?>
 <cs:chartStyle xmlns:cs="http://schemas.microsoft.com/office/drawing/2012/chartStyle" xmlns:a="http://schemas.openxmlformats.org/drawingml/2006/main" id="227">
   <cs:axisTitle>
     <cs:lnRef idx="0"/>
@@ -9313,8 +11665,8 @@
 </cs:chartStyle>
 </file>
 
-<file path=ppt/charts/style6.xml><?xml version="1.0" encoding="utf-8"?>
-<cs:chartStyle xmlns:cs="http://schemas.microsoft.com/office/drawing/2012/chartStyle" xmlns:a="http://schemas.openxmlformats.org/drawingml/2006/main" id="297">
+<file path=ppt/charts/style5.xml><?xml version="1.0" encoding="utf-8"?>
+<cs:chartStyle xmlns:cs="http://schemas.microsoft.com/office/drawing/2012/chartStyle" xmlns:a="http://schemas.openxmlformats.org/drawingml/2006/main" id="227">
   <cs:axisTitle>
     <cs:lnRef idx="0"/>
     <cs:fillRef idx="0"/>
@@ -9422,6 +11774,11 @@
     <cs:fontRef idx="minor">
       <a:schemeClr val="tx1"/>
     </cs:fontRef>
+    <cs:spPr>
+      <a:solidFill>
+        <a:schemeClr val="phClr"/>
+      </a:solidFill>
+    </cs:spPr>
   </cs:dataPoint>
   <cs:dataPoint3D>
     <cs:lnRef idx="0"/>
@@ -9432,6 +11789,11 @@
     <cs:fontRef idx="minor">
       <a:schemeClr val="tx1"/>
     </cs:fontRef>
+    <cs:spPr>
+      <a:solidFill>
+        <a:schemeClr val="phClr"/>
+      </a:solidFill>
+    </cs:spPr>
   </cs:dataPoint3D>
   <cs:dataPointLine>
     <cs:lnRef idx="0">
@@ -9463,6 +11825,9 @@
       <a:schemeClr val="tx1"/>
     </cs:fontRef>
     <cs:spPr>
+      <a:solidFill>
+        <a:schemeClr val="phClr"/>
+      </a:solidFill>
       <a:ln w="9525">
         <a:solidFill>
           <a:schemeClr val="phClr"/>
@@ -9518,23 +11883,22 @@
     <cs:fillRef idx="0"/>
     <cs:effectRef idx="0"/>
     <cs:fontRef idx="minor">
-      <a:schemeClr val="tx1"/>
+      <a:schemeClr val="dk1"/>
     </cs:fontRef>
     <cs:spPr>
       <a:solidFill>
         <a:schemeClr val="dk1">
-          <a:lumMod val="75000"/>
-          <a:lumOff val="25000"/>
+          <a:lumMod val="65000"/>
+          <a:lumOff val="35000"/>
         </a:schemeClr>
       </a:solidFill>
-      <a:ln w="9525" cap="flat" cmpd="sng" algn="ctr">
+      <a:ln w="9525">
         <a:solidFill>
           <a:schemeClr val="tx1">
             <a:lumMod val="65000"/>
             <a:lumOff val="35000"/>
           </a:schemeClr>
         </a:solidFill>
-        <a:round/>
       </a:ln>
     </cs:spPr>
   </cs:downBar>
@@ -9639,8 +12003,8 @@
       <a:ln w="9525" cap="flat" cmpd="sng" algn="ctr">
         <a:solidFill>
           <a:schemeClr val="tx1">
-            <a:lumMod val="50000"/>
-            <a:lumOff val="50000"/>
+            <a:lumMod val="75000"/>
+            <a:lumOff val="25000"/>
           </a:schemeClr>
         </a:solidFill>
         <a:round/>
@@ -9772,20 +12136,19 @@
     <cs:fillRef idx="0"/>
     <cs:effectRef idx="0"/>
     <cs:fontRef idx="minor">
-      <a:schemeClr val="tx1"/>
+      <a:schemeClr val="dk1"/>
     </cs:fontRef>
     <cs:spPr>
       <a:solidFill>
         <a:schemeClr val="lt1"/>
       </a:solidFill>
-      <a:ln w="9525" cap="flat" cmpd="sng" algn="ctr">
+      <a:ln w="9525">
         <a:solidFill>
           <a:schemeClr val="tx1">
-            <a:lumMod val="65000"/>
-            <a:lumOff val="35000"/>
+            <a:lumMod val="15000"/>
+            <a:lumOff val="85000"/>
           </a:schemeClr>
         </a:solidFill>
-        <a:round/>
       </a:ln>
     </cs:spPr>
   </cs:upBar>
@@ -9818,8 +12181,8 @@
 </cs:chartStyle>
 </file>
 
-<file path=ppt/charts/style7.xml><?xml version="1.0" encoding="utf-8"?>
-<cs:chartStyle xmlns:cs="http://schemas.microsoft.com/office/drawing/2012/chartStyle" xmlns:a="http://schemas.openxmlformats.org/drawingml/2006/main" id="227">
+<file path=ppt/charts/style6.xml><?xml version="1.0" encoding="utf-8"?>
+<cs:chartStyle xmlns:cs="http://schemas.microsoft.com/office/drawing/2012/chartStyle" xmlns:a="http://schemas.openxmlformats.org/drawingml/2006/main" id="297">
   <cs:axisTitle>
     <cs:lnRef idx="0"/>
     <cs:fillRef idx="0"/>
@@ -9927,6 +12290,511 @@
     <cs:fontRef idx="minor">
       <a:schemeClr val="tx1"/>
     </cs:fontRef>
+  </cs:dataPoint>
+  <cs:dataPoint3D>
+    <cs:lnRef idx="0"/>
+    <cs:fillRef idx="1">
+      <cs:styleClr val="auto"/>
+    </cs:fillRef>
+    <cs:effectRef idx="0"/>
+    <cs:fontRef idx="minor">
+      <a:schemeClr val="tx1"/>
+    </cs:fontRef>
+  </cs:dataPoint3D>
+  <cs:dataPointLine>
+    <cs:lnRef idx="0">
+      <cs:styleClr val="auto"/>
+    </cs:lnRef>
+    <cs:fillRef idx="1"/>
+    <cs:effectRef idx="0"/>
+    <cs:fontRef idx="minor">
+      <a:schemeClr val="tx1"/>
+    </cs:fontRef>
+    <cs:spPr>
+      <a:ln w="28575" cap="rnd">
+        <a:solidFill>
+          <a:schemeClr val="phClr"/>
+        </a:solidFill>
+        <a:round/>
+      </a:ln>
+    </cs:spPr>
+  </cs:dataPointLine>
+  <cs:dataPointMarker>
+    <cs:lnRef idx="0">
+      <cs:styleClr val="auto"/>
+    </cs:lnRef>
+    <cs:fillRef idx="1">
+      <cs:styleClr val="auto"/>
+    </cs:fillRef>
+    <cs:effectRef idx="0"/>
+    <cs:fontRef idx="minor">
+      <a:schemeClr val="tx1"/>
+    </cs:fontRef>
+    <cs:spPr>
+      <a:ln w="9525">
+        <a:solidFill>
+          <a:schemeClr val="phClr"/>
+        </a:solidFill>
+      </a:ln>
+    </cs:spPr>
+  </cs:dataPointMarker>
+  <cs:dataPointMarkerLayout symbol="circle" size="5"/>
+  <cs:dataPointWireframe>
+    <cs:lnRef idx="0">
+      <cs:styleClr val="auto"/>
+    </cs:lnRef>
+    <cs:fillRef idx="1"/>
+    <cs:effectRef idx="0"/>
+    <cs:fontRef idx="minor">
+      <a:schemeClr val="tx1"/>
+    </cs:fontRef>
+    <cs:spPr>
+      <a:ln w="9525" cap="rnd">
+        <a:solidFill>
+          <a:schemeClr val="phClr"/>
+        </a:solidFill>
+        <a:round/>
+      </a:ln>
+    </cs:spPr>
+  </cs:dataPointWireframe>
+  <cs:dataTable>
+    <cs:lnRef idx="0"/>
+    <cs:fillRef idx="0"/>
+    <cs:effectRef idx="0"/>
+    <cs:fontRef idx="minor">
+      <a:schemeClr val="tx1">
+        <a:lumMod val="65000"/>
+        <a:lumOff val="35000"/>
+      </a:schemeClr>
+    </cs:fontRef>
+    <cs:spPr>
+      <a:noFill/>
+      <a:ln w="9525" cap="flat" cmpd="sng" algn="ctr">
+        <a:solidFill>
+          <a:schemeClr val="tx1">
+            <a:lumMod val="15000"/>
+            <a:lumOff val="85000"/>
+          </a:schemeClr>
+        </a:solidFill>
+        <a:round/>
+      </a:ln>
+    </cs:spPr>
+    <cs:defRPr sz="900" kern="1200"/>
+  </cs:dataTable>
+  <cs:downBar>
+    <cs:lnRef idx="0"/>
+    <cs:fillRef idx="0"/>
+    <cs:effectRef idx="0"/>
+    <cs:fontRef idx="minor">
+      <a:schemeClr val="tx1"/>
+    </cs:fontRef>
+    <cs:spPr>
+      <a:solidFill>
+        <a:schemeClr val="dk1">
+          <a:lumMod val="75000"/>
+          <a:lumOff val="25000"/>
+        </a:schemeClr>
+      </a:solidFill>
+      <a:ln w="9525" cap="flat" cmpd="sng" algn="ctr">
+        <a:solidFill>
+          <a:schemeClr val="tx1">
+            <a:lumMod val="65000"/>
+            <a:lumOff val="35000"/>
+          </a:schemeClr>
+        </a:solidFill>
+        <a:round/>
+      </a:ln>
+    </cs:spPr>
+  </cs:downBar>
+  <cs:dropLine>
+    <cs:lnRef idx="0"/>
+    <cs:fillRef idx="0"/>
+    <cs:effectRef idx="0"/>
+    <cs:fontRef idx="minor">
+      <a:schemeClr val="tx1"/>
+    </cs:fontRef>
+    <cs:spPr>
+      <a:ln w="9525" cap="flat" cmpd="sng" algn="ctr">
+        <a:solidFill>
+          <a:schemeClr val="tx1">
+            <a:lumMod val="35000"/>
+            <a:lumOff val="65000"/>
+          </a:schemeClr>
+        </a:solidFill>
+        <a:round/>
+      </a:ln>
+    </cs:spPr>
+  </cs:dropLine>
+  <cs:errorBar>
+    <cs:lnRef idx="0"/>
+    <cs:fillRef idx="0"/>
+    <cs:effectRef idx="0"/>
+    <cs:fontRef idx="minor">
+      <a:schemeClr val="tx1"/>
+    </cs:fontRef>
+    <cs:spPr>
+      <a:ln w="9525" cap="flat" cmpd="sng" algn="ctr">
+        <a:solidFill>
+          <a:schemeClr val="tx1">
+            <a:lumMod val="65000"/>
+            <a:lumOff val="35000"/>
+          </a:schemeClr>
+        </a:solidFill>
+        <a:round/>
+      </a:ln>
+    </cs:spPr>
+  </cs:errorBar>
+  <cs:floor>
+    <cs:lnRef idx="0"/>
+    <cs:fillRef idx="0"/>
+    <cs:effectRef idx="0"/>
+    <cs:fontRef idx="minor">
+      <a:schemeClr val="tx1"/>
+    </cs:fontRef>
+    <cs:spPr>
+      <a:noFill/>
+      <a:ln>
+        <a:noFill/>
+      </a:ln>
+    </cs:spPr>
+  </cs:floor>
+  <cs:gridlineMajor>
+    <cs:lnRef idx="0"/>
+    <cs:fillRef idx="0"/>
+    <cs:effectRef idx="0"/>
+    <cs:fontRef idx="minor">
+      <a:schemeClr val="tx1"/>
+    </cs:fontRef>
+    <cs:spPr>
+      <a:ln w="9525" cap="flat" cmpd="sng" algn="ctr">
+        <a:solidFill>
+          <a:schemeClr val="tx1">
+            <a:lumMod val="15000"/>
+            <a:lumOff val="85000"/>
+          </a:schemeClr>
+        </a:solidFill>
+        <a:round/>
+      </a:ln>
+    </cs:spPr>
+  </cs:gridlineMajor>
+  <cs:gridlineMinor>
+    <cs:lnRef idx="0"/>
+    <cs:fillRef idx="0"/>
+    <cs:effectRef idx="0"/>
+    <cs:fontRef idx="minor">
+      <a:schemeClr val="tx1"/>
+    </cs:fontRef>
+    <cs:spPr>
+      <a:ln w="9525" cap="flat" cmpd="sng" algn="ctr">
+        <a:solidFill>
+          <a:schemeClr val="tx1">
+            <a:lumMod val="5000"/>
+            <a:lumOff val="95000"/>
+          </a:schemeClr>
+        </a:solidFill>
+        <a:round/>
+      </a:ln>
+    </cs:spPr>
+  </cs:gridlineMinor>
+  <cs:hiLoLine>
+    <cs:lnRef idx="0"/>
+    <cs:fillRef idx="0"/>
+    <cs:effectRef idx="0"/>
+    <cs:fontRef idx="minor">
+      <a:schemeClr val="tx1"/>
+    </cs:fontRef>
+    <cs:spPr>
+      <a:ln w="9525" cap="flat" cmpd="sng" algn="ctr">
+        <a:solidFill>
+          <a:schemeClr val="tx1">
+            <a:lumMod val="50000"/>
+            <a:lumOff val="50000"/>
+          </a:schemeClr>
+        </a:solidFill>
+        <a:round/>
+      </a:ln>
+    </cs:spPr>
+  </cs:hiLoLine>
+  <cs:leaderLine>
+    <cs:lnRef idx="0"/>
+    <cs:fillRef idx="0"/>
+    <cs:effectRef idx="0"/>
+    <cs:fontRef idx="minor">
+      <a:schemeClr val="tx1"/>
+    </cs:fontRef>
+    <cs:spPr>
+      <a:ln w="9525" cap="flat" cmpd="sng" algn="ctr">
+        <a:solidFill>
+          <a:schemeClr val="tx1">
+            <a:lumMod val="35000"/>
+            <a:lumOff val="65000"/>
+          </a:schemeClr>
+        </a:solidFill>
+        <a:round/>
+      </a:ln>
+    </cs:spPr>
+  </cs:leaderLine>
+  <cs:legend>
+    <cs:lnRef idx="0"/>
+    <cs:fillRef idx="0"/>
+    <cs:effectRef idx="0"/>
+    <cs:fontRef idx="minor">
+      <a:schemeClr val="tx1">
+        <a:lumMod val="65000"/>
+        <a:lumOff val="35000"/>
+      </a:schemeClr>
+    </cs:fontRef>
+    <cs:defRPr sz="900" kern="1200"/>
+  </cs:legend>
+  <cs:plotArea mods="allowNoFillOverride allowNoLineOverride">
+    <cs:lnRef idx="0"/>
+    <cs:fillRef idx="0"/>
+    <cs:effectRef idx="0"/>
+    <cs:fontRef idx="minor">
+      <a:schemeClr val="tx1"/>
+    </cs:fontRef>
+  </cs:plotArea>
+  <cs:plotArea3D mods="allowNoFillOverride allowNoLineOverride">
+    <cs:lnRef idx="0"/>
+    <cs:fillRef idx="0"/>
+    <cs:effectRef idx="0"/>
+    <cs:fontRef idx="minor">
+      <a:schemeClr val="tx1"/>
+    </cs:fontRef>
+  </cs:plotArea3D>
+  <cs:seriesAxis>
+    <cs:lnRef idx="0"/>
+    <cs:fillRef idx="0"/>
+    <cs:effectRef idx="0"/>
+    <cs:fontRef idx="minor">
+      <a:schemeClr val="tx1">
+        <a:lumMod val="65000"/>
+        <a:lumOff val="35000"/>
+      </a:schemeClr>
+    </cs:fontRef>
+    <cs:defRPr sz="900" kern="1200"/>
+  </cs:seriesAxis>
+  <cs:seriesLine>
+    <cs:lnRef idx="0"/>
+    <cs:fillRef idx="0"/>
+    <cs:effectRef idx="0"/>
+    <cs:fontRef idx="minor">
+      <a:schemeClr val="tx1"/>
+    </cs:fontRef>
+    <cs:spPr>
+      <a:ln w="9525" cap="flat" cmpd="sng" algn="ctr">
+        <a:solidFill>
+          <a:schemeClr val="tx1">
+            <a:lumMod val="35000"/>
+            <a:lumOff val="65000"/>
+          </a:schemeClr>
+        </a:solidFill>
+        <a:round/>
+      </a:ln>
+    </cs:spPr>
+  </cs:seriesLine>
+  <cs:title>
+    <cs:lnRef idx="0"/>
+    <cs:fillRef idx="0"/>
+    <cs:effectRef idx="0"/>
+    <cs:fontRef idx="minor">
+      <a:schemeClr val="tx1">
+        <a:lumMod val="65000"/>
+        <a:lumOff val="35000"/>
+      </a:schemeClr>
+    </cs:fontRef>
+    <cs:defRPr sz="1400" b="0" kern="1200" spc="0" baseline="0"/>
+  </cs:title>
+  <cs:trendline>
+    <cs:lnRef idx="0">
+      <cs:styleClr val="auto"/>
+    </cs:lnRef>
+    <cs:fillRef idx="0"/>
+    <cs:effectRef idx="0"/>
+    <cs:fontRef idx="minor">
+      <a:schemeClr val="tx1"/>
+    </cs:fontRef>
+    <cs:spPr>
+      <a:ln w="19050" cap="rnd">
+        <a:solidFill>
+          <a:schemeClr val="phClr"/>
+        </a:solidFill>
+        <a:prstDash val="sysDot"/>
+      </a:ln>
+    </cs:spPr>
+  </cs:trendline>
+  <cs:trendlineLabel>
+    <cs:lnRef idx="0"/>
+    <cs:fillRef idx="0"/>
+    <cs:effectRef idx="0"/>
+    <cs:fontRef idx="minor">
+      <a:schemeClr val="tx1">
+        <a:lumMod val="65000"/>
+        <a:lumOff val="35000"/>
+      </a:schemeClr>
+    </cs:fontRef>
+    <cs:defRPr sz="900" kern="1200"/>
+  </cs:trendlineLabel>
+  <cs:upBar>
+    <cs:lnRef idx="0"/>
+    <cs:fillRef idx="0"/>
+    <cs:effectRef idx="0"/>
+    <cs:fontRef idx="minor">
+      <a:schemeClr val="tx1"/>
+    </cs:fontRef>
+    <cs:spPr>
+      <a:solidFill>
+        <a:schemeClr val="lt1"/>
+      </a:solidFill>
+      <a:ln w="9525" cap="flat" cmpd="sng" algn="ctr">
+        <a:solidFill>
+          <a:schemeClr val="tx1">
+            <a:lumMod val="65000"/>
+            <a:lumOff val="35000"/>
+          </a:schemeClr>
+        </a:solidFill>
+        <a:round/>
+      </a:ln>
+    </cs:spPr>
+  </cs:upBar>
+  <cs:valueAxis>
+    <cs:lnRef idx="0"/>
+    <cs:fillRef idx="0"/>
+    <cs:effectRef idx="0"/>
+    <cs:fontRef idx="minor">
+      <a:schemeClr val="tx1">
+        <a:lumMod val="65000"/>
+        <a:lumOff val="35000"/>
+      </a:schemeClr>
+    </cs:fontRef>
+    <cs:defRPr sz="900" kern="1200"/>
+  </cs:valueAxis>
+  <cs:wall>
+    <cs:lnRef idx="0"/>
+    <cs:fillRef idx="0"/>
+    <cs:effectRef idx="0"/>
+    <cs:fontRef idx="minor">
+      <a:schemeClr val="tx1"/>
+    </cs:fontRef>
+    <cs:spPr>
+      <a:noFill/>
+      <a:ln>
+        <a:noFill/>
+      </a:ln>
+    </cs:spPr>
+  </cs:wall>
+</cs:chartStyle>
+</file>
+
+<file path=ppt/charts/style7.xml><?xml version="1.0" encoding="utf-8"?>
+<cs:chartStyle xmlns:cs="http://schemas.microsoft.com/office/drawing/2012/chartStyle" xmlns:a="http://schemas.openxmlformats.org/drawingml/2006/main" id="227">
+  <cs:axisTitle>
+    <cs:lnRef idx="0"/>
+    <cs:fillRef idx="0"/>
+    <cs:effectRef idx="0"/>
+    <cs:fontRef idx="minor">
+      <a:schemeClr val="tx1">
+        <a:lumMod val="65000"/>
+        <a:lumOff val="35000"/>
+      </a:schemeClr>
+    </cs:fontRef>
+    <cs:defRPr sz="1000" kern="1200"/>
+  </cs:axisTitle>
+  <cs:categoryAxis>
+    <cs:lnRef idx="0"/>
+    <cs:fillRef idx="0"/>
+    <cs:effectRef idx="0"/>
+    <cs:fontRef idx="minor">
+      <a:schemeClr val="tx1">
+        <a:lumMod val="65000"/>
+        <a:lumOff val="35000"/>
+      </a:schemeClr>
+    </cs:fontRef>
+    <cs:spPr>
+      <a:ln w="9525" cap="flat" cmpd="sng" algn="ctr">
+        <a:solidFill>
+          <a:schemeClr val="tx1">
+            <a:lumMod val="15000"/>
+            <a:lumOff val="85000"/>
+          </a:schemeClr>
+        </a:solidFill>
+        <a:round/>
+      </a:ln>
+    </cs:spPr>
+    <cs:defRPr sz="900" kern="1200"/>
+  </cs:categoryAxis>
+  <cs:chartArea mods="allowNoFillOverride allowNoLineOverride">
+    <cs:lnRef idx="0"/>
+    <cs:fillRef idx="0"/>
+    <cs:effectRef idx="0"/>
+    <cs:fontRef idx="minor">
+      <a:schemeClr val="tx1"/>
+    </cs:fontRef>
+    <cs:spPr>
+      <a:solidFill>
+        <a:schemeClr val="bg1"/>
+      </a:solidFill>
+      <a:ln w="9525" cap="flat" cmpd="sng" algn="ctr">
+        <a:solidFill>
+          <a:schemeClr val="tx1">
+            <a:lumMod val="15000"/>
+            <a:lumOff val="85000"/>
+          </a:schemeClr>
+        </a:solidFill>
+        <a:round/>
+      </a:ln>
+    </cs:spPr>
+    <cs:defRPr sz="1000" kern="1200"/>
+  </cs:chartArea>
+  <cs:dataLabel>
+    <cs:lnRef idx="0"/>
+    <cs:fillRef idx="0"/>
+    <cs:effectRef idx="0"/>
+    <cs:fontRef idx="minor">
+      <a:schemeClr val="tx1">
+        <a:lumMod val="75000"/>
+        <a:lumOff val="25000"/>
+      </a:schemeClr>
+    </cs:fontRef>
+    <cs:defRPr sz="900" kern="1200"/>
+  </cs:dataLabel>
+  <cs:dataLabelCallout>
+    <cs:lnRef idx="0"/>
+    <cs:fillRef idx="0"/>
+    <cs:effectRef idx="0"/>
+    <cs:fontRef idx="minor">
+      <a:schemeClr val="dk1">
+        <a:lumMod val="65000"/>
+        <a:lumOff val="35000"/>
+      </a:schemeClr>
+    </cs:fontRef>
+    <cs:spPr>
+      <a:solidFill>
+        <a:schemeClr val="lt1"/>
+      </a:solidFill>
+      <a:ln>
+        <a:solidFill>
+          <a:schemeClr val="dk1">
+            <a:lumMod val="25000"/>
+            <a:lumOff val="75000"/>
+          </a:schemeClr>
+        </a:solidFill>
+      </a:ln>
+    </cs:spPr>
+    <cs:defRPr sz="900" kern="1200"/>
+    <cs:bodyPr rot="0" spcFirstLastPara="1" vertOverflow="clip" horzOverflow="clip" vert="horz" wrap="square" lIns="36576" tIns="18288" rIns="36576" bIns="18288" anchor="ctr" anchorCtr="1">
+      <a:spAutoFit/>
+    </cs:bodyPr>
+  </cs:dataLabelCallout>
+  <cs:dataPoint>
+    <cs:lnRef idx="0"/>
+    <cs:fillRef idx="1">
+      <cs:styleClr val="auto"/>
+    </cs:fillRef>
+    <cs:effectRef idx="0"/>
+    <cs:fontRef idx="minor">
+      <a:schemeClr val="tx1"/>
+    </cs:fontRef>
     <cs:spPr>
       <a:solidFill>
         <a:schemeClr val="phClr"/>
@@ -10335,6 +13203,522 @@
 </file>
 
 <file path=ppt/charts/style8.xml><?xml version="1.0" encoding="utf-8"?>
+<cs:chartStyle xmlns:cs="http://schemas.microsoft.com/office/drawing/2012/chartStyle" xmlns:a="http://schemas.openxmlformats.org/drawingml/2006/main" id="227">
+  <cs:axisTitle>
+    <cs:lnRef idx="0"/>
+    <cs:fillRef idx="0"/>
+    <cs:effectRef idx="0"/>
+    <cs:fontRef idx="minor">
+      <a:schemeClr val="tx1">
+        <a:lumMod val="65000"/>
+        <a:lumOff val="35000"/>
+      </a:schemeClr>
+    </cs:fontRef>
+    <cs:defRPr sz="1000" kern="1200"/>
+  </cs:axisTitle>
+  <cs:categoryAxis>
+    <cs:lnRef idx="0"/>
+    <cs:fillRef idx="0"/>
+    <cs:effectRef idx="0"/>
+    <cs:fontRef idx="minor">
+      <a:schemeClr val="tx1">
+        <a:lumMod val="65000"/>
+        <a:lumOff val="35000"/>
+      </a:schemeClr>
+    </cs:fontRef>
+    <cs:spPr>
+      <a:ln w="9525" cap="flat" cmpd="sng" algn="ctr">
+        <a:solidFill>
+          <a:schemeClr val="tx1">
+            <a:lumMod val="15000"/>
+            <a:lumOff val="85000"/>
+          </a:schemeClr>
+        </a:solidFill>
+        <a:round/>
+      </a:ln>
+    </cs:spPr>
+    <cs:defRPr sz="900" kern="1200"/>
+  </cs:categoryAxis>
+  <cs:chartArea mods="allowNoFillOverride allowNoLineOverride">
+    <cs:lnRef idx="0"/>
+    <cs:fillRef idx="0"/>
+    <cs:effectRef idx="0"/>
+    <cs:fontRef idx="minor">
+      <a:schemeClr val="tx1"/>
+    </cs:fontRef>
+    <cs:spPr>
+      <a:solidFill>
+        <a:schemeClr val="bg1"/>
+      </a:solidFill>
+      <a:ln w="9525" cap="flat" cmpd="sng" algn="ctr">
+        <a:solidFill>
+          <a:schemeClr val="tx1">
+            <a:lumMod val="15000"/>
+            <a:lumOff val="85000"/>
+          </a:schemeClr>
+        </a:solidFill>
+        <a:round/>
+      </a:ln>
+    </cs:spPr>
+    <cs:defRPr sz="1000" kern="1200"/>
+  </cs:chartArea>
+  <cs:dataLabel>
+    <cs:lnRef idx="0"/>
+    <cs:fillRef idx="0"/>
+    <cs:effectRef idx="0"/>
+    <cs:fontRef idx="minor">
+      <a:schemeClr val="tx1">
+        <a:lumMod val="75000"/>
+        <a:lumOff val="25000"/>
+      </a:schemeClr>
+    </cs:fontRef>
+    <cs:defRPr sz="900" kern="1200"/>
+  </cs:dataLabel>
+  <cs:dataLabelCallout>
+    <cs:lnRef idx="0"/>
+    <cs:fillRef idx="0"/>
+    <cs:effectRef idx="0"/>
+    <cs:fontRef idx="minor">
+      <a:schemeClr val="dk1">
+        <a:lumMod val="65000"/>
+        <a:lumOff val="35000"/>
+      </a:schemeClr>
+    </cs:fontRef>
+    <cs:spPr>
+      <a:solidFill>
+        <a:schemeClr val="lt1"/>
+      </a:solidFill>
+      <a:ln>
+        <a:solidFill>
+          <a:schemeClr val="dk1">
+            <a:lumMod val="25000"/>
+            <a:lumOff val="75000"/>
+          </a:schemeClr>
+        </a:solidFill>
+      </a:ln>
+    </cs:spPr>
+    <cs:defRPr sz="900" kern="1200"/>
+    <cs:bodyPr rot="0" spcFirstLastPara="1" vertOverflow="clip" horzOverflow="clip" vert="horz" wrap="square" lIns="36576" tIns="18288" rIns="36576" bIns="18288" anchor="ctr" anchorCtr="1">
+      <a:spAutoFit/>
+    </cs:bodyPr>
+  </cs:dataLabelCallout>
+  <cs:dataPoint>
+    <cs:lnRef idx="0"/>
+    <cs:fillRef idx="1">
+      <cs:styleClr val="auto"/>
+    </cs:fillRef>
+    <cs:effectRef idx="0"/>
+    <cs:fontRef idx="minor">
+      <a:schemeClr val="tx1"/>
+    </cs:fontRef>
+    <cs:spPr>
+      <a:solidFill>
+        <a:schemeClr val="phClr"/>
+      </a:solidFill>
+    </cs:spPr>
+  </cs:dataPoint>
+  <cs:dataPoint3D>
+    <cs:lnRef idx="0"/>
+    <cs:fillRef idx="1">
+      <cs:styleClr val="auto"/>
+    </cs:fillRef>
+    <cs:effectRef idx="0"/>
+    <cs:fontRef idx="minor">
+      <a:schemeClr val="tx1"/>
+    </cs:fontRef>
+    <cs:spPr>
+      <a:solidFill>
+        <a:schemeClr val="phClr"/>
+      </a:solidFill>
+    </cs:spPr>
+  </cs:dataPoint3D>
+  <cs:dataPointLine>
+    <cs:lnRef idx="0">
+      <cs:styleClr val="auto"/>
+    </cs:lnRef>
+    <cs:fillRef idx="1"/>
+    <cs:effectRef idx="0"/>
+    <cs:fontRef idx="minor">
+      <a:schemeClr val="tx1"/>
+    </cs:fontRef>
+    <cs:spPr>
+      <a:ln w="28575" cap="rnd">
+        <a:solidFill>
+          <a:schemeClr val="phClr"/>
+        </a:solidFill>
+        <a:round/>
+      </a:ln>
+    </cs:spPr>
+  </cs:dataPointLine>
+  <cs:dataPointMarker>
+    <cs:lnRef idx="0">
+      <cs:styleClr val="auto"/>
+    </cs:lnRef>
+    <cs:fillRef idx="1">
+      <cs:styleClr val="auto"/>
+    </cs:fillRef>
+    <cs:effectRef idx="0"/>
+    <cs:fontRef idx="minor">
+      <a:schemeClr val="tx1"/>
+    </cs:fontRef>
+    <cs:spPr>
+      <a:solidFill>
+        <a:schemeClr val="phClr"/>
+      </a:solidFill>
+      <a:ln w="9525">
+        <a:solidFill>
+          <a:schemeClr val="phClr"/>
+        </a:solidFill>
+      </a:ln>
+    </cs:spPr>
+  </cs:dataPointMarker>
+  <cs:dataPointMarkerLayout symbol="circle" size="5"/>
+  <cs:dataPointWireframe>
+    <cs:lnRef idx="0">
+      <cs:styleClr val="auto"/>
+    </cs:lnRef>
+    <cs:fillRef idx="1"/>
+    <cs:effectRef idx="0"/>
+    <cs:fontRef idx="minor">
+      <a:schemeClr val="tx1"/>
+    </cs:fontRef>
+    <cs:spPr>
+      <a:ln w="9525" cap="rnd">
+        <a:solidFill>
+          <a:schemeClr val="phClr"/>
+        </a:solidFill>
+        <a:round/>
+      </a:ln>
+    </cs:spPr>
+  </cs:dataPointWireframe>
+  <cs:dataTable>
+    <cs:lnRef idx="0"/>
+    <cs:fillRef idx="0"/>
+    <cs:effectRef idx="0"/>
+    <cs:fontRef idx="minor">
+      <a:schemeClr val="tx1">
+        <a:lumMod val="65000"/>
+        <a:lumOff val="35000"/>
+      </a:schemeClr>
+    </cs:fontRef>
+    <cs:spPr>
+      <a:noFill/>
+      <a:ln w="9525" cap="flat" cmpd="sng" algn="ctr">
+        <a:solidFill>
+          <a:schemeClr val="tx1">
+            <a:lumMod val="15000"/>
+            <a:lumOff val="85000"/>
+          </a:schemeClr>
+        </a:solidFill>
+        <a:round/>
+      </a:ln>
+    </cs:spPr>
+    <cs:defRPr sz="900" kern="1200"/>
+  </cs:dataTable>
+  <cs:downBar>
+    <cs:lnRef idx="0"/>
+    <cs:fillRef idx="0"/>
+    <cs:effectRef idx="0"/>
+    <cs:fontRef idx="minor">
+      <a:schemeClr val="dk1"/>
+    </cs:fontRef>
+    <cs:spPr>
+      <a:solidFill>
+        <a:schemeClr val="dk1">
+          <a:lumMod val="65000"/>
+          <a:lumOff val="35000"/>
+        </a:schemeClr>
+      </a:solidFill>
+      <a:ln w="9525">
+        <a:solidFill>
+          <a:schemeClr val="tx1">
+            <a:lumMod val="65000"/>
+            <a:lumOff val="35000"/>
+          </a:schemeClr>
+        </a:solidFill>
+      </a:ln>
+    </cs:spPr>
+  </cs:downBar>
+  <cs:dropLine>
+    <cs:lnRef idx="0"/>
+    <cs:fillRef idx="0"/>
+    <cs:effectRef idx="0"/>
+    <cs:fontRef idx="minor">
+      <a:schemeClr val="tx1"/>
+    </cs:fontRef>
+    <cs:spPr>
+      <a:ln w="9525" cap="flat" cmpd="sng" algn="ctr">
+        <a:solidFill>
+          <a:schemeClr val="tx1">
+            <a:lumMod val="35000"/>
+            <a:lumOff val="65000"/>
+          </a:schemeClr>
+        </a:solidFill>
+        <a:round/>
+      </a:ln>
+    </cs:spPr>
+  </cs:dropLine>
+  <cs:errorBar>
+    <cs:lnRef idx="0"/>
+    <cs:fillRef idx="0"/>
+    <cs:effectRef idx="0"/>
+    <cs:fontRef idx="minor">
+      <a:schemeClr val="tx1"/>
+    </cs:fontRef>
+    <cs:spPr>
+      <a:ln w="9525" cap="flat" cmpd="sng" algn="ctr">
+        <a:solidFill>
+          <a:schemeClr val="tx1">
+            <a:lumMod val="65000"/>
+            <a:lumOff val="35000"/>
+          </a:schemeClr>
+        </a:solidFill>
+        <a:round/>
+      </a:ln>
+    </cs:spPr>
+  </cs:errorBar>
+  <cs:floor>
+    <cs:lnRef idx="0"/>
+    <cs:fillRef idx="0"/>
+    <cs:effectRef idx="0"/>
+    <cs:fontRef idx="minor">
+      <a:schemeClr val="tx1"/>
+    </cs:fontRef>
+    <cs:spPr>
+      <a:noFill/>
+      <a:ln>
+        <a:noFill/>
+      </a:ln>
+    </cs:spPr>
+  </cs:floor>
+  <cs:gridlineMajor>
+    <cs:lnRef idx="0"/>
+    <cs:fillRef idx="0"/>
+    <cs:effectRef idx="0"/>
+    <cs:fontRef idx="minor">
+      <a:schemeClr val="tx1"/>
+    </cs:fontRef>
+    <cs:spPr>
+      <a:ln w="9525" cap="flat" cmpd="sng" algn="ctr">
+        <a:solidFill>
+          <a:schemeClr val="tx1">
+            <a:lumMod val="15000"/>
+            <a:lumOff val="85000"/>
+          </a:schemeClr>
+        </a:solidFill>
+        <a:round/>
+      </a:ln>
+    </cs:spPr>
+  </cs:gridlineMajor>
+  <cs:gridlineMinor>
+    <cs:lnRef idx="0"/>
+    <cs:fillRef idx="0"/>
+    <cs:effectRef idx="0"/>
+    <cs:fontRef idx="minor">
+      <a:schemeClr val="tx1"/>
+    </cs:fontRef>
+    <cs:spPr>
+      <a:ln w="9525" cap="flat" cmpd="sng" algn="ctr">
+        <a:solidFill>
+          <a:schemeClr val="tx1">
+            <a:lumMod val="5000"/>
+            <a:lumOff val="95000"/>
+          </a:schemeClr>
+        </a:solidFill>
+        <a:round/>
+      </a:ln>
+    </cs:spPr>
+  </cs:gridlineMinor>
+  <cs:hiLoLine>
+    <cs:lnRef idx="0"/>
+    <cs:fillRef idx="0"/>
+    <cs:effectRef idx="0"/>
+    <cs:fontRef idx="minor">
+      <a:schemeClr val="tx1"/>
+    </cs:fontRef>
+    <cs:spPr>
+      <a:ln w="9525" cap="flat" cmpd="sng" algn="ctr">
+        <a:solidFill>
+          <a:schemeClr val="tx1">
+            <a:lumMod val="75000"/>
+            <a:lumOff val="25000"/>
+          </a:schemeClr>
+        </a:solidFill>
+        <a:round/>
+      </a:ln>
+    </cs:spPr>
+  </cs:hiLoLine>
+  <cs:leaderLine>
+    <cs:lnRef idx="0"/>
+    <cs:fillRef idx="0"/>
+    <cs:effectRef idx="0"/>
+    <cs:fontRef idx="minor">
+      <a:schemeClr val="tx1"/>
+    </cs:fontRef>
+    <cs:spPr>
+      <a:ln w="9525" cap="flat" cmpd="sng" algn="ctr">
+        <a:solidFill>
+          <a:schemeClr val="tx1">
+            <a:lumMod val="35000"/>
+            <a:lumOff val="65000"/>
+          </a:schemeClr>
+        </a:solidFill>
+        <a:round/>
+      </a:ln>
+    </cs:spPr>
+  </cs:leaderLine>
+  <cs:legend>
+    <cs:lnRef idx="0"/>
+    <cs:fillRef idx="0"/>
+    <cs:effectRef idx="0"/>
+    <cs:fontRef idx="minor">
+      <a:schemeClr val="tx1">
+        <a:lumMod val="65000"/>
+        <a:lumOff val="35000"/>
+      </a:schemeClr>
+    </cs:fontRef>
+    <cs:defRPr sz="900" kern="1200"/>
+  </cs:legend>
+  <cs:plotArea mods="allowNoFillOverride allowNoLineOverride">
+    <cs:lnRef idx="0"/>
+    <cs:fillRef idx="0"/>
+    <cs:effectRef idx="0"/>
+    <cs:fontRef idx="minor">
+      <a:schemeClr val="tx1"/>
+    </cs:fontRef>
+  </cs:plotArea>
+  <cs:plotArea3D mods="allowNoFillOverride allowNoLineOverride">
+    <cs:lnRef idx="0"/>
+    <cs:fillRef idx="0"/>
+    <cs:effectRef idx="0"/>
+    <cs:fontRef idx="minor">
+      <a:schemeClr val="tx1"/>
+    </cs:fontRef>
+  </cs:plotArea3D>
+  <cs:seriesAxis>
+    <cs:lnRef idx="0"/>
+    <cs:fillRef idx="0"/>
+    <cs:effectRef idx="0"/>
+    <cs:fontRef idx="minor">
+      <a:schemeClr val="tx1">
+        <a:lumMod val="65000"/>
+        <a:lumOff val="35000"/>
+      </a:schemeClr>
+    </cs:fontRef>
+    <cs:defRPr sz="900" kern="1200"/>
+  </cs:seriesAxis>
+  <cs:seriesLine>
+    <cs:lnRef idx="0"/>
+    <cs:fillRef idx="0"/>
+    <cs:effectRef idx="0"/>
+    <cs:fontRef idx="minor">
+      <a:schemeClr val="tx1"/>
+    </cs:fontRef>
+    <cs:spPr>
+      <a:ln w="9525" cap="flat" cmpd="sng" algn="ctr">
+        <a:solidFill>
+          <a:schemeClr val="tx1">
+            <a:lumMod val="35000"/>
+            <a:lumOff val="65000"/>
+          </a:schemeClr>
+        </a:solidFill>
+        <a:round/>
+      </a:ln>
+    </cs:spPr>
+  </cs:seriesLine>
+  <cs:title>
+    <cs:lnRef idx="0"/>
+    <cs:fillRef idx="0"/>
+    <cs:effectRef idx="0"/>
+    <cs:fontRef idx="minor">
+      <a:schemeClr val="tx1">
+        <a:lumMod val="65000"/>
+        <a:lumOff val="35000"/>
+      </a:schemeClr>
+    </cs:fontRef>
+    <cs:defRPr sz="1400" b="0" kern="1200" spc="0" baseline="0"/>
+  </cs:title>
+  <cs:trendline>
+    <cs:lnRef idx="0">
+      <cs:styleClr val="auto"/>
+    </cs:lnRef>
+    <cs:fillRef idx="0"/>
+    <cs:effectRef idx="0"/>
+    <cs:fontRef idx="minor">
+      <a:schemeClr val="tx1"/>
+    </cs:fontRef>
+    <cs:spPr>
+      <a:ln w="19050" cap="rnd">
+        <a:solidFill>
+          <a:schemeClr val="phClr"/>
+        </a:solidFill>
+        <a:prstDash val="sysDot"/>
+      </a:ln>
+    </cs:spPr>
+  </cs:trendline>
+  <cs:trendlineLabel>
+    <cs:lnRef idx="0"/>
+    <cs:fillRef idx="0"/>
+    <cs:effectRef idx="0"/>
+    <cs:fontRef idx="minor">
+      <a:schemeClr val="tx1">
+        <a:lumMod val="65000"/>
+        <a:lumOff val="35000"/>
+      </a:schemeClr>
+    </cs:fontRef>
+    <cs:defRPr sz="900" kern="1200"/>
+  </cs:trendlineLabel>
+  <cs:upBar>
+    <cs:lnRef idx="0"/>
+    <cs:fillRef idx="0"/>
+    <cs:effectRef idx="0"/>
+    <cs:fontRef idx="minor">
+      <a:schemeClr val="dk1"/>
+    </cs:fontRef>
+    <cs:spPr>
+      <a:solidFill>
+        <a:schemeClr val="lt1"/>
+      </a:solidFill>
+      <a:ln w="9525">
+        <a:solidFill>
+          <a:schemeClr val="tx1">
+            <a:lumMod val="15000"/>
+            <a:lumOff val="85000"/>
+          </a:schemeClr>
+        </a:solidFill>
+      </a:ln>
+    </cs:spPr>
+  </cs:upBar>
+  <cs:valueAxis>
+    <cs:lnRef idx="0"/>
+    <cs:fillRef idx="0"/>
+    <cs:effectRef idx="0"/>
+    <cs:fontRef idx="minor">
+      <a:schemeClr val="tx1">
+        <a:lumMod val="65000"/>
+        <a:lumOff val="35000"/>
+      </a:schemeClr>
+    </cs:fontRef>
+    <cs:defRPr sz="900" kern="1200"/>
+  </cs:valueAxis>
+  <cs:wall>
+    <cs:lnRef idx="0"/>
+    <cs:fillRef idx="0"/>
+    <cs:effectRef idx="0"/>
+    <cs:fontRef idx="minor">
+      <a:schemeClr val="tx1"/>
+    </cs:fontRef>
+    <cs:spPr>
+      <a:noFill/>
+      <a:ln>
+        <a:noFill/>
+      </a:ln>
+    </cs:spPr>
+  </cs:wall>
+</cs:chartStyle>
+</file>
+
+<file path=ppt/charts/style9.xml><?xml version="1.0" encoding="utf-8"?>
 <cs:chartStyle xmlns:cs="http://schemas.microsoft.com/office/drawing/2012/chartStyle" xmlns:a="http://schemas.openxmlformats.org/drawingml/2006/main" id="227">
   <cs:axisTitle>
     <cs:lnRef idx="0"/>
@@ -10934,7 +14318,7 @@
             <a:pPr algn="r" rtl="0"/>
             <a:fld id="{221A1788-7372-4FAC-9AF0-00B54B8D9CBA}" type="datetime1">
               <a:rPr lang="it-IT" smtClean="0"/>
-              <a:t>14/05/2023</a:t>
+              <a:t>05/07/2023</a:t>
             </a:fld>
             <a:endParaRPr lang="it-IT" dirty="0"/>
           </a:p>
@@ -11104,7 +14488,7 @@
             <a:fld id="{D943A304-85CD-4257-B418-D8F889FE0DBC}" type="datetime1">
               <a:rPr lang="it-IT" smtClean="0"/>
               <a:pPr/>
-              <a:t>14/05/2023</a:t>
+              <a:t>05/07/2023</a:t>
             </a:fld>
             <a:endParaRPr lang="it-IT" dirty="0"/>
           </a:p>
@@ -11503,7 +14887,10 @@
           <a:bodyPr/>
           <a:lstStyle/>
           <a:p>
-            <a:endParaRPr lang="it-IT" dirty="0"/>
+            <a:r>
+              <a:rPr lang="it-IT" dirty="0"/>
+              <a:t>Non ci ricordiamo la lore</a:t>
+            </a:r>
           </a:p>
         </p:txBody>
       </p:sp>
@@ -11535,6 +14922,91 @@
     <p:extLst>
       <p:ext uri="{BB962C8B-B14F-4D97-AF65-F5344CB8AC3E}">
         <p14:creationId xmlns:p14="http://schemas.microsoft.com/office/powerpoint/2010/main" val="1108984394"/>
+      </p:ext>
+    </p:extLst>
+  </p:cSld>
+  <p:clrMapOvr>
+    <a:masterClrMapping/>
+  </p:clrMapOvr>
+</p:notes>
+</file>
+
+<file path=ppt/notesSlides/notesSlide3.xml><?xml version="1.0" encoding="utf-8"?>
+<p:notes xmlns:a="http://schemas.openxmlformats.org/drawingml/2006/main" xmlns:r="http://schemas.openxmlformats.org/officeDocument/2006/relationships" xmlns:p="http://schemas.openxmlformats.org/presentationml/2006/main">
+  <p:cSld>
+    <p:spTree>
+      <p:nvGrpSpPr>
+        <p:cNvPr id="1" name=""/>
+        <p:cNvGrpSpPr/>
+        <p:nvPr/>
+      </p:nvGrpSpPr>
+      <p:grpSpPr>
+        <a:xfrm>
+          <a:off x="0" y="0"/>
+          <a:ext cx="0" cy="0"/>
+          <a:chOff x="0" y="0"/>
+          <a:chExt cx="0" cy="0"/>
+        </a:xfrm>
+      </p:grpSpPr>
+      <p:sp>
+        <p:nvSpPr>
+          <p:cNvPr id="2" name="Slide Image Placeholder 1"/>
+          <p:cNvSpPr>
+            <a:spLocks noGrp="1" noRot="1" noChangeAspect="1"/>
+          </p:cNvSpPr>
+          <p:nvPr>
+            <p:ph type="sldImg"/>
+          </p:nvPr>
+        </p:nvSpPr>
+        <p:spPr/>
+      </p:sp>
+      <p:sp>
+        <p:nvSpPr>
+          <p:cNvPr id="3" name="Notes Placeholder 2"/>
+          <p:cNvSpPr>
+            <a:spLocks noGrp="1"/>
+          </p:cNvSpPr>
+          <p:nvPr>
+            <p:ph type="body" idx="1"/>
+          </p:nvPr>
+        </p:nvSpPr>
+        <p:spPr/>
+        <p:txBody>
+          <a:bodyPr/>
+          <a:lstStyle/>
+          <a:p>
+            <a:endParaRPr lang="it-IT" dirty="0"/>
+          </a:p>
+        </p:txBody>
+      </p:sp>
+      <p:sp>
+        <p:nvSpPr>
+          <p:cNvPr id="4" name="Slide Number Placeholder 3"/>
+          <p:cNvSpPr>
+            <a:spLocks noGrp="1"/>
+          </p:cNvSpPr>
+          <p:nvPr>
+            <p:ph type="sldNum" sz="quarter" idx="5"/>
+          </p:nvPr>
+        </p:nvSpPr>
+        <p:spPr/>
+        <p:txBody>
+          <a:bodyPr/>
+          <a:lstStyle/>
+          <a:p>
+            <a:fld id="{3EBA5BD7-F043-4D1B-AA17-CD412FC534DE}" type="slidenum">
+              <a:rPr lang="it-IT" smtClean="0"/>
+              <a:pPr/>
+              <a:t>20</a:t>
+            </a:fld>
+            <a:endParaRPr lang="it-IT" dirty="0"/>
+          </a:p>
+        </p:txBody>
+      </p:sp>
+    </p:spTree>
+    <p:extLst>
+      <p:ext uri="{BB962C8B-B14F-4D97-AF65-F5344CB8AC3E}">
+        <p14:creationId xmlns:p14="http://schemas.microsoft.com/office/powerpoint/2010/main" val="4232637083"/>
       </p:ext>
     </p:extLst>
   </p:cSld>
@@ -12307,7 +15779,7 @@
             <a:fld id="{3889EF9B-A500-41B6-8F1C-893813E9A898}" type="datetime1">
               <a:rPr lang="it-IT" smtClean="0"/>
               <a:pPr/>
-              <a:t>14/05/2023</a:t>
+              <a:t>05/07/2023</a:t>
             </a:fld>
             <a:endParaRPr lang="it-IT" dirty="0"/>
           </a:p>
@@ -12513,7 +15985,7 @@
             <a:fld id="{6E724BBD-5BEA-4971-A6C4-42E94AF7CB5F}" type="datetime1">
               <a:rPr lang="it-IT" smtClean="0"/>
               <a:pPr/>
-              <a:t>14/05/2023</a:t>
+              <a:t>05/07/2023</a:t>
             </a:fld>
             <a:endParaRPr lang="it-IT" dirty="0"/>
           </a:p>
@@ -12729,7 +16201,7 @@
             <a:fld id="{EF1B2188-7D8C-43C8-B29F-60D01DE77B72}" type="datetime1">
               <a:rPr lang="it-IT" smtClean="0"/>
               <a:pPr/>
-              <a:t>14/05/2023</a:t>
+              <a:t>05/07/2023</a:t>
             </a:fld>
             <a:endParaRPr lang="it-IT" dirty="0"/>
           </a:p>
@@ -12935,7 +16407,7 @@
             <a:fld id="{581DC961-63CE-49AB-921E-1CE3DDEFC80A}" type="datetime1">
               <a:rPr lang="it-IT" smtClean="0"/>
               <a:pPr/>
-              <a:t>14/05/2023</a:t>
+              <a:t>05/07/2023</a:t>
             </a:fld>
             <a:endParaRPr lang="it-IT" dirty="0"/>
           </a:p>
@@ -13379,7 +16851,7 @@
             <a:fld id="{C6066F5F-3C86-4285-A86F-35EFBBDD7800}" type="datetime1">
               <a:rPr lang="it-IT" smtClean="0"/>
               <a:pPr/>
-              <a:t>14/05/2023</a:t>
+              <a:t>05/07/2023</a:t>
             </a:fld>
             <a:endParaRPr lang="it-IT" dirty="0"/>
           </a:p>
@@ -13691,7 +17163,7 @@
             <a:fld id="{0B9BE34E-14EC-4041-A597-EE22FC16794F}" type="datetime1">
               <a:rPr lang="it-IT" smtClean="0"/>
               <a:pPr/>
-              <a:t>14/05/2023</a:t>
+              <a:t>05/07/2023</a:t>
             </a:fld>
             <a:endParaRPr lang="it-IT" dirty="0"/>
           </a:p>
@@ -14155,7 +17627,7 @@
             <a:fld id="{D6FAD192-1BF7-4994-9CBA-74265F19F4C1}" type="datetime1">
               <a:rPr lang="it-IT" smtClean="0"/>
               <a:pPr/>
-              <a:t>14/05/2023</a:t>
+              <a:t>05/07/2023</a:t>
             </a:fld>
             <a:endParaRPr lang="it-IT" dirty="0"/>
           </a:p>
@@ -14293,7 +17765,7 @@
             <a:fld id="{C476DD40-7EBA-46D0-A855-62759524AC7A}" type="datetime1">
               <a:rPr lang="it-IT" smtClean="0"/>
               <a:pPr/>
-              <a:t>14/05/2023</a:t>
+              <a:t>05/07/2023</a:t>
             </a:fld>
             <a:endParaRPr lang="it-IT" dirty="0"/>
           </a:p>
@@ -14407,7 +17879,7 @@
             <a:fld id="{C62E4D95-88E1-4556-89BE-EC650C1D14A8}" type="datetime1">
               <a:rPr lang="it-IT" smtClean="0"/>
               <a:pPr/>
-              <a:t>14/05/2023</a:t>
+              <a:t>05/07/2023</a:t>
             </a:fld>
             <a:endParaRPr lang="it-IT" dirty="0"/>
           </a:p>
@@ -14714,7 +18186,7 @@
             <a:fld id="{1F9867D3-FC26-40B1-8BB9-B19FF8D6CD45}" type="datetime1">
               <a:rPr lang="it-IT" smtClean="0"/>
               <a:pPr/>
-              <a:t>14/05/2023</a:t>
+              <a:t>05/07/2023</a:t>
             </a:fld>
             <a:endParaRPr lang="it-IT" dirty="0"/>
           </a:p>
@@ -15011,7 +18483,7 @@
             <a:fld id="{5B0EE21F-92EE-4289-AFFB-9252D957F459}" type="datetime1">
               <a:rPr lang="it-IT" smtClean="0"/>
               <a:pPr/>
-              <a:t>14/05/2023</a:t>
+              <a:t>05/07/2023</a:t>
             </a:fld>
             <a:endParaRPr lang="it-IT" dirty="0"/>
           </a:p>
@@ -15635,7 +19107,7 @@
             <a:fld id="{8A756645-DD8C-4009-9A84-A4AD56EB55A9}" type="datetime1">
               <a:rPr lang="it-IT" smtClean="0"/>
               <a:pPr/>
-              <a:t>14/05/2023</a:t>
+              <a:t>05/07/2023</a:t>
             </a:fld>
             <a:endParaRPr lang="it-IT" dirty="0"/>
           </a:p>
@@ -17780,13 +21252,13 @@
             <p:ph idx="1"/>
             <p:extLst>
               <p:ext uri="{D42A27DB-BD31-4B8C-83A1-F6EECF244321}">
-                <p14:modId xmlns:p14="http://schemas.microsoft.com/office/powerpoint/2010/main" val="1727965080"/>
+                <p14:modId xmlns:p14="http://schemas.microsoft.com/office/powerpoint/2010/main" val="3227366197"/>
               </p:ext>
             </p:extLst>
           </p:nvPr>
         </p:nvGraphicFramePr>
         <p:xfrm>
-          <a:off x="1219200" y="1052736"/>
+          <a:off x="1219359" y="1052736"/>
           <a:ext cx="10360025" cy="5400600"/>
         </p:xfrm>
         <a:graphic>
@@ -18683,6 +22155,123 @@
 </p:sld>
 </file>
 
+<file path=ppt/slides/slide19.xml><?xml version="1.0" encoding="utf-8"?>
+<p:sld xmlns:a="http://schemas.openxmlformats.org/drawingml/2006/main" xmlns:r="http://schemas.openxmlformats.org/officeDocument/2006/relationships" xmlns:p="http://schemas.openxmlformats.org/presentationml/2006/main">
+  <p:cSld>
+    <p:spTree>
+      <p:nvGrpSpPr>
+        <p:cNvPr id="1" name=""/>
+        <p:cNvGrpSpPr/>
+        <p:nvPr/>
+      </p:nvGrpSpPr>
+      <p:grpSpPr>
+        <a:xfrm>
+          <a:off x="0" y="0"/>
+          <a:ext cx="0" cy="0"/>
+          <a:chOff x="0" y="0"/>
+          <a:chExt cx="0" cy="0"/>
+        </a:xfrm>
+      </p:grpSpPr>
+      <p:sp>
+        <p:nvSpPr>
+          <p:cNvPr id="2" name="Title 1">
+            <a:extLst>
+              <a:ext uri="{FF2B5EF4-FFF2-40B4-BE49-F238E27FC236}">
+                <a16:creationId xmlns:a16="http://schemas.microsoft.com/office/drawing/2014/main" id="{1B510F90-B0D5-B7B9-6E72-93E01419D300}"/>
+              </a:ext>
+            </a:extLst>
+          </p:cNvPr>
+          <p:cNvSpPr>
+            <a:spLocks noGrp="1"/>
+          </p:cNvSpPr>
+          <p:nvPr>
+            <p:ph type="title"/>
+          </p:nvPr>
+        </p:nvSpPr>
+        <p:spPr>
+          <a:xfrm>
+            <a:off x="1218883" y="274637"/>
+            <a:ext cx="10360501" cy="562075"/>
+          </a:xfrm>
+        </p:spPr>
+        <p:txBody>
+          <a:bodyPr>
+            <a:normAutofit fontScale="90000"/>
+          </a:bodyPr>
+          <a:lstStyle/>
+          <a:p>
+            <a:pPr algn="ctr"/>
+            <a:r>
+              <a:rPr lang="it-IT" dirty="0"/>
+              <a:t>GPU </a:t>
+            </a:r>
+            <a:r>
+              <a:rPr lang="it-IT" dirty="0" err="1"/>
+              <a:t>execution</a:t>
+            </a:r>
+            <a:r>
+              <a:rPr lang="it-IT" dirty="0"/>
+              <a:t> time</a:t>
+            </a:r>
+          </a:p>
+        </p:txBody>
+      </p:sp>
+      <p:graphicFrame>
+        <p:nvGraphicFramePr>
+          <p:cNvPr id="4" name="Content Placeholder 3">
+            <a:extLst>
+              <a:ext uri="{FF2B5EF4-FFF2-40B4-BE49-F238E27FC236}">
+                <a16:creationId xmlns:a16="http://schemas.microsoft.com/office/drawing/2014/main" id="{04888283-E5FC-8636-EF6C-C2572293D5EB}"/>
+              </a:ext>
+            </a:extLst>
+          </p:cNvPr>
+          <p:cNvGraphicFramePr>
+            <a:graphicFrameLocks noGrp="1"/>
+          </p:cNvGraphicFramePr>
+          <p:nvPr>
+            <p:ph idx="1"/>
+            <p:extLst>
+              <p:ext uri="{D42A27DB-BD31-4B8C-83A1-F6EECF244321}">
+                <p14:modId xmlns:p14="http://schemas.microsoft.com/office/powerpoint/2010/main" val="769579503"/>
+              </p:ext>
+            </p:extLst>
+          </p:nvPr>
+        </p:nvGraphicFramePr>
+        <p:xfrm>
+          <a:off x="909836" y="908050"/>
+          <a:ext cx="10945216" cy="5617294"/>
+        </p:xfrm>
+        <a:graphic>
+          <a:graphicData uri="http://schemas.openxmlformats.org/drawingml/2006/chart">
+            <c:chart xmlns:c="http://schemas.openxmlformats.org/drawingml/2006/chart" xmlns:r="http://schemas.openxmlformats.org/officeDocument/2006/relationships" r:id="rId2"/>
+          </a:graphicData>
+        </a:graphic>
+      </p:graphicFrame>
+    </p:spTree>
+    <p:extLst>
+      <p:ext uri="{BB962C8B-B14F-4D97-AF65-F5344CB8AC3E}">
+        <p14:creationId xmlns:p14="http://schemas.microsoft.com/office/powerpoint/2010/main" val="1620204499"/>
+      </p:ext>
+    </p:extLst>
+  </p:cSld>
+  <p:clrMapOvr>
+    <a:masterClrMapping/>
+  </p:clrMapOvr>
+  <mc:AlternateContent xmlns:mc="http://schemas.openxmlformats.org/markup-compatibility/2006" xmlns:p14="http://schemas.microsoft.com/office/powerpoint/2010/main">
+    <mc:Choice Requires="p14">
+      <p:transition spd="med" p14:dur="700">
+        <p:fade/>
+      </p:transition>
+    </mc:Choice>
+    <mc:Fallback xmlns="">
+      <p:transition spd="med">
+        <p:fade/>
+      </p:transition>
+    </mc:Fallback>
+  </mc:AlternateContent>
+</p:sld>
+</file>
+
 <file path=ppt/slides/slide2.xml><?xml version="1.0" encoding="utf-8"?>
 <p:sld xmlns:a="http://schemas.openxmlformats.org/drawingml/2006/main" xmlns:r="http://schemas.openxmlformats.org/officeDocument/2006/relationships" xmlns:p="http://schemas.openxmlformats.org/presentationml/2006/main">
   <p:cSld>
@@ -18798,6 +22387,382 @@
     </mc:Choice>
     <mc:Fallback xmlns="">
       <p:transition spd="slow">
+        <p:fade/>
+      </p:transition>
+    </mc:Fallback>
+  </mc:AlternateContent>
+</p:sld>
+</file>
+
+<file path=ppt/slides/slide20.xml><?xml version="1.0" encoding="utf-8"?>
+<p:sld xmlns:a="http://schemas.openxmlformats.org/drawingml/2006/main" xmlns:r="http://schemas.openxmlformats.org/officeDocument/2006/relationships" xmlns:p="http://schemas.openxmlformats.org/presentationml/2006/main">
+  <p:cSld>
+    <p:spTree>
+      <p:nvGrpSpPr>
+        <p:cNvPr id="1" name=""/>
+        <p:cNvGrpSpPr/>
+        <p:nvPr/>
+      </p:nvGrpSpPr>
+      <p:grpSpPr>
+        <a:xfrm>
+          <a:off x="0" y="0"/>
+          <a:ext cx="0" cy="0"/>
+          <a:chOff x="0" y="0"/>
+          <a:chExt cx="0" cy="0"/>
+        </a:xfrm>
+      </p:grpSpPr>
+      <p:sp>
+        <p:nvSpPr>
+          <p:cNvPr id="2" name="Title 1">
+            <a:extLst>
+              <a:ext uri="{FF2B5EF4-FFF2-40B4-BE49-F238E27FC236}">
+                <a16:creationId xmlns:a16="http://schemas.microsoft.com/office/drawing/2014/main" id="{1B510F90-B0D5-B7B9-6E72-93E01419D300}"/>
+              </a:ext>
+            </a:extLst>
+          </p:cNvPr>
+          <p:cNvSpPr>
+            <a:spLocks noGrp="1"/>
+          </p:cNvSpPr>
+          <p:nvPr>
+            <p:ph type="title"/>
+          </p:nvPr>
+        </p:nvSpPr>
+        <p:spPr>
+          <a:xfrm>
+            <a:off x="1218883" y="274637"/>
+            <a:ext cx="10360501" cy="562075"/>
+          </a:xfrm>
+        </p:spPr>
+        <p:txBody>
+          <a:bodyPr>
+            <a:normAutofit fontScale="90000"/>
+          </a:bodyPr>
+          <a:lstStyle/>
+          <a:p>
+            <a:pPr algn="ctr"/>
+            <a:r>
+              <a:rPr lang="it-IT" dirty="0"/>
+              <a:t>GPU </a:t>
+            </a:r>
+            <a:r>
+              <a:rPr lang="it-IT" dirty="0" err="1"/>
+              <a:t>speedup</a:t>
+            </a:r>
+            <a:endParaRPr lang="it-IT" dirty="0"/>
+          </a:p>
+        </p:txBody>
+      </p:sp>
+      <p:graphicFrame>
+        <p:nvGraphicFramePr>
+          <p:cNvPr id="6" name="Content Placeholder 5">
+            <a:extLst>
+              <a:ext uri="{FF2B5EF4-FFF2-40B4-BE49-F238E27FC236}">
+                <a16:creationId xmlns:a16="http://schemas.microsoft.com/office/drawing/2014/main" id="{D41F36EA-79DA-4F4F-B59F-BACC2A84DF39}"/>
+              </a:ext>
+            </a:extLst>
+          </p:cNvPr>
+          <p:cNvGraphicFramePr>
+            <a:graphicFrameLocks noGrp="1"/>
+          </p:cNvGraphicFramePr>
+          <p:nvPr>
+            <p:ph idx="1"/>
+            <p:extLst>
+              <p:ext uri="{D42A27DB-BD31-4B8C-83A1-F6EECF244321}">
+                <p14:modId xmlns:p14="http://schemas.microsoft.com/office/powerpoint/2010/main" val="3087264796"/>
+              </p:ext>
+            </p:extLst>
+          </p:nvPr>
+        </p:nvGraphicFramePr>
+        <p:xfrm>
+          <a:off x="765820" y="692696"/>
+          <a:ext cx="6696744" cy="6165304"/>
+        </p:xfrm>
+        <a:graphic>
+          <a:graphicData uri="http://schemas.openxmlformats.org/drawingml/2006/chart">
+            <c:chart xmlns:c="http://schemas.openxmlformats.org/drawingml/2006/chart" xmlns:r="http://schemas.openxmlformats.org/officeDocument/2006/relationships" r:id="rId3"/>
+          </a:graphicData>
+        </a:graphic>
+      </p:graphicFrame>
+      <p:sp>
+        <p:nvSpPr>
+          <p:cNvPr id="8" name="Content Placeholder 3">
+            <a:extLst>
+              <a:ext uri="{FF2B5EF4-FFF2-40B4-BE49-F238E27FC236}">
+                <a16:creationId xmlns:a16="http://schemas.microsoft.com/office/drawing/2014/main" id="{AF7FCEA8-3585-0A3A-55B8-E104F2ABB6A3}"/>
+              </a:ext>
+            </a:extLst>
+          </p:cNvPr>
+          <p:cNvSpPr txBox="1">
+            <a:spLocks/>
+          </p:cNvSpPr>
+          <p:nvPr/>
+        </p:nvSpPr>
+        <p:spPr>
+          <a:xfrm>
+            <a:off x="7390556" y="1052736"/>
+            <a:ext cx="4320480" cy="5361050"/>
+          </a:xfrm>
+          <a:prstGeom prst="rect">
+            <a:avLst/>
+          </a:prstGeom>
+        </p:spPr>
+        <p:txBody>
+          <a:bodyPr>
+            <a:normAutofit lnSpcReduction="10000"/>
+          </a:bodyPr>
+          <a:lstStyle>
+            <a:lvl1pPr marL="304747" indent="-304747" algn="l" defTabSz="1218987" rtl="0" eaLnBrk="1" latinLnBrk="0" hangingPunct="1">
+              <a:lnSpc>
+                <a:spcPct val="90000"/>
+              </a:lnSpc>
+              <a:spcBef>
+                <a:spcPts val="1600"/>
+              </a:spcBef>
+              <a:buClr>
+                <a:schemeClr val="accent1"/>
+              </a:buClr>
+              <a:buSzPct val="100000"/>
+              <a:buFont typeface="Arial" pitchFamily="34" charset="0"/>
+              <a:buChar char="•"/>
+              <a:defRPr sz="2800" kern="1200">
+                <a:solidFill>
+                  <a:schemeClr val="tx1"/>
+                </a:solidFill>
+                <a:latin typeface="+mn-lt"/>
+                <a:ea typeface="+mn-ea"/>
+                <a:cs typeface="+mn-cs"/>
+              </a:defRPr>
+            </a:lvl1pPr>
+            <a:lvl2pPr marL="609493" indent="-231607" algn="l" defTabSz="1218987" rtl="0" eaLnBrk="1" latinLnBrk="0" hangingPunct="1">
+              <a:lnSpc>
+                <a:spcPct val="90000"/>
+              </a:lnSpc>
+              <a:spcBef>
+                <a:spcPts val="800"/>
+              </a:spcBef>
+              <a:buClr>
+                <a:schemeClr val="accent1"/>
+              </a:buClr>
+              <a:buSzPct val="80000"/>
+              <a:buFont typeface="Arial" pitchFamily="34" charset="0"/>
+              <a:buChar char="•"/>
+              <a:defRPr sz="2400" kern="1200">
+                <a:solidFill>
+                  <a:schemeClr val="tx1"/>
+                </a:solidFill>
+                <a:latin typeface="+mn-lt"/>
+                <a:ea typeface="+mn-ea"/>
+                <a:cs typeface="+mn-cs"/>
+              </a:defRPr>
+            </a:lvl2pPr>
+            <a:lvl3pPr marL="914240" indent="-231607" algn="l" defTabSz="1218987" rtl="0" eaLnBrk="1" latinLnBrk="0" hangingPunct="1">
+              <a:lnSpc>
+                <a:spcPct val="90000"/>
+              </a:lnSpc>
+              <a:spcBef>
+                <a:spcPts val="800"/>
+              </a:spcBef>
+              <a:buClr>
+                <a:schemeClr val="accent1"/>
+              </a:buClr>
+              <a:buSzPct val="80000"/>
+              <a:buFont typeface="Arial" pitchFamily="34" charset="0"/>
+              <a:buChar char="•"/>
+              <a:defRPr sz="2000" kern="1200">
+                <a:solidFill>
+                  <a:schemeClr val="tx1"/>
+                </a:solidFill>
+                <a:latin typeface="+mn-lt"/>
+                <a:ea typeface="+mn-ea"/>
+                <a:cs typeface="+mn-cs"/>
+              </a:defRPr>
+            </a:lvl3pPr>
+            <a:lvl4pPr marL="1218987" indent="-231607" algn="l" defTabSz="1218987" rtl="0" eaLnBrk="1" latinLnBrk="0" hangingPunct="1">
+              <a:lnSpc>
+                <a:spcPct val="90000"/>
+              </a:lnSpc>
+              <a:spcBef>
+                <a:spcPts val="800"/>
+              </a:spcBef>
+              <a:buClr>
+                <a:schemeClr val="accent1"/>
+              </a:buClr>
+              <a:buSzPct val="80000"/>
+              <a:buFont typeface="Arial" pitchFamily="34" charset="0"/>
+              <a:buChar char="•"/>
+              <a:defRPr sz="2000" kern="1200">
+                <a:solidFill>
+                  <a:schemeClr val="tx1"/>
+                </a:solidFill>
+                <a:latin typeface="+mn-lt"/>
+                <a:ea typeface="+mn-ea"/>
+                <a:cs typeface="+mn-cs"/>
+              </a:defRPr>
+            </a:lvl4pPr>
+            <a:lvl5pPr marL="1523733" indent="-231607" algn="l" defTabSz="1218987" rtl="0" eaLnBrk="1" latinLnBrk="0" hangingPunct="1">
+              <a:lnSpc>
+                <a:spcPct val="90000"/>
+              </a:lnSpc>
+              <a:spcBef>
+                <a:spcPts val="800"/>
+              </a:spcBef>
+              <a:buClr>
+                <a:schemeClr val="accent1"/>
+              </a:buClr>
+              <a:buSzPct val="80000"/>
+              <a:buFont typeface="Arial" pitchFamily="34" charset="0"/>
+              <a:buChar char="•"/>
+              <a:defRPr sz="2000" kern="1200">
+                <a:solidFill>
+                  <a:schemeClr val="tx1"/>
+                </a:solidFill>
+                <a:latin typeface="+mn-lt"/>
+                <a:ea typeface="+mn-ea"/>
+                <a:cs typeface="+mn-cs"/>
+              </a:defRPr>
+            </a:lvl5pPr>
+            <a:lvl6pPr marL="1828480" indent="-231607" algn="l" defTabSz="1218987" rtl="0" eaLnBrk="1" latinLnBrk="0" hangingPunct="1">
+              <a:lnSpc>
+                <a:spcPct val="90000"/>
+              </a:lnSpc>
+              <a:spcBef>
+                <a:spcPts val="800"/>
+              </a:spcBef>
+              <a:buClr>
+                <a:schemeClr val="accent1"/>
+              </a:buClr>
+              <a:buSzPct val="80000"/>
+              <a:buFont typeface="Arial" pitchFamily="34" charset="0"/>
+              <a:buChar char="•"/>
+              <a:defRPr sz="2000" kern="1200">
+                <a:solidFill>
+                  <a:schemeClr val="tx1"/>
+                </a:solidFill>
+                <a:latin typeface="+mn-lt"/>
+                <a:ea typeface="+mn-ea"/>
+                <a:cs typeface="+mn-cs"/>
+              </a:defRPr>
+            </a:lvl6pPr>
+            <a:lvl7pPr marL="2133227" indent="-231607" algn="l" defTabSz="1218987" rtl="0" eaLnBrk="1" latinLnBrk="0" hangingPunct="1">
+              <a:lnSpc>
+                <a:spcPct val="90000"/>
+              </a:lnSpc>
+              <a:spcBef>
+                <a:spcPts val="800"/>
+              </a:spcBef>
+              <a:buClr>
+                <a:schemeClr val="accent1"/>
+              </a:buClr>
+              <a:buSzPct val="80000"/>
+              <a:buFont typeface="Arial" pitchFamily="34" charset="0"/>
+              <a:buChar char="•"/>
+              <a:defRPr sz="2000" kern="1200">
+                <a:solidFill>
+                  <a:schemeClr val="tx1"/>
+                </a:solidFill>
+                <a:latin typeface="+mn-lt"/>
+                <a:ea typeface="+mn-ea"/>
+                <a:cs typeface="+mn-cs"/>
+              </a:defRPr>
+            </a:lvl7pPr>
+            <a:lvl8pPr marL="2437973" indent="-231607" algn="l" defTabSz="1218987" rtl="0" eaLnBrk="1" latinLnBrk="0" hangingPunct="1">
+              <a:lnSpc>
+                <a:spcPct val="90000"/>
+              </a:lnSpc>
+              <a:spcBef>
+                <a:spcPts val="800"/>
+              </a:spcBef>
+              <a:buClr>
+                <a:schemeClr val="accent1"/>
+              </a:buClr>
+              <a:buSzPct val="80000"/>
+              <a:buFont typeface="Arial" pitchFamily="34" charset="0"/>
+              <a:buChar char="•"/>
+              <a:defRPr sz="2000" kern="1200" baseline="0">
+                <a:solidFill>
+                  <a:schemeClr val="tx1"/>
+                </a:solidFill>
+                <a:latin typeface="+mn-lt"/>
+                <a:ea typeface="+mn-ea"/>
+                <a:cs typeface="+mn-cs"/>
+              </a:defRPr>
+            </a:lvl8pPr>
+            <a:lvl9pPr marL="2742720" indent="-231607" algn="l" defTabSz="1218987" rtl="0" eaLnBrk="1" latinLnBrk="0" hangingPunct="1">
+              <a:lnSpc>
+                <a:spcPct val="90000"/>
+              </a:lnSpc>
+              <a:spcBef>
+                <a:spcPts val="800"/>
+              </a:spcBef>
+              <a:buClr>
+                <a:schemeClr val="accent1"/>
+              </a:buClr>
+              <a:buSzPct val="80000"/>
+              <a:buFont typeface="Arial" pitchFamily="34" charset="0"/>
+              <a:buChar char="•"/>
+              <a:defRPr sz="2000" kern="1200" baseline="0">
+                <a:solidFill>
+                  <a:schemeClr val="tx1"/>
+                </a:solidFill>
+                <a:latin typeface="+mn-lt"/>
+                <a:ea typeface="+mn-ea"/>
+                <a:cs typeface="+mn-cs"/>
+              </a:defRPr>
+            </a:lvl9pPr>
+          </a:lstStyle>
+          <a:p>
+            <a:pPr marL="514350" indent="-514350">
+              <a:buFont typeface="+mj-lt"/>
+              <a:buAutoNum type="arabicPeriod"/>
+            </a:pPr>
+            <a:r>
+              <a:rPr lang="en-US" dirty="0"/>
+              <a:t>With a small dataset, increasing the number of threads reduces the speedup</a:t>
+            </a:r>
+          </a:p>
+          <a:p>
+            <a:pPr marL="514350" indent="-514350">
+              <a:buFont typeface="+mj-lt"/>
+              <a:buAutoNum type="arabicPeriod"/>
+            </a:pPr>
+            <a:r>
+              <a:rPr lang="en-US" dirty="0"/>
+              <a:t>With larger datasets, increasing the number of threads yields an improved speedup with progressively diminishing returns until a threshold</a:t>
+            </a:r>
+          </a:p>
+          <a:p>
+            <a:pPr marL="514350" indent="-514350">
+              <a:buFont typeface="+mj-lt"/>
+              <a:buAutoNum type="arabicPeriod"/>
+            </a:pPr>
+            <a:r>
+              <a:rPr lang="en-US" dirty="0"/>
+              <a:t>With a larger dataset the speedup increases, except for 100M</a:t>
+            </a:r>
+          </a:p>
+          <a:p>
+            <a:endParaRPr lang="en-US" dirty="0"/>
+          </a:p>
+        </p:txBody>
+      </p:sp>
+    </p:spTree>
+    <p:extLst>
+      <p:ext uri="{BB962C8B-B14F-4D97-AF65-F5344CB8AC3E}">
+        <p14:creationId xmlns:p14="http://schemas.microsoft.com/office/powerpoint/2010/main" val="4226225075"/>
+      </p:ext>
+    </p:extLst>
+  </p:cSld>
+  <p:clrMapOvr>
+    <a:masterClrMapping/>
+  </p:clrMapOvr>
+  <mc:AlternateContent xmlns:mc="http://schemas.openxmlformats.org/markup-compatibility/2006">
+    <mc:Choice xmlns:p14="http://schemas.microsoft.com/office/powerpoint/2010/main" Requires="p14">
+      <p:transition spd="med" p14:dur="700">
+        <p:fade/>
+      </p:transition>
+    </mc:Choice>
+    <mc:Fallback>
+      <p:transition spd="med">
         <p:fade/>
       </p:transition>
     </mc:Fallback>
@@ -19747,7 +23712,10 @@
               <a:rPr lang="it-IT" dirty="0" err="1"/>
               <a:t>Speedup</a:t>
             </a:r>
-            <a:endParaRPr lang="it-IT" dirty="0"/>
+            <a:r>
+              <a:rPr lang="it-IT" dirty="0"/>
+              <a:t> (da ricontrollare)</a:t>
+            </a:r>
           </a:p>
         </p:txBody>
       </p:sp>
@@ -19823,13 +23791,13 @@
   <p:clrMapOvr>
     <a:masterClrMapping/>
   </p:clrMapOvr>
-  <mc:AlternateContent xmlns:mc="http://schemas.openxmlformats.org/markup-compatibility/2006">
-    <mc:Choice xmlns:p14="http://schemas.microsoft.com/office/powerpoint/2010/main" Requires="p14">
+  <mc:AlternateContent xmlns:mc="http://schemas.openxmlformats.org/markup-compatibility/2006" xmlns:p14="http://schemas.microsoft.com/office/powerpoint/2010/main">
+    <mc:Choice Requires="p14">
       <p:transition spd="med" p14:dur="700">
         <p:fade/>
       </p:transition>
     </mc:Choice>
-    <mc:Fallback>
+    <mc:Fallback xmlns="">
       <p:transition spd="med">
         <p:fade/>
       </p:transition>
@@ -20058,7 +24026,7 @@
             <a:r>
               <a:rPr lang="en-US" b="1" dirty="0">
                 <a:solidFill>
-                  <a:schemeClr val="accent5"/>
+                  <a:srgbClr val="FF0000"/>
                 </a:solidFill>
               </a:rPr>
               <a:t>from 212ms to 137ms</a:t>
@@ -20070,26 +24038,26 @@
             <a:r>
               <a:rPr lang="en-US" b="1" dirty="0">
                 <a:solidFill>
-                  <a:schemeClr val="accent5"/>
+                  <a:srgbClr val="FF0000"/>
                 </a:solidFill>
               </a:rPr>
               <a:t>from 26ms to 49ms</a:t>
             </a:r>
             <a:r>
               <a:rPr lang="en-US" dirty="0"/>
-              <a:t>. Therefore the total iteration time is reduced </a:t>
-            </a:r>
-            <a:r>
-              <a:rPr lang="en-US" b="1" dirty="0"/>
-              <a:t>from </a:t>
+              <a:t>. Therefore, the total iteration time is reduced </a:t>
             </a:r>
             <a:r>
               <a:rPr lang="en-US" b="1" dirty="0">
                 <a:solidFill>
-                  <a:schemeClr val="accent5"/>
+                  <a:srgbClr val="FF0000"/>
                 </a:solidFill>
               </a:rPr>
-              <a:t>239ms to 186ms.</a:t>
+              <a:t>from 239ms to 186ms</a:t>
+            </a:r>
+            <a:r>
+              <a:rPr lang="en-US" b="1" dirty="0"/>
+              <a:t>.</a:t>
             </a:r>
           </a:p>
           <a:p>
@@ -21076,6 +25044,151 @@
 </file>
 
 <file path=customXml/item1.xml><?xml version="1.0" encoding="utf-8"?>
+<?mso-contentType ?>
+<FormTemplates xmlns="http://schemas.microsoft.com/sharepoint/v3/contenttype/forms">
+  <Display>DocumentLibraryForm</Display>
+  <Edit>AssetEditForm</Edit>
+  <New>DocumentLibraryForm</New>
+</FormTemplates>
+</file>
+
+<file path=customXml/item2.xml><?xml version="1.0" encoding="utf-8"?>
+<p:properties xmlns:p="http://schemas.microsoft.com/office/2006/metadata/properties" xmlns:xsi="http://www.w3.org/2001/XMLSchema-instance" xmlns:pc="http://schemas.microsoft.com/office/infopath/2007/PartnerControls">
+  <documentManagement>
+    <LocPublishedLinkedAssetsLookup xmlns="4873beb7-5857-4685-be1f-d57550cc96cc" xsi:nil="true"/>
+    <ApprovalStatus xmlns="4873beb7-5857-4685-be1f-d57550cc96cc">InProgress</ApprovalStatus>
+    <MarketSpecific xmlns="4873beb7-5857-4685-be1f-d57550cc96cc">false</MarketSpecific>
+    <LocComments xmlns="4873beb7-5857-4685-be1f-d57550cc96cc" xsi:nil="true"/>
+    <LocLastLocAttemptVersionTypeLookup xmlns="4873beb7-5857-4685-be1f-d57550cc96cc" xsi:nil="true"/>
+    <DirectSourceMarket xmlns="4873beb7-5857-4685-be1f-d57550cc96cc" xsi:nil="true"/>
+    <ThumbnailAssetId xmlns="4873beb7-5857-4685-be1f-d57550cc96cc" xsi:nil="true"/>
+    <PrimaryImageGen xmlns="4873beb7-5857-4685-be1f-d57550cc96cc">false</PrimaryImageGen>
+    <LocNewPublishedVersionLookup xmlns="4873beb7-5857-4685-be1f-d57550cc96cc" xsi:nil="true"/>
+    <LegacyData xmlns="4873beb7-5857-4685-be1f-d57550cc96cc" xsi:nil="true"/>
+    <LocRecommendedHandoff xmlns="4873beb7-5857-4685-be1f-d57550cc96cc" xsi:nil="true"/>
+    <BusinessGroup xmlns="4873beb7-5857-4685-be1f-d57550cc96cc" xsi:nil="true"/>
+    <BlockPublish xmlns="4873beb7-5857-4685-be1f-d57550cc96cc">false</BlockPublish>
+    <TPFriendlyName xmlns="4873beb7-5857-4685-be1f-d57550cc96cc" xsi:nil="true"/>
+    <LocOverallPublishStatusLookup xmlns="4873beb7-5857-4685-be1f-d57550cc96cc" xsi:nil="true"/>
+    <NumericId xmlns="4873beb7-5857-4685-be1f-d57550cc96cc" xsi:nil="true"/>
+    <APEditor xmlns="4873beb7-5857-4685-be1f-d57550cc96cc">
+      <UserInfo>
+        <DisplayName/>
+        <AccountId xsi:nil="true"/>
+        <AccountType/>
+      </UserInfo>
+    </APEditor>
+    <SourceTitle xmlns="4873beb7-5857-4685-be1f-d57550cc96cc" xsi:nil="true"/>
+    <OpenTemplate xmlns="4873beb7-5857-4685-be1f-d57550cc96cc">true</OpenTemplate>
+    <LocOverallLocStatusLookup xmlns="4873beb7-5857-4685-be1f-d57550cc96cc" xsi:nil="true"/>
+    <UALocComments xmlns="4873beb7-5857-4685-be1f-d57550cc96cc" xsi:nil="true"/>
+    <ParentAssetId xmlns="4873beb7-5857-4685-be1f-d57550cc96cc" xsi:nil="true"/>
+    <IntlLangReviewDate xmlns="4873beb7-5857-4685-be1f-d57550cc96cc" xsi:nil="true"/>
+    <FeatureTagsTaxHTField0 xmlns="4873beb7-5857-4685-be1f-d57550cc96cc">
+      <Terms xmlns="http://schemas.microsoft.com/office/infopath/2007/PartnerControls"/>
+    </FeatureTagsTaxHTField0>
+    <PublishStatusLookup xmlns="4873beb7-5857-4685-be1f-d57550cc96cc">
+      <Value>1345093</Value>
+    </PublishStatusLookup>
+    <Providers xmlns="4873beb7-5857-4685-be1f-d57550cc96cc" xsi:nil="true"/>
+    <MachineTranslated xmlns="4873beb7-5857-4685-be1f-d57550cc96cc">false</MachineTranslated>
+    <OriginalSourceMarket xmlns="4873beb7-5857-4685-be1f-d57550cc96cc" xsi:nil="true"/>
+    <APDescription xmlns="4873beb7-5857-4685-be1f-d57550cc96cc">This simple template design works for technology and  businesses, but it's versatile enough to use in other contexts.  It features multiple slide layouts designed for widescreen (16x9 resolution) and includes a sample SmartArt list and chart that are easily editable.</APDescription>
+    <ClipArtFilename xmlns="4873beb7-5857-4685-be1f-d57550cc96cc" xsi:nil="true"/>
+    <ContentItem xmlns="4873beb7-5857-4685-be1f-d57550cc96cc" xsi:nil="true"/>
+    <TPInstallLocation xmlns="4873beb7-5857-4685-be1f-d57550cc96cc" xsi:nil="true"/>
+    <PublishTargets xmlns="4873beb7-5857-4685-be1f-d57550cc96cc">OfficeOnlineVNext</PublishTargets>
+    <TimesCloned xmlns="4873beb7-5857-4685-be1f-d57550cc96cc" xsi:nil="true"/>
+    <AssetStart xmlns="4873beb7-5857-4685-be1f-d57550cc96cc">2011-11-26T00:30:00+00:00</AssetStart>
+    <Provider xmlns="4873beb7-5857-4685-be1f-d57550cc96cc" xsi:nil="true"/>
+    <AcquiredFrom xmlns="4873beb7-5857-4685-be1f-d57550cc96cc">Internal MS</AcquiredFrom>
+    <FriendlyTitle xmlns="4873beb7-5857-4685-be1f-d57550cc96cc" xsi:nil="true"/>
+    <LastHandOff xmlns="4873beb7-5857-4685-be1f-d57550cc96cc" xsi:nil="true"/>
+    <TPClientViewer xmlns="4873beb7-5857-4685-be1f-d57550cc96cc" xsi:nil="true"/>
+    <TemplateStatus xmlns="4873beb7-5857-4685-be1f-d57550cc96cc">Complete</TemplateStatus>
+    <Downloads xmlns="4873beb7-5857-4685-be1f-d57550cc96cc">0</Downloads>
+    <OOCacheId xmlns="4873beb7-5857-4685-be1f-d57550cc96cc" xsi:nil="true"/>
+    <IsDeleted xmlns="4873beb7-5857-4685-be1f-d57550cc96cc">false</IsDeleted>
+    <LocPublishedDependentAssetsLookup xmlns="4873beb7-5857-4685-be1f-d57550cc96cc" xsi:nil="true"/>
+    <TPExecutable xmlns="4873beb7-5857-4685-be1f-d57550cc96cc" xsi:nil="true"/>
+    <EditorialTags xmlns="4873beb7-5857-4685-be1f-d57550cc96cc" xsi:nil="true"/>
+    <SubmitterId xmlns="4873beb7-5857-4685-be1f-d57550cc96cc" xsi:nil="true"/>
+    <ApprovalLog xmlns="4873beb7-5857-4685-be1f-d57550cc96cc" xsi:nil="true"/>
+    <AssetType xmlns="4873beb7-5857-4685-be1f-d57550cc96cc">TP</AssetType>
+    <BugNumber xmlns="4873beb7-5857-4685-be1f-d57550cc96cc" xsi:nil="true"/>
+    <CSXSubmissionDate xmlns="4873beb7-5857-4685-be1f-d57550cc96cc" xsi:nil="true"/>
+    <CSXUpdate xmlns="4873beb7-5857-4685-be1f-d57550cc96cc">false</CSXUpdate>
+    <Milestone xmlns="4873beb7-5857-4685-be1f-d57550cc96cc" xsi:nil="true"/>
+    <RecommendationsModifier xmlns="4873beb7-5857-4685-be1f-d57550cc96cc" xsi:nil="true"/>
+    <OriginAsset xmlns="4873beb7-5857-4685-be1f-d57550cc96cc" xsi:nil="true"/>
+    <TPComponent xmlns="4873beb7-5857-4685-be1f-d57550cc96cc" xsi:nil="true"/>
+    <AssetId xmlns="4873beb7-5857-4685-be1f-d57550cc96cc">TP102787989</AssetId>
+    <IntlLocPriority xmlns="4873beb7-5857-4685-be1f-d57550cc96cc" xsi:nil="true"/>
+    <PolicheckWords xmlns="4873beb7-5857-4685-be1f-d57550cc96cc" xsi:nil="true"/>
+    <TPLaunchHelpLink xmlns="4873beb7-5857-4685-be1f-d57550cc96cc" xsi:nil="true"/>
+    <TPApplication xmlns="4873beb7-5857-4685-be1f-d57550cc96cc" xsi:nil="true"/>
+    <CrawlForDependencies xmlns="4873beb7-5857-4685-be1f-d57550cc96cc">false</CrawlForDependencies>
+    <HandoffToMSDN xmlns="4873beb7-5857-4685-be1f-d57550cc96cc" xsi:nil="true"/>
+    <PlannedPubDate xmlns="4873beb7-5857-4685-be1f-d57550cc96cc" xsi:nil="true"/>
+    <IntlLangReviewer xmlns="4873beb7-5857-4685-be1f-d57550cc96cc" xsi:nil="true"/>
+    <TrustLevel xmlns="4873beb7-5857-4685-be1f-d57550cc96cc">1 Microsoft Managed Content</TrustLevel>
+    <LocLastLocAttemptVersionLookup xmlns="4873beb7-5857-4685-be1f-d57550cc96cc">694266</LocLastLocAttemptVersionLookup>
+    <LocProcessedForHandoffsLookup xmlns="4873beb7-5857-4685-be1f-d57550cc96cc" xsi:nil="true"/>
+    <IsSearchable xmlns="4873beb7-5857-4685-be1f-d57550cc96cc">true</IsSearchable>
+    <TemplateTemplateType xmlns="4873beb7-5857-4685-be1f-d57550cc96cc">PowerPoint Presentation Template</TemplateTemplateType>
+    <CampaignTagsTaxHTField0 xmlns="4873beb7-5857-4685-be1f-d57550cc96cc">
+      <Terms xmlns="http://schemas.microsoft.com/office/infopath/2007/PartnerControls"/>
+    </CampaignTagsTaxHTField0>
+    <TPNamespace xmlns="4873beb7-5857-4685-be1f-d57550cc96cc" xsi:nil="true"/>
+    <LocOverallPreviewStatusLookup xmlns="4873beb7-5857-4685-be1f-d57550cc96cc" xsi:nil="true"/>
+    <TaxCatchAll xmlns="4873beb7-5857-4685-be1f-d57550cc96cc"/>
+    <Markets xmlns="4873beb7-5857-4685-be1f-d57550cc96cc"/>
+    <UAProjectedTotalWords xmlns="4873beb7-5857-4685-be1f-d57550cc96cc" xsi:nil="true"/>
+    <IntlLangReview xmlns="4873beb7-5857-4685-be1f-d57550cc96cc" xsi:nil="true"/>
+    <OutputCachingOn xmlns="4873beb7-5857-4685-be1f-d57550cc96cc">false</OutputCachingOn>
+    <AverageRating xmlns="4873beb7-5857-4685-be1f-d57550cc96cc" xsi:nil="true"/>
+    <APAuthor xmlns="4873beb7-5857-4685-be1f-d57550cc96cc">
+      <UserInfo>
+        <DisplayName>REDMOND\kristaa</DisplayName>
+        <AccountId>136</AccountId>
+        <AccountType/>
+      </UserInfo>
+    </APAuthor>
+    <LocManualTestRequired xmlns="4873beb7-5857-4685-be1f-d57550cc96cc">false</LocManualTestRequired>
+    <TPCommandLine xmlns="4873beb7-5857-4685-be1f-d57550cc96cc" xsi:nil="true"/>
+    <TPAppVersion xmlns="4873beb7-5857-4685-be1f-d57550cc96cc" xsi:nil="true"/>
+    <EditorialStatus xmlns="4873beb7-5857-4685-be1f-d57550cc96cc">Complete</EditorialStatus>
+    <LastModifiedDateTime xmlns="4873beb7-5857-4685-be1f-d57550cc96cc" xsi:nil="true"/>
+    <ScenarioTagsTaxHTField0 xmlns="4873beb7-5857-4685-be1f-d57550cc96cc">
+      <Terms xmlns="http://schemas.microsoft.com/office/infopath/2007/PartnerControls"/>
+    </ScenarioTagsTaxHTField0>
+    <LocProcessedForMarketsLookup xmlns="4873beb7-5857-4685-be1f-d57550cc96cc" xsi:nil="true"/>
+    <TPLaunchHelpLinkType xmlns="4873beb7-5857-4685-be1f-d57550cc96cc">Template</TPLaunchHelpLinkType>
+    <OriginalRelease xmlns="4873beb7-5857-4685-be1f-d57550cc96cc">15</OriginalRelease>
+    <LocalizationTagsTaxHTField0 xmlns="4873beb7-5857-4685-be1f-d57550cc96cc">
+      <Terms xmlns="http://schemas.microsoft.com/office/infopath/2007/PartnerControls"/>
+    </LocalizationTagsTaxHTField0>
+    <UACurrentWords xmlns="4873beb7-5857-4685-be1f-d57550cc96cc" xsi:nil="true"/>
+    <ArtSampleDocs xmlns="4873beb7-5857-4685-be1f-d57550cc96cc" xsi:nil="true"/>
+    <UALocRecommendation xmlns="4873beb7-5857-4685-be1f-d57550cc96cc">Localize</UALocRecommendation>
+    <Manager xmlns="4873beb7-5857-4685-be1f-d57550cc96cc" xsi:nil="true"/>
+    <LocOverallHandbackStatusLookup xmlns="4873beb7-5857-4685-be1f-d57550cc96cc" xsi:nil="true"/>
+    <ShowIn xmlns="4873beb7-5857-4685-be1f-d57550cc96cc">Show everywhere</ShowIn>
+    <UANotes xmlns="4873beb7-5857-4685-be1f-d57550cc96cc" xsi:nil="true"/>
+    <InternalTagsTaxHTField0 xmlns="4873beb7-5857-4685-be1f-d57550cc96cc">
+      <Terms xmlns="http://schemas.microsoft.com/office/infopath/2007/PartnerControls"/>
+    </InternalTagsTaxHTField0>
+    <CSXHash xmlns="4873beb7-5857-4685-be1f-d57550cc96cc" xsi:nil="true"/>
+    <VoteCount xmlns="4873beb7-5857-4685-be1f-d57550cc96cc" xsi:nil="true"/>
+    <AssetExpire xmlns="4873beb7-5857-4685-be1f-d57550cc96cc">2029-05-12T07:00:00+00:00</AssetExpire>
+    <DSATActionTaken xmlns="4873beb7-5857-4685-be1f-d57550cc96cc" xsi:nil="true"/>
+    <CSXSubmissionMarket xmlns="4873beb7-5857-4685-be1f-d57550cc96cc" xsi:nil="true"/>
+    <LocMarketGroupTiers2 xmlns="4873beb7-5857-4685-be1f-d57550cc96cc" xsi:nil="true"/>
+  </documentManagement>
+</p:properties>
+</file>
+
+<file path=customXml/item3.xml><?xml version="1.0" encoding="utf-8"?>
 <ct:contentTypeSchema xmlns:ct="http://schemas.microsoft.com/office/2006/metadata/contentType" xmlns:ma="http://schemas.microsoft.com/office/2006/metadata/properties/metaAttributes" ct:_="" ma:_="" ma:contentTypeName="TemplateFile" ma:contentTypeID="0x0101006EDDDB5EE6D98C44930B742096920B300400F5B6D36B3EF94B4E9A635CDF2A18F5B8" ma:contentTypeVersion="72" ma:contentTypeDescription="Create a new document." ma:contentTypeScope="" ma:versionID="a23e56308344d904b51738559c3d67c9">
   <xsd:schema xmlns:xsd="http://www.w3.org/2001/XMLSchema" xmlns:xs="http://www.w3.org/2001/XMLSchema" xmlns:p="http://schemas.microsoft.com/office/2006/metadata/properties" xmlns:ns2="4873beb7-5857-4685-be1f-d57550cc96cc" targetNamespace="http://schemas.microsoft.com/office/2006/metadata/properties" ma:root="true" ma:fieldsID="cd0908cc4600e77bf5da051303e00c8d" ns2:_="">
     <xsd:import namespace="4873beb7-5857-4685-be1f-d57550cc96cc"/>
@@ -22115,165 +26228,10 @@
 </ct:contentTypeSchema>
 </file>
 
-<file path=customXml/item2.xml><?xml version="1.0" encoding="utf-8"?>
-<p:properties xmlns:p="http://schemas.microsoft.com/office/2006/metadata/properties" xmlns:xsi="http://www.w3.org/2001/XMLSchema-instance" xmlns:pc="http://schemas.microsoft.com/office/infopath/2007/PartnerControls">
-  <documentManagement>
-    <LocPublishedLinkedAssetsLookup xmlns="4873beb7-5857-4685-be1f-d57550cc96cc" xsi:nil="true"/>
-    <ApprovalStatus xmlns="4873beb7-5857-4685-be1f-d57550cc96cc">InProgress</ApprovalStatus>
-    <MarketSpecific xmlns="4873beb7-5857-4685-be1f-d57550cc96cc">false</MarketSpecific>
-    <LocComments xmlns="4873beb7-5857-4685-be1f-d57550cc96cc" xsi:nil="true"/>
-    <LocLastLocAttemptVersionTypeLookup xmlns="4873beb7-5857-4685-be1f-d57550cc96cc" xsi:nil="true"/>
-    <DirectSourceMarket xmlns="4873beb7-5857-4685-be1f-d57550cc96cc" xsi:nil="true"/>
-    <ThumbnailAssetId xmlns="4873beb7-5857-4685-be1f-d57550cc96cc" xsi:nil="true"/>
-    <PrimaryImageGen xmlns="4873beb7-5857-4685-be1f-d57550cc96cc">false</PrimaryImageGen>
-    <LocNewPublishedVersionLookup xmlns="4873beb7-5857-4685-be1f-d57550cc96cc" xsi:nil="true"/>
-    <LegacyData xmlns="4873beb7-5857-4685-be1f-d57550cc96cc" xsi:nil="true"/>
-    <LocRecommendedHandoff xmlns="4873beb7-5857-4685-be1f-d57550cc96cc" xsi:nil="true"/>
-    <BusinessGroup xmlns="4873beb7-5857-4685-be1f-d57550cc96cc" xsi:nil="true"/>
-    <BlockPublish xmlns="4873beb7-5857-4685-be1f-d57550cc96cc">false</BlockPublish>
-    <TPFriendlyName xmlns="4873beb7-5857-4685-be1f-d57550cc96cc" xsi:nil="true"/>
-    <LocOverallPublishStatusLookup xmlns="4873beb7-5857-4685-be1f-d57550cc96cc" xsi:nil="true"/>
-    <NumericId xmlns="4873beb7-5857-4685-be1f-d57550cc96cc" xsi:nil="true"/>
-    <APEditor xmlns="4873beb7-5857-4685-be1f-d57550cc96cc">
-      <UserInfo>
-        <DisplayName/>
-        <AccountId xsi:nil="true"/>
-        <AccountType/>
-      </UserInfo>
-    </APEditor>
-    <SourceTitle xmlns="4873beb7-5857-4685-be1f-d57550cc96cc" xsi:nil="true"/>
-    <OpenTemplate xmlns="4873beb7-5857-4685-be1f-d57550cc96cc">true</OpenTemplate>
-    <LocOverallLocStatusLookup xmlns="4873beb7-5857-4685-be1f-d57550cc96cc" xsi:nil="true"/>
-    <UALocComments xmlns="4873beb7-5857-4685-be1f-d57550cc96cc" xsi:nil="true"/>
-    <ParentAssetId xmlns="4873beb7-5857-4685-be1f-d57550cc96cc" xsi:nil="true"/>
-    <IntlLangReviewDate xmlns="4873beb7-5857-4685-be1f-d57550cc96cc" xsi:nil="true"/>
-    <FeatureTagsTaxHTField0 xmlns="4873beb7-5857-4685-be1f-d57550cc96cc">
-      <Terms xmlns="http://schemas.microsoft.com/office/infopath/2007/PartnerControls"/>
-    </FeatureTagsTaxHTField0>
-    <PublishStatusLookup xmlns="4873beb7-5857-4685-be1f-d57550cc96cc">
-      <Value>1345093</Value>
-    </PublishStatusLookup>
-    <Providers xmlns="4873beb7-5857-4685-be1f-d57550cc96cc" xsi:nil="true"/>
-    <MachineTranslated xmlns="4873beb7-5857-4685-be1f-d57550cc96cc">false</MachineTranslated>
-    <OriginalSourceMarket xmlns="4873beb7-5857-4685-be1f-d57550cc96cc" xsi:nil="true"/>
-    <APDescription xmlns="4873beb7-5857-4685-be1f-d57550cc96cc">This simple template design works for technology and  businesses, but it's versatile enough to use in other contexts.  It features multiple slide layouts designed for widescreen (16x9 resolution) and includes a sample SmartArt list and chart that are easily editable.</APDescription>
-    <ClipArtFilename xmlns="4873beb7-5857-4685-be1f-d57550cc96cc" xsi:nil="true"/>
-    <ContentItem xmlns="4873beb7-5857-4685-be1f-d57550cc96cc" xsi:nil="true"/>
-    <TPInstallLocation xmlns="4873beb7-5857-4685-be1f-d57550cc96cc" xsi:nil="true"/>
-    <PublishTargets xmlns="4873beb7-5857-4685-be1f-d57550cc96cc">OfficeOnlineVNext</PublishTargets>
-    <TimesCloned xmlns="4873beb7-5857-4685-be1f-d57550cc96cc" xsi:nil="true"/>
-    <AssetStart xmlns="4873beb7-5857-4685-be1f-d57550cc96cc">2011-11-26T00:30:00+00:00</AssetStart>
-    <Provider xmlns="4873beb7-5857-4685-be1f-d57550cc96cc" xsi:nil="true"/>
-    <AcquiredFrom xmlns="4873beb7-5857-4685-be1f-d57550cc96cc">Internal MS</AcquiredFrom>
-    <FriendlyTitle xmlns="4873beb7-5857-4685-be1f-d57550cc96cc" xsi:nil="true"/>
-    <LastHandOff xmlns="4873beb7-5857-4685-be1f-d57550cc96cc" xsi:nil="true"/>
-    <TPClientViewer xmlns="4873beb7-5857-4685-be1f-d57550cc96cc" xsi:nil="true"/>
-    <TemplateStatus xmlns="4873beb7-5857-4685-be1f-d57550cc96cc">Complete</TemplateStatus>
-    <Downloads xmlns="4873beb7-5857-4685-be1f-d57550cc96cc">0</Downloads>
-    <OOCacheId xmlns="4873beb7-5857-4685-be1f-d57550cc96cc" xsi:nil="true"/>
-    <IsDeleted xmlns="4873beb7-5857-4685-be1f-d57550cc96cc">false</IsDeleted>
-    <LocPublishedDependentAssetsLookup xmlns="4873beb7-5857-4685-be1f-d57550cc96cc" xsi:nil="true"/>
-    <TPExecutable xmlns="4873beb7-5857-4685-be1f-d57550cc96cc" xsi:nil="true"/>
-    <EditorialTags xmlns="4873beb7-5857-4685-be1f-d57550cc96cc" xsi:nil="true"/>
-    <SubmitterId xmlns="4873beb7-5857-4685-be1f-d57550cc96cc" xsi:nil="true"/>
-    <ApprovalLog xmlns="4873beb7-5857-4685-be1f-d57550cc96cc" xsi:nil="true"/>
-    <AssetType xmlns="4873beb7-5857-4685-be1f-d57550cc96cc">TP</AssetType>
-    <BugNumber xmlns="4873beb7-5857-4685-be1f-d57550cc96cc" xsi:nil="true"/>
-    <CSXSubmissionDate xmlns="4873beb7-5857-4685-be1f-d57550cc96cc" xsi:nil="true"/>
-    <CSXUpdate xmlns="4873beb7-5857-4685-be1f-d57550cc96cc">false</CSXUpdate>
-    <Milestone xmlns="4873beb7-5857-4685-be1f-d57550cc96cc" xsi:nil="true"/>
-    <RecommendationsModifier xmlns="4873beb7-5857-4685-be1f-d57550cc96cc" xsi:nil="true"/>
-    <OriginAsset xmlns="4873beb7-5857-4685-be1f-d57550cc96cc" xsi:nil="true"/>
-    <TPComponent xmlns="4873beb7-5857-4685-be1f-d57550cc96cc" xsi:nil="true"/>
-    <AssetId xmlns="4873beb7-5857-4685-be1f-d57550cc96cc">TP102787989</AssetId>
-    <IntlLocPriority xmlns="4873beb7-5857-4685-be1f-d57550cc96cc" xsi:nil="true"/>
-    <PolicheckWords xmlns="4873beb7-5857-4685-be1f-d57550cc96cc" xsi:nil="true"/>
-    <TPLaunchHelpLink xmlns="4873beb7-5857-4685-be1f-d57550cc96cc" xsi:nil="true"/>
-    <TPApplication xmlns="4873beb7-5857-4685-be1f-d57550cc96cc" xsi:nil="true"/>
-    <CrawlForDependencies xmlns="4873beb7-5857-4685-be1f-d57550cc96cc">false</CrawlForDependencies>
-    <HandoffToMSDN xmlns="4873beb7-5857-4685-be1f-d57550cc96cc" xsi:nil="true"/>
-    <PlannedPubDate xmlns="4873beb7-5857-4685-be1f-d57550cc96cc" xsi:nil="true"/>
-    <IntlLangReviewer xmlns="4873beb7-5857-4685-be1f-d57550cc96cc" xsi:nil="true"/>
-    <TrustLevel xmlns="4873beb7-5857-4685-be1f-d57550cc96cc">1 Microsoft Managed Content</TrustLevel>
-    <LocLastLocAttemptVersionLookup xmlns="4873beb7-5857-4685-be1f-d57550cc96cc">694266</LocLastLocAttemptVersionLookup>
-    <LocProcessedForHandoffsLookup xmlns="4873beb7-5857-4685-be1f-d57550cc96cc" xsi:nil="true"/>
-    <IsSearchable xmlns="4873beb7-5857-4685-be1f-d57550cc96cc">true</IsSearchable>
-    <TemplateTemplateType xmlns="4873beb7-5857-4685-be1f-d57550cc96cc">PowerPoint Presentation Template</TemplateTemplateType>
-    <CampaignTagsTaxHTField0 xmlns="4873beb7-5857-4685-be1f-d57550cc96cc">
-      <Terms xmlns="http://schemas.microsoft.com/office/infopath/2007/PartnerControls"/>
-    </CampaignTagsTaxHTField0>
-    <TPNamespace xmlns="4873beb7-5857-4685-be1f-d57550cc96cc" xsi:nil="true"/>
-    <LocOverallPreviewStatusLookup xmlns="4873beb7-5857-4685-be1f-d57550cc96cc" xsi:nil="true"/>
-    <TaxCatchAll xmlns="4873beb7-5857-4685-be1f-d57550cc96cc"/>
-    <Markets xmlns="4873beb7-5857-4685-be1f-d57550cc96cc"/>
-    <UAProjectedTotalWords xmlns="4873beb7-5857-4685-be1f-d57550cc96cc" xsi:nil="true"/>
-    <IntlLangReview xmlns="4873beb7-5857-4685-be1f-d57550cc96cc" xsi:nil="true"/>
-    <OutputCachingOn xmlns="4873beb7-5857-4685-be1f-d57550cc96cc">false</OutputCachingOn>
-    <AverageRating xmlns="4873beb7-5857-4685-be1f-d57550cc96cc" xsi:nil="true"/>
-    <APAuthor xmlns="4873beb7-5857-4685-be1f-d57550cc96cc">
-      <UserInfo>
-        <DisplayName>REDMOND\kristaa</DisplayName>
-        <AccountId>136</AccountId>
-        <AccountType/>
-      </UserInfo>
-    </APAuthor>
-    <LocManualTestRequired xmlns="4873beb7-5857-4685-be1f-d57550cc96cc">false</LocManualTestRequired>
-    <TPCommandLine xmlns="4873beb7-5857-4685-be1f-d57550cc96cc" xsi:nil="true"/>
-    <TPAppVersion xmlns="4873beb7-5857-4685-be1f-d57550cc96cc" xsi:nil="true"/>
-    <EditorialStatus xmlns="4873beb7-5857-4685-be1f-d57550cc96cc">Complete</EditorialStatus>
-    <LastModifiedDateTime xmlns="4873beb7-5857-4685-be1f-d57550cc96cc" xsi:nil="true"/>
-    <ScenarioTagsTaxHTField0 xmlns="4873beb7-5857-4685-be1f-d57550cc96cc">
-      <Terms xmlns="http://schemas.microsoft.com/office/infopath/2007/PartnerControls"/>
-    </ScenarioTagsTaxHTField0>
-    <LocProcessedForMarketsLookup xmlns="4873beb7-5857-4685-be1f-d57550cc96cc" xsi:nil="true"/>
-    <TPLaunchHelpLinkType xmlns="4873beb7-5857-4685-be1f-d57550cc96cc">Template</TPLaunchHelpLinkType>
-    <OriginalRelease xmlns="4873beb7-5857-4685-be1f-d57550cc96cc">15</OriginalRelease>
-    <LocalizationTagsTaxHTField0 xmlns="4873beb7-5857-4685-be1f-d57550cc96cc">
-      <Terms xmlns="http://schemas.microsoft.com/office/infopath/2007/PartnerControls"/>
-    </LocalizationTagsTaxHTField0>
-    <UACurrentWords xmlns="4873beb7-5857-4685-be1f-d57550cc96cc" xsi:nil="true"/>
-    <ArtSampleDocs xmlns="4873beb7-5857-4685-be1f-d57550cc96cc" xsi:nil="true"/>
-    <UALocRecommendation xmlns="4873beb7-5857-4685-be1f-d57550cc96cc">Localize</UALocRecommendation>
-    <Manager xmlns="4873beb7-5857-4685-be1f-d57550cc96cc" xsi:nil="true"/>
-    <LocOverallHandbackStatusLookup xmlns="4873beb7-5857-4685-be1f-d57550cc96cc" xsi:nil="true"/>
-    <ShowIn xmlns="4873beb7-5857-4685-be1f-d57550cc96cc">Show everywhere</ShowIn>
-    <UANotes xmlns="4873beb7-5857-4685-be1f-d57550cc96cc" xsi:nil="true"/>
-    <InternalTagsTaxHTField0 xmlns="4873beb7-5857-4685-be1f-d57550cc96cc">
-      <Terms xmlns="http://schemas.microsoft.com/office/infopath/2007/PartnerControls"/>
-    </InternalTagsTaxHTField0>
-    <CSXHash xmlns="4873beb7-5857-4685-be1f-d57550cc96cc" xsi:nil="true"/>
-    <VoteCount xmlns="4873beb7-5857-4685-be1f-d57550cc96cc" xsi:nil="true"/>
-    <AssetExpire xmlns="4873beb7-5857-4685-be1f-d57550cc96cc">2029-05-12T07:00:00+00:00</AssetExpire>
-    <DSATActionTaken xmlns="4873beb7-5857-4685-be1f-d57550cc96cc" xsi:nil="true"/>
-    <CSXSubmissionMarket xmlns="4873beb7-5857-4685-be1f-d57550cc96cc" xsi:nil="true"/>
-    <LocMarketGroupTiers2 xmlns="4873beb7-5857-4685-be1f-d57550cc96cc" xsi:nil="true"/>
-  </documentManagement>
-</p:properties>
-</file>
-
-<file path=customXml/item3.xml><?xml version="1.0" encoding="utf-8"?>
-<?mso-contentType ?>
-<FormTemplates xmlns="http://schemas.microsoft.com/sharepoint/v3/contenttype/forms">
-  <Display>DocumentLibraryForm</Display>
-  <Edit>AssetEditForm</Edit>
-  <New>DocumentLibraryForm</New>
-</FormTemplates>
-</file>
-
 <file path=customXml/itemProps1.xml><?xml version="1.0" encoding="utf-8"?>
-<ds:datastoreItem xmlns:ds="http://schemas.openxmlformats.org/officeDocument/2006/customXml" ds:itemID="{A09BF4D4-EF60-4196-BFC3-9462D607978C}">
+<ds:datastoreItem xmlns:ds="http://schemas.openxmlformats.org/officeDocument/2006/customXml" ds:itemID="{3836F65B-1B07-41EE-A0E8-BC6EF3855225}">
   <ds:schemaRefs>
-    <ds:schemaRef ds:uri="http://schemas.microsoft.com/office/2006/metadata/contentType"/>
-    <ds:schemaRef ds:uri="http://schemas.microsoft.com/office/2006/metadata/properties/metaAttributes"/>
-    <ds:schemaRef ds:uri="http://www.w3.org/2001/XMLSchema"/>
-    <ds:schemaRef ds:uri="http://schemas.microsoft.com/office/2006/metadata/properties"/>
-    <ds:schemaRef ds:uri="4873beb7-5857-4685-be1f-d57550cc96cc"/>
-    <ds:schemaRef ds:uri="http://schemas.microsoft.com/office/2006/documentManagement/types"/>
-    <ds:schemaRef ds:uri="http://schemas.microsoft.com/office/infopath/2007/PartnerControls"/>
-    <ds:schemaRef ds:uri="http://schemas.openxmlformats.org/package/2006/metadata/core-properties"/>
-    <ds:schemaRef ds:uri="http://purl.org/dc/elements/1.1/"/>
-    <ds:schemaRef ds:uri="http://purl.org/dc/terms/"/>
-    <ds:schemaRef ds:uri="http://schemas.microsoft.com/internal/obd"/>
+    <ds:schemaRef ds:uri="http://schemas.microsoft.com/sharepoint/v3/contenttype/forms"/>
   </ds:schemaRefs>
 </ds:datastoreItem>
 </file>
@@ -22295,9 +26253,19 @@
 </file>
 
 <file path=customXml/itemProps3.xml><?xml version="1.0" encoding="utf-8"?>
-<ds:datastoreItem xmlns:ds="http://schemas.openxmlformats.org/officeDocument/2006/customXml" ds:itemID="{3836F65B-1B07-41EE-A0E8-BC6EF3855225}">
+<ds:datastoreItem xmlns:ds="http://schemas.openxmlformats.org/officeDocument/2006/customXml" ds:itemID="{A09BF4D4-EF60-4196-BFC3-9462D607978C}">
   <ds:schemaRefs>
-    <ds:schemaRef ds:uri="http://schemas.microsoft.com/sharepoint/v3/contenttype/forms"/>
+    <ds:schemaRef ds:uri="http://schemas.microsoft.com/office/2006/metadata/contentType"/>
+    <ds:schemaRef ds:uri="http://schemas.microsoft.com/office/2006/metadata/properties/metaAttributes"/>
+    <ds:schemaRef ds:uri="http://www.w3.org/2001/XMLSchema"/>
+    <ds:schemaRef ds:uri="http://schemas.microsoft.com/office/2006/metadata/properties"/>
+    <ds:schemaRef ds:uri="4873beb7-5857-4685-be1f-d57550cc96cc"/>
+    <ds:schemaRef ds:uri="http://schemas.microsoft.com/office/2006/documentManagement/types"/>
+    <ds:schemaRef ds:uri="http://schemas.microsoft.com/office/infopath/2007/PartnerControls"/>
+    <ds:schemaRef ds:uri="http://schemas.openxmlformats.org/package/2006/metadata/core-properties"/>
+    <ds:schemaRef ds:uri="http://purl.org/dc/elements/1.1/"/>
+    <ds:schemaRef ds:uri="http://purl.org/dc/terms/"/>
+    <ds:schemaRef ds:uri="http://schemas.microsoft.com/internal/obd"/>
   </ds:schemaRefs>
 </ds:datastoreItem>
 </file>
</xml_diff>